<commit_message>
Removed Packt textbook references & exercises.
</commit_message>
<xml_diff>
--- a/presentations/01_getting_started.pptx
+++ b/presentations/01_getting_started.pptx
@@ -5,29 +5,24 @@
     <p:sldMasterId id="2147483648" r:id="rId1"/>
   </p:sldMasterIdLst>
   <p:notesMasterIdLst>
-    <p:notesMasterId r:id="rId22"/>
+    <p:notesMasterId r:id="rId17"/>
   </p:notesMasterIdLst>
   <p:sldIdLst>
     <p:sldId id="324" r:id="rId2"/>
     <p:sldId id="266" r:id="rId3"/>
-    <p:sldId id="323" r:id="rId4"/>
+    <p:sldId id="326" r:id="rId4"/>
     <p:sldId id="304" r:id="rId5"/>
-    <p:sldId id="278" r:id="rId6"/>
-    <p:sldId id="279" r:id="rId7"/>
+    <p:sldId id="323" r:id="rId6"/>
+    <p:sldId id="278" r:id="rId7"/>
     <p:sldId id="282" r:id="rId8"/>
     <p:sldId id="277" r:id="rId9"/>
-    <p:sldId id="281" r:id="rId10"/>
-    <p:sldId id="280" r:id="rId11"/>
-    <p:sldId id="284" r:id="rId12"/>
-    <p:sldId id="287" r:id="rId13"/>
-    <p:sldId id="296" r:id="rId14"/>
-    <p:sldId id="288" r:id="rId15"/>
-    <p:sldId id="289" r:id="rId16"/>
-    <p:sldId id="290" r:id="rId17"/>
-    <p:sldId id="293" r:id="rId18"/>
-    <p:sldId id="294" r:id="rId19"/>
-    <p:sldId id="326" r:id="rId20"/>
-    <p:sldId id="276" r:id="rId21"/>
+    <p:sldId id="280" r:id="rId10"/>
+    <p:sldId id="287" r:id="rId11"/>
+    <p:sldId id="296" r:id="rId12"/>
+    <p:sldId id="289" r:id="rId13"/>
+    <p:sldId id="293" r:id="rId14"/>
+    <p:sldId id="276" r:id="rId15"/>
+    <p:sldId id="325" r:id="rId16"/>
   </p:sldIdLst>
   <p:sldSz cx="12192000" cy="6858000"/>
   <p:notesSz cx="6858000" cy="9144000"/>
@@ -227,7 +222,7 @@
           <a:p>
             <a:fld id="{FD93C9B2-20F6-4DB1-B471-224337D0AC79}" type="datetimeFigureOut">
               <a:rPr lang="en-US" smtClean="0"/>
-              <a:t>2/7/2022</a:t>
+              <a:t>6/1/2022</a:t>
             </a:fld>
             <a:endParaRPr lang="en-US"/>
           </a:p>
@@ -646,10 +641,7 @@
               <a:tabLst/>
               <a:defRPr/>
             </a:pPr>
-            <a:r>
-              <a:rPr lang="en-US" dirty="0"/>
-              <a:t>Adam naming the animals in the Biblical story.  Variable naming and standards are critically important.</a:t>
-            </a:r>
+            <a:endParaRPr lang="en-US" dirty="0"/>
           </a:p>
         </p:txBody>
       </p:sp>
@@ -679,7 +671,7 @@
     </p:spTree>
     <p:extLst>
       <p:ext uri="{BB962C8B-B14F-4D97-AF65-F5344CB8AC3E}">
-        <p14:creationId xmlns:p14="http://schemas.microsoft.com/office/powerpoint/2010/main" val="828379136"/>
+        <p14:creationId xmlns:p14="http://schemas.microsoft.com/office/powerpoint/2010/main" val="2996454508"/>
       </p:ext>
     </p:extLst>
   </p:cSld>
@@ -750,75 +742,6 @@
               <a:tabLst/>
               <a:defRPr/>
             </a:pPr>
-            <a:r>
-              <a:rPr lang="en-US" dirty="0"/>
-              <a:t>Exercise 4 starts on page 16 of the textbook.  </a:t>
-            </a:r>
-          </a:p>
-          <a:p>
-            <a:pPr marL="0" marR="0" lvl="0" indent="0" algn="l" defTabSz="914400" rtl="0" eaLnBrk="1" fontAlgn="auto" latinLnBrk="0" hangingPunct="1">
-              <a:lnSpc>
-                <a:spcPct val="100000"/>
-              </a:lnSpc>
-              <a:spcBef>
-                <a:spcPts val="0"/>
-              </a:spcBef>
-              <a:spcAft>
-                <a:spcPts val="0"/>
-              </a:spcAft>
-              <a:buClrTx/>
-              <a:buSzTx/>
-              <a:buFontTx/>
-              <a:buNone/>
-              <a:tabLst/>
-              <a:defRPr/>
-            </a:pPr>
-            <a:r>
-              <a:rPr lang="en-US" dirty="0"/>
-              <a:t>Exercise 5 starts on page 17 of the textbook.  </a:t>
-            </a:r>
-          </a:p>
-          <a:p>
-            <a:pPr marL="0" marR="0" lvl="0" indent="0" algn="l" defTabSz="914400" rtl="0" eaLnBrk="1" fontAlgn="auto" latinLnBrk="0" hangingPunct="1">
-              <a:lnSpc>
-                <a:spcPct val="100000"/>
-              </a:lnSpc>
-              <a:spcBef>
-                <a:spcPts val="0"/>
-              </a:spcBef>
-              <a:spcAft>
-                <a:spcPts val="0"/>
-              </a:spcAft>
-              <a:buClrTx/>
-              <a:buSzTx/>
-              <a:buFontTx/>
-              <a:buNone/>
-              <a:tabLst/>
-              <a:defRPr/>
-            </a:pPr>
-            <a:r>
-              <a:rPr lang="en-US" dirty="0"/>
-              <a:t>Exercise 6 starts on page 18 of the textbook.  </a:t>
-            </a:r>
-          </a:p>
-          <a:p>
-            <a:pPr marL="0" marR="0" lvl="0" indent="0" algn="l" defTabSz="914400" rtl="0" eaLnBrk="1" fontAlgn="auto" latinLnBrk="0" hangingPunct="1">
-              <a:lnSpc>
-                <a:spcPct val="100000"/>
-              </a:lnSpc>
-              <a:spcBef>
-                <a:spcPts val="0"/>
-              </a:spcBef>
-              <a:spcAft>
-                <a:spcPts val="0"/>
-              </a:spcAft>
-              <a:buClrTx/>
-              <a:buSzTx/>
-              <a:buFontTx/>
-              <a:buNone/>
-              <a:tabLst/>
-              <a:defRPr/>
-            </a:pPr>
             <a:endParaRPr lang="en-US" dirty="0"/>
           </a:p>
         </p:txBody>
@@ -849,7 +772,7 @@
     </p:spTree>
     <p:extLst>
       <p:ext uri="{BB962C8B-B14F-4D97-AF65-F5344CB8AC3E}">
-        <p14:creationId xmlns:p14="http://schemas.microsoft.com/office/powerpoint/2010/main" val="1667958144"/>
+        <p14:creationId xmlns:p14="http://schemas.microsoft.com/office/powerpoint/2010/main" val="30799508"/>
       </p:ext>
     </p:extLst>
   </p:cSld>
@@ -950,7 +873,7 @@
     </p:spTree>
     <p:extLst>
       <p:ext uri="{BB962C8B-B14F-4D97-AF65-F5344CB8AC3E}">
-        <p14:creationId xmlns:p14="http://schemas.microsoft.com/office/powerpoint/2010/main" val="2996454508"/>
+        <p14:creationId xmlns:p14="http://schemas.microsoft.com/office/powerpoint/2010/main" val="555085068"/>
       </p:ext>
     </p:extLst>
   </p:cSld>
@@ -1051,7 +974,7 @@
     </p:spTree>
     <p:extLst>
       <p:ext uri="{BB962C8B-B14F-4D97-AF65-F5344CB8AC3E}">
-        <p14:creationId xmlns:p14="http://schemas.microsoft.com/office/powerpoint/2010/main" val="30799508"/>
+        <p14:creationId xmlns:p14="http://schemas.microsoft.com/office/powerpoint/2010/main" val="651591465"/>
       </p:ext>
     </p:extLst>
   </p:cSld>
@@ -1124,28 +1047,8 @@
             </a:pPr>
             <a:r>
               <a:rPr lang="en-US" dirty="0"/>
-              <a:t>Exercise 7 starts on page 21 of the textbook.  </a:t>
-            </a:r>
-          </a:p>
-          <a:p>
-            <a:pPr marL="0" marR="0" lvl="0" indent="0" algn="l" defTabSz="914400" rtl="0" eaLnBrk="1" fontAlgn="auto" latinLnBrk="0" hangingPunct="1">
-              <a:lnSpc>
-                <a:spcPct val="100000"/>
-              </a:lnSpc>
-              <a:spcBef>
-                <a:spcPts val="0"/>
-              </a:spcBef>
-              <a:spcAft>
-                <a:spcPts val="0"/>
-              </a:spcAft>
-              <a:buClrTx/>
-              <a:buSzTx/>
-              <a:buFontTx/>
-              <a:buNone/>
-              <a:tabLst/>
-              <a:defRPr/>
-            </a:pPr>
-            <a:endParaRPr lang="en-US" dirty="0"/>
+              <a:t>Interpreted languages are much slower than compiled languages.  When performance matters, an interpreted language may not be the best solution.  If that’s the case with you, Nvidia provides the Cuda development environment which supports the C and C++ languages.  These are compiled languages as opposed to interpreted. </a:t>
+            </a:r>
           </a:p>
         </p:txBody>
       </p:sp>
@@ -1175,7 +1078,7 @@
     </p:spTree>
     <p:extLst>
       <p:ext uri="{BB962C8B-B14F-4D97-AF65-F5344CB8AC3E}">
-        <p14:creationId xmlns:p14="http://schemas.microsoft.com/office/powerpoint/2010/main" val="630857164"/>
+        <p14:creationId xmlns:p14="http://schemas.microsoft.com/office/powerpoint/2010/main" val="4129922841"/>
       </p:ext>
     </p:extLst>
   </p:cSld>
@@ -1229,23 +1132,6 @@
           <a:bodyPr/>
           <a:lstStyle/>
           <a:p>
-            <a:pPr marL="0" marR="0" lvl="0" indent="0" algn="l" defTabSz="914400" rtl="0" eaLnBrk="1" fontAlgn="auto" latinLnBrk="0" hangingPunct="1">
-              <a:lnSpc>
-                <a:spcPct val="100000"/>
-              </a:lnSpc>
-              <a:spcBef>
-                <a:spcPts val="0"/>
-              </a:spcBef>
-              <a:spcAft>
-                <a:spcPts val="0"/>
-              </a:spcAft>
-              <a:buClrTx/>
-              <a:buSzTx/>
-              <a:buFontTx/>
-              <a:buNone/>
-              <a:tabLst/>
-              <a:defRPr/>
-            </a:pPr>
             <a:endParaRPr lang="en-US" dirty="0"/>
           </a:p>
         </p:txBody>
@@ -1276,526 +1162,7 @@
     </p:spTree>
     <p:extLst>
       <p:ext uri="{BB962C8B-B14F-4D97-AF65-F5344CB8AC3E}">
-        <p14:creationId xmlns:p14="http://schemas.microsoft.com/office/powerpoint/2010/main" val="555085068"/>
-      </p:ext>
-    </p:extLst>
-  </p:cSld>
-  <p:clrMapOvr>
-    <a:masterClrMapping/>
-  </p:clrMapOvr>
-</p:notes>
-</file>
-
-<file path=ppt/notesSlides/notesSlide16.xml><?xml version="1.0" encoding="utf-8"?>
-<p:notes xmlns:a="http://schemas.openxmlformats.org/drawingml/2006/main" xmlns:r="http://schemas.openxmlformats.org/officeDocument/2006/relationships" xmlns:p="http://schemas.openxmlformats.org/presentationml/2006/main">
-  <p:cSld>
-    <p:spTree>
-      <p:nvGrpSpPr>
-        <p:cNvPr id="1" name=""/>
-        <p:cNvGrpSpPr/>
-        <p:nvPr/>
-      </p:nvGrpSpPr>
-      <p:grpSpPr>
-        <a:xfrm>
-          <a:off x="0" y="0"/>
-          <a:ext cx="0" cy="0"/>
-          <a:chOff x="0" y="0"/>
-          <a:chExt cx="0" cy="0"/>
-        </a:xfrm>
-      </p:grpSpPr>
-      <p:sp>
-        <p:nvSpPr>
-          <p:cNvPr id="2" name="Slide Image Placeholder 1"/>
-          <p:cNvSpPr>
-            <a:spLocks noGrp="1" noRot="1" noChangeAspect="1"/>
-          </p:cNvSpPr>
-          <p:nvPr>
-            <p:ph type="sldImg"/>
-          </p:nvPr>
-        </p:nvSpPr>
-        <p:spPr/>
-      </p:sp>
-      <p:sp>
-        <p:nvSpPr>
-          <p:cNvPr id="3" name="Notes Placeholder 2"/>
-          <p:cNvSpPr>
-            <a:spLocks noGrp="1"/>
-          </p:cNvSpPr>
-          <p:nvPr>
-            <p:ph type="body" idx="1"/>
-          </p:nvPr>
-        </p:nvSpPr>
-        <p:spPr/>
-        <p:txBody>
-          <a:bodyPr/>
-          <a:lstStyle/>
-          <a:p>
-            <a:pPr marL="0" marR="0" lvl="0" indent="0" algn="l" defTabSz="914400" rtl="0" eaLnBrk="1" fontAlgn="auto" latinLnBrk="0" hangingPunct="1">
-              <a:lnSpc>
-                <a:spcPct val="100000"/>
-              </a:lnSpc>
-              <a:spcBef>
-                <a:spcPts val="0"/>
-              </a:spcBef>
-              <a:spcAft>
-                <a:spcPts val="0"/>
-              </a:spcAft>
-              <a:buClrTx/>
-              <a:buSzTx/>
-              <a:buFontTx/>
-              <a:buNone/>
-              <a:tabLst/>
-              <a:defRPr/>
-            </a:pPr>
-            <a:r>
-              <a:rPr lang="en-US" dirty="0"/>
-              <a:t>Exercise 8 starts on page 24 of the textbook.  </a:t>
-            </a:r>
-          </a:p>
-          <a:p>
-            <a:pPr marL="0" marR="0" lvl="0" indent="0" algn="l" defTabSz="914400" rtl="0" eaLnBrk="1" fontAlgn="auto" latinLnBrk="0" hangingPunct="1">
-              <a:lnSpc>
-                <a:spcPct val="100000"/>
-              </a:lnSpc>
-              <a:spcBef>
-                <a:spcPts val="0"/>
-              </a:spcBef>
-              <a:spcAft>
-                <a:spcPts val="0"/>
-              </a:spcAft>
-              <a:buClrTx/>
-              <a:buSzTx/>
-              <a:buFontTx/>
-              <a:buNone/>
-              <a:tabLst/>
-              <a:defRPr/>
-            </a:pPr>
-            <a:r>
-              <a:rPr lang="en-US" dirty="0"/>
-              <a:t>Exercise 9 starts on page 25 of the textbook.  </a:t>
-            </a:r>
-          </a:p>
-          <a:p>
-            <a:pPr marL="0" marR="0" lvl="0" indent="0" algn="l" defTabSz="914400" rtl="0" eaLnBrk="1" fontAlgn="auto" latinLnBrk="0" hangingPunct="1">
-              <a:lnSpc>
-                <a:spcPct val="100000"/>
-              </a:lnSpc>
-              <a:spcBef>
-                <a:spcPts val="0"/>
-              </a:spcBef>
-              <a:spcAft>
-                <a:spcPts val="0"/>
-              </a:spcAft>
-              <a:buClrTx/>
-              <a:buSzTx/>
-              <a:buFontTx/>
-              <a:buNone/>
-              <a:tabLst/>
-              <a:defRPr/>
-            </a:pPr>
-            <a:r>
-              <a:rPr lang="en-US" dirty="0"/>
-              <a:t>Exercise 10 starts on page 28 of the textbook.  </a:t>
-            </a:r>
-          </a:p>
-          <a:p>
-            <a:pPr marL="0" marR="0" lvl="0" indent="0" algn="l" defTabSz="914400" rtl="0" eaLnBrk="1" fontAlgn="auto" latinLnBrk="0" hangingPunct="1">
-              <a:lnSpc>
-                <a:spcPct val="100000"/>
-              </a:lnSpc>
-              <a:spcBef>
-                <a:spcPts val="0"/>
-              </a:spcBef>
-              <a:spcAft>
-                <a:spcPts val="0"/>
-              </a:spcAft>
-              <a:buClrTx/>
-              <a:buSzTx/>
-              <a:buFontTx/>
-              <a:buNone/>
-              <a:tabLst/>
-              <a:defRPr/>
-            </a:pPr>
-            <a:endParaRPr lang="en-US" dirty="0"/>
-          </a:p>
-        </p:txBody>
-      </p:sp>
-      <p:sp>
-        <p:nvSpPr>
-          <p:cNvPr id="4" name="Slide Number Placeholder 3"/>
-          <p:cNvSpPr>
-            <a:spLocks noGrp="1"/>
-          </p:cNvSpPr>
-          <p:nvPr>
-            <p:ph type="sldNum" sz="quarter" idx="5"/>
-          </p:nvPr>
-        </p:nvSpPr>
-        <p:spPr/>
-        <p:txBody>
-          <a:bodyPr/>
-          <a:lstStyle/>
-          <a:p>
-            <a:fld id="{3148858F-F1DB-4027-9C85-CCA6849540DD}" type="slidenum">
-              <a:rPr lang="en-US" smtClean="0"/>
-              <a:t>16</a:t>
-            </a:fld>
-            <a:endParaRPr lang="en-US"/>
-          </a:p>
-        </p:txBody>
-      </p:sp>
-    </p:spTree>
-    <p:extLst>
-      <p:ext uri="{BB962C8B-B14F-4D97-AF65-F5344CB8AC3E}">
-        <p14:creationId xmlns:p14="http://schemas.microsoft.com/office/powerpoint/2010/main" val="3318223130"/>
-      </p:ext>
-    </p:extLst>
-  </p:cSld>
-  <p:clrMapOvr>
-    <a:masterClrMapping/>
-  </p:clrMapOvr>
-</p:notes>
-</file>
-
-<file path=ppt/notesSlides/notesSlide17.xml><?xml version="1.0" encoding="utf-8"?>
-<p:notes xmlns:a="http://schemas.openxmlformats.org/drawingml/2006/main" xmlns:r="http://schemas.openxmlformats.org/officeDocument/2006/relationships" xmlns:p="http://schemas.openxmlformats.org/presentationml/2006/main">
-  <p:cSld>
-    <p:spTree>
-      <p:nvGrpSpPr>
-        <p:cNvPr id="1" name=""/>
-        <p:cNvGrpSpPr/>
-        <p:nvPr/>
-      </p:nvGrpSpPr>
-      <p:grpSpPr>
-        <a:xfrm>
-          <a:off x="0" y="0"/>
-          <a:ext cx="0" cy="0"/>
-          <a:chOff x="0" y="0"/>
-          <a:chExt cx="0" cy="0"/>
-        </a:xfrm>
-      </p:grpSpPr>
-      <p:sp>
-        <p:nvSpPr>
-          <p:cNvPr id="2" name="Slide Image Placeholder 1"/>
-          <p:cNvSpPr>
-            <a:spLocks noGrp="1" noRot="1" noChangeAspect="1"/>
-          </p:cNvSpPr>
-          <p:nvPr>
-            <p:ph type="sldImg"/>
-          </p:nvPr>
-        </p:nvSpPr>
-        <p:spPr/>
-      </p:sp>
-      <p:sp>
-        <p:nvSpPr>
-          <p:cNvPr id="3" name="Notes Placeholder 2"/>
-          <p:cNvSpPr>
-            <a:spLocks noGrp="1"/>
-          </p:cNvSpPr>
-          <p:nvPr>
-            <p:ph type="body" idx="1"/>
-          </p:nvPr>
-        </p:nvSpPr>
-        <p:spPr/>
-        <p:txBody>
-          <a:bodyPr/>
-          <a:lstStyle/>
-          <a:p>
-            <a:pPr marL="0" marR="0" lvl="0" indent="0" algn="l" defTabSz="914400" rtl="0" eaLnBrk="1" fontAlgn="auto" latinLnBrk="0" hangingPunct="1">
-              <a:lnSpc>
-                <a:spcPct val="100000"/>
-              </a:lnSpc>
-              <a:spcBef>
-                <a:spcPts val="0"/>
-              </a:spcBef>
-              <a:spcAft>
-                <a:spcPts val="0"/>
-              </a:spcAft>
-              <a:buClrTx/>
-              <a:buSzTx/>
-              <a:buFontTx/>
-              <a:buNone/>
-              <a:tabLst/>
-              <a:defRPr/>
-            </a:pPr>
-            <a:endParaRPr lang="en-US" dirty="0"/>
-          </a:p>
-        </p:txBody>
-      </p:sp>
-      <p:sp>
-        <p:nvSpPr>
-          <p:cNvPr id="4" name="Slide Number Placeholder 3"/>
-          <p:cNvSpPr>
-            <a:spLocks noGrp="1"/>
-          </p:cNvSpPr>
-          <p:nvPr>
-            <p:ph type="sldNum" sz="quarter" idx="5"/>
-          </p:nvPr>
-        </p:nvSpPr>
-        <p:spPr/>
-        <p:txBody>
-          <a:bodyPr/>
-          <a:lstStyle/>
-          <a:p>
-            <a:fld id="{3148858F-F1DB-4027-9C85-CCA6849540DD}" type="slidenum">
-              <a:rPr lang="en-US" smtClean="0"/>
-              <a:t>17</a:t>
-            </a:fld>
-            <a:endParaRPr lang="en-US"/>
-          </a:p>
-        </p:txBody>
-      </p:sp>
-    </p:spTree>
-    <p:extLst>
-      <p:ext uri="{BB962C8B-B14F-4D97-AF65-F5344CB8AC3E}">
-        <p14:creationId xmlns:p14="http://schemas.microsoft.com/office/powerpoint/2010/main" val="651591465"/>
-      </p:ext>
-    </p:extLst>
-  </p:cSld>
-  <p:clrMapOvr>
-    <a:masterClrMapping/>
-  </p:clrMapOvr>
-</p:notes>
-</file>
-
-<file path=ppt/notesSlides/notesSlide18.xml><?xml version="1.0" encoding="utf-8"?>
-<p:notes xmlns:a="http://schemas.openxmlformats.org/drawingml/2006/main" xmlns:r="http://schemas.openxmlformats.org/officeDocument/2006/relationships" xmlns:p="http://schemas.openxmlformats.org/presentationml/2006/main">
-  <p:cSld>
-    <p:spTree>
-      <p:nvGrpSpPr>
-        <p:cNvPr id="1" name=""/>
-        <p:cNvGrpSpPr/>
-        <p:nvPr/>
-      </p:nvGrpSpPr>
-      <p:grpSpPr>
-        <a:xfrm>
-          <a:off x="0" y="0"/>
-          <a:ext cx="0" cy="0"/>
-          <a:chOff x="0" y="0"/>
-          <a:chExt cx="0" cy="0"/>
-        </a:xfrm>
-      </p:grpSpPr>
-      <p:sp>
-        <p:nvSpPr>
-          <p:cNvPr id="2" name="Slide Image Placeholder 1"/>
-          <p:cNvSpPr>
-            <a:spLocks noGrp="1" noRot="1" noChangeAspect="1"/>
-          </p:cNvSpPr>
-          <p:nvPr>
-            <p:ph type="sldImg"/>
-          </p:nvPr>
-        </p:nvSpPr>
-        <p:spPr/>
-      </p:sp>
-      <p:sp>
-        <p:nvSpPr>
-          <p:cNvPr id="3" name="Notes Placeholder 2"/>
-          <p:cNvSpPr>
-            <a:spLocks noGrp="1"/>
-          </p:cNvSpPr>
-          <p:nvPr>
-            <p:ph type="body" idx="1"/>
-          </p:nvPr>
-        </p:nvSpPr>
-        <p:spPr/>
-        <p:txBody>
-          <a:bodyPr/>
-          <a:lstStyle/>
-          <a:p>
-            <a:pPr marL="0" marR="0" lvl="0" indent="0" algn="l" defTabSz="914400" rtl="0" eaLnBrk="1" fontAlgn="auto" latinLnBrk="0" hangingPunct="1">
-              <a:lnSpc>
-                <a:spcPct val="100000"/>
-              </a:lnSpc>
-              <a:spcBef>
-                <a:spcPts val="0"/>
-              </a:spcBef>
-              <a:spcAft>
-                <a:spcPts val="0"/>
-              </a:spcAft>
-              <a:buClrTx/>
-              <a:buSzTx/>
-              <a:buFontTx/>
-              <a:buNone/>
-              <a:tabLst/>
-              <a:defRPr/>
-            </a:pPr>
-            <a:r>
-              <a:rPr lang="en-US" dirty="0"/>
-              <a:t>Exercise 11 starts on page 30 of the textbook.  </a:t>
-            </a:r>
-          </a:p>
-          <a:p>
-            <a:pPr marL="0" marR="0" lvl="0" indent="0" algn="l" defTabSz="914400" rtl="0" eaLnBrk="1" fontAlgn="auto" latinLnBrk="0" hangingPunct="1">
-              <a:lnSpc>
-                <a:spcPct val="100000"/>
-              </a:lnSpc>
-              <a:spcBef>
-                <a:spcPts val="0"/>
-              </a:spcBef>
-              <a:spcAft>
-                <a:spcPts val="0"/>
-              </a:spcAft>
-              <a:buClrTx/>
-              <a:buSzTx/>
-              <a:buFontTx/>
-              <a:buNone/>
-              <a:tabLst/>
-              <a:defRPr/>
-            </a:pPr>
-            <a:r>
-              <a:rPr lang="en-US" dirty="0"/>
-              <a:t>Exercise 12 starts on page 31 of the textbook.  </a:t>
-            </a:r>
-          </a:p>
-          <a:p>
-            <a:pPr marL="0" marR="0" lvl="0" indent="0" algn="l" defTabSz="914400" rtl="0" eaLnBrk="1" fontAlgn="auto" latinLnBrk="0" hangingPunct="1">
-              <a:lnSpc>
-                <a:spcPct val="100000"/>
-              </a:lnSpc>
-              <a:spcBef>
-                <a:spcPts val="0"/>
-              </a:spcBef>
-              <a:spcAft>
-                <a:spcPts val="0"/>
-              </a:spcAft>
-              <a:buClrTx/>
-              <a:buSzTx/>
-              <a:buFontTx/>
-              <a:buNone/>
-              <a:tabLst/>
-              <a:defRPr/>
-            </a:pPr>
-            <a:endParaRPr lang="en-US" dirty="0"/>
-          </a:p>
-        </p:txBody>
-      </p:sp>
-      <p:sp>
-        <p:nvSpPr>
-          <p:cNvPr id="4" name="Slide Number Placeholder 3"/>
-          <p:cNvSpPr>
-            <a:spLocks noGrp="1"/>
-          </p:cNvSpPr>
-          <p:nvPr>
-            <p:ph type="sldNum" sz="quarter" idx="5"/>
-          </p:nvPr>
-        </p:nvSpPr>
-        <p:spPr/>
-        <p:txBody>
-          <a:bodyPr/>
-          <a:lstStyle/>
-          <a:p>
-            <a:fld id="{3148858F-F1DB-4027-9C85-CCA6849540DD}" type="slidenum">
-              <a:rPr lang="en-US" smtClean="0"/>
-              <a:t>18</a:t>
-            </a:fld>
-            <a:endParaRPr lang="en-US"/>
-          </a:p>
-        </p:txBody>
-      </p:sp>
-    </p:spTree>
-    <p:extLst>
-      <p:ext uri="{BB962C8B-B14F-4D97-AF65-F5344CB8AC3E}">
-        <p14:creationId xmlns:p14="http://schemas.microsoft.com/office/powerpoint/2010/main" val="2297496708"/>
-      </p:ext>
-    </p:extLst>
-  </p:cSld>
-  <p:clrMapOvr>
-    <a:masterClrMapping/>
-  </p:clrMapOvr>
-</p:notes>
-</file>
-
-<file path=ppt/notesSlides/notesSlide19.xml><?xml version="1.0" encoding="utf-8"?>
-<p:notes xmlns:a="http://schemas.openxmlformats.org/drawingml/2006/main" xmlns:r="http://schemas.openxmlformats.org/officeDocument/2006/relationships" xmlns:p="http://schemas.openxmlformats.org/presentationml/2006/main">
-  <p:cSld>
-    <p:spTree>
-      <p:nvGrpSpPr>
-        <p:cNvPr id="1" name=""/>
-        <p:cNvGrpSpPr/>
-        <p:nvPr/>
-      </p:nvGrpSpPr>
-      <p:grpSpPr>
-        <a:xfrm>
-          <a:off x="0" y="0"/>
-          <a:ext cx="0" cy="0"/>
-          <a:chOff x="0" y="0"/>
-          <a:chExt cx="0" cy="0"/>
-        </a:xfrm>
-      </p:grpSpPr>
-      <p:sp>
-        <p:nvSpPr>
-          <p:cNvPr id="2" name="Slide Image Placeholder 1"/>
-          <p:cNvSpPr>
-            <a:spLocks noGrp="1" noRot="1" noChangeAspect="1"/>
-          </p:cNvSpPr>
-          <p:nvPr>
-            <p:ph type="sldImg"/>
-          </p:nvPr>
-        </p:nvSpPr>
-        <p:spPr/>
-      </p:sp>
-      <p:sp>
-        <p:nvSpPr>
-          <p:cNvPr id="3" name="Notes Placeholder 2"/>
-          <p:cNvSpPr>
-            <a:spLocks noGrp="1"/>
-          </p:cNvSpPr>
-          <p:nvPr>
-            <p:ph type="body" idx="1"/>
-          </p:nvPr>
-        </p:nvSpPr>
-        <p:spPr/>
-        <p:txBody>
-          <a:bodyPr/>
-          <a:lstStyle/>
-          <a:p>
-            <a:pPr marL="0" marR="0" lvl="0" indent="0" algn="l" defTabSz="914400" rtl="0" eaLnBrk="1" fontAlgn="auto" latinLnBrk="0" hangingPunct="1">
-              <a:lnSpc>
-                <a:spcPct val="100000"/>
-              </a:lnSpc>
-              <a:spcBef>
-                <a:spcPts val="0"/>
-              </a:spcBef>
-              <a:spcAft>
-                <a:spcPts val="0"/>
-              </a:spcAft>
-              <a:buClrTx/>
-              <a:buSzTx/>
-              <a:buFontTx/>
-              <a:buNone/>
-              <a:tabLst/>
-              <a:defRPr/>
-            </a:pPr>
-            <a:endParaRPr lang="en-US" dirty="0"/>
-          </a:p>
-        </p:txBody>
-      </p:sp>
-      <p:sp>
-        <p:nvSpPr>
-          <p:cNvPr id="4" name="Slide Number Placeholder 3"/>
-          <p:cNvSpPr>
-            <a:spLocks noGrp="1"/>
-          </p:cNvSpPr>
-          <p:nvPr>
-            <p:ph type="sldNum" sz="quarter" idx="5"/>
-          </p:nvPr>
-        </p:nvSpPr>
-        <p:spPr/>
-        <p:txBody>
-          <a:bodyPr/>
-          <a:lstStyle/>
-          <a:p>
-            <a:fld id="{3148858F-F1DB-4027-9C85-CCA6849540DD}" type="slidenum">
-              <a:rPr lang="en-US" smtClean="0"/>
-              <a:t>19</a:t>
-            </a:fld>
-            <a:endParaRPr lang="en-US"/>
-          </a:p>
-        </p:txBody>
-      </p:sp>
-    </p:spTree>
-    <p:extLst>
-      <p:ext uri="{BB962C8B-B14F-4D97-AF65-F5344CB8AC3E}">
-        <p14:creationId xmlns:p14="http://schemas.microsoft.com/office/powerpoint/2010/main" val="3503786216"/>
+        <p14:creationId xmlns:p14="http://schemas.microsoft.com/office/powerpoint/2010/main" val="2558055240"/>
       </p:ext>
     </p:extLst>
   </p:cSld>
@@ -1889,110 +1256,6 @@
 </p:notes>
 </file>
 
-<file path=ppt/notesSlides/notesSlide20.xml><?xml version="1.0" encoding="utf-8"?>
-<p:notes xmlns:a="http://schemas.openxmlformats.org/drawingml/2006/main" xmlns:r="http://schemas.openxmlformats.org/officeDocument/2006/relationships" xmlns:p="http://schemas.openxmlformats.org/presentationml/2006/main">
-  <p:cSld>
-    <p:spTree>
-      <p:nvGrpSpPr>
-        <p:cNvPr id="1" name=""/>
-        <p:cNvGrpSpPr/>
-        <p:nvPr/>
-      </p:nvGrpSpPr>
-      <p:grpSpPr>
-        <a:xfrm>
-          <a:off x="0" y="0"/>
-          <a:ext cx="0" cy="0"/>
-          <a:chOff x="0" y="0"/>
-          <a:chExt cx="0" cy="0"/>
-        </a:xfrm>
-      </p:grpSpPr>
-      <p:sp>
-        <p:nvSpPr>
-          <p:cNvPr id="2" name="Slide Image Placeholder 1"/>
-          <p:cNvSpPr>
-            <a:spLocks noGrp="1" noRot="1" noChangeAspect="1"/>
-          </p:cNvSpPr>
-          <p:nvPr>
-            <p:ph type="sldImg"/>
-          </p:nvPr>
-        </p:nvSpPr>
-        <p:spPr/>
-      </p:sp>
-      <p:sp>
-        <p:nvSpPr>
-          <p:cNvPr id="3" name="Notes Placeholder 2"/>
-          <p:cNvSpPr>
-            <a:spLocks noGrp="1"/>
-          </p:cNvSpPr>
-          <p:nvPr>
-            <p:ph type="body" idx="1"/>
-          </p:nvPr>
-        </p:nvSpPr>
-        <p:spPr/>
-        <p:txBody>
-          <a:bodyPr/>
-          <a:lstStyle/>
-          <a:p>
-            <a:pPr marL="0" marR="0" lvl="0" indent="0" algn="l" defTabSz="914400" rtl="0" eaLnBrk="1" fontAlgn="auto" latinLnBrk="0" hangingPunct="1">
-              <a:lnSpc>
-                <a:spcPct val="100000"/>
-              </a:lnSpc>
-              <a:spcBef>
-                <a:spcPts val="0"/>
-              </a:spcBef>
-              <a:spcAft>
-                <a:spcPts val="0"/>
-              </a:spcAft>
-              <a:buClrTx/>
-              <a:buSzTx/>
-              <a:buFontTx/>
-              <a:buNone/>
-              <a:tabLst/>
-              <a:defRPr/>
-            </a:pPr>
-            <a:r>
-              <a:rPr lang="en-US" dirty="0"/>
-              <a:t>Interpreted languages are much slower than compiled languages.  When performance matters, an interpreted language may not be the best solution.  If that’s the case with you, Nvidia provides the Cuda development environment which supports the C and C++ languages.  These are compiled languages as opposed to interpreted. </a:t>
-            </a:r>
-          </a:p>
-        </p:txBody>
-      </p:sp>
-      <p:sp>
-        <p:nvSpPr>
-          <p:cNvPr id="4" name="Slide Number Placeholder 3"/>
-          <p:cNvSpPr>
-            <a:spLocks noGrp="1"/>
-          </p:cNvSpPr>
-          <p:nvPr>
-            <p:ph type="sldNum" sz="quarter" idx="5"/>
-          </p:nvPr>
-        </p:nvSpPr>
-        <p:spPr/>
-        <p:txBody>
-          <a:bodyPr/>
-          <a:lstStyle/>
-          <a:p>
-            <a:fld id="{3148858F-F1DB-4027-9C85-CCA6849540DD}" type="slidenum">
-              <a:rPr lang="en-US" smtClean="0"/>
-              <a:t>20</a:t>
-            </a:fld>
-            <a:endParaRPr lang="en-US"/>
-          </a:p>
-        </p:txBody>
-      </p:sp>
-    </p:spTree>
-    <p:extLst>
-      <p:ext uri="{BB962C8B-B14F-4D97-AF65-F5344CB8AC3E}">
-        <p14:creationId xmlns:p14="http://schemas.microsoft.com/office/powerpoint/2010/main" val="4129922841"/>
-      </p:ext>
-    </p:extLst>
-  </p:cSld>
-  <p:clrMapOvr>
-    <a:masterClrMapping/>
-  </p:clrMapOvr>
-</p:notes>
-</file>
-
 <file path=ppt/notesSlides/notesSlide3.xml><?xml version="1.0" encoding="utf-8"?>
 <p:notes xmlns:a="http://schemas.openxmlformats.org/drawingml/2006/main" xmlns:r="http://schemas.openxmlformats.org/officeDocument/2006/relationships" xmlns:p="http://schemas.openxmlformats.org/presentationml/2006/main">
   <p:cSld>
@@ -2037,27 +1300,7 @@
           <a:bodyPr/>
           <a:lstStyle/>
           <a:p>
-            <a:pPr marL="0" marR="0" lvl="0" indent="0" algn="l" defTabSz="914400" rtl="0" eaLnBrk="1" fontAlgn="auto" latinLnBrk="0" hangingPunct="1">
-              <a:lnSpc>
-                <a:spcPct val="100000"/>
-              </a:lnSpc>
-              <a:spcBef>
-                <a:spcPts val="0"/>
-              </a:spcBef>
-              <a:spcAft>
-                <a:spcPts val="0"/>
-              </a:spcAft>
-              <a:buClrTx/>
-              <a:buSzTx/>
-              <a:buFontTx/>
-              <a:buNone/>
-              <a:tabLst/>
-              <a:defRPr/>
-            </a:pPr>
-            <a:r>
-              <a:rPr lang="en-US" dirty="0"/>
-              <a:t>Setup Instructions…</a:t>
-            </a:r>
+            <a:endParaRPr lang="en-US" dirty="0"/>
           </a:p>
         </p:txBody>
       </p:sp>
@@ -2087,7 +1330,7 @@
     </p:spTree>
     <p:extLst>
       <p:ext uri="{BB962C8B-B14F-4D97-AF65-F5344CB8AC3E}">
-        <p14:creationId xmlns:p14="http://schemas.microsoft.com/office/powerpoint/2010/main" val="1279646560"/>
+        <p14:creationId xmlns:p14="http://schemas.microsoft.com/office/powerpoint/2010/main" val="1218542571"/>
       </p:ext>
     </p:extLst>
   </p:cSld>
@@ -3181,7 +2424,10 @@
               <a:tabLst/>
               <a:defRPr/>
             </a:pPr>
-            <a:endParaRPr lang="en-US" dirty="0"/>
+            <a:r>
+              <a:rPr lang="en-US" dirty="0"/>
+              <a:t>Setup Instructions…</a:t>
+            </a:r>
           </a:p>
         </p:txBody>
       </p:sp>
@@ -3211,7 +2457,7 @@
     </p:spTree>
     <p:extLst>
       <p:ext uri="{BB962C8B-B14F-4D97-AF65-F5344CB8AC3E}">
-        <p14:creationId xmlns:p14="http://schemas.microsoft.com/office/powerpoint/2010/main" val="4054386845"/>
+        <p14:creationId xmlns:p14="http://schemas.microsoft.com/office/powerpoint/2010/main" val="1279646560"/>
       </p:ext>
     </p:extLst>
   </p:cSld>
@@ -3282,10 +2528,7 @@
               <a:tabLst/>
               <a:defRPr/>
             </a:pPr>
-            <a:r>
-              <a:rPr lang="en-US" dirty="0"/>
-              <a:t>Exercise 1 starts on page 9 of the textbook.  </a:t>
-            </a:r>
+            <a:endParaRPr lang="en-US" dirty="0"/>
           </a:p>
         </p:txBody>
       </p:sp>
@@ -3315,7 +2558,7 @@
     </p:spTree>
     <p:extLst>
       <p:ext uri="{BB962C8B-B14F-4D97-AF65-F5344CB8AC3E}">
-        <p14:creationId xmlns:p14="http://schemas.microsoft.com/office/powerpoint/2010/main" val="1985664105"/>
+        <p14:creationId xmlns:p14="http://schemas.microsoft.com/office/powerpoint/2010/main" val="4054386845"/>
       </p:ext>
     </p:extLst>
   </p:cSld>
@@ -3655,51 +2898,8 @@
             </a:pPr>
             <a:r>
               <a:rPr lang="en-US" dirty="0"/>
-              <a:t>Exercise 2 starts on page 10 of the textbook.  </a:t>
-            </a:r>
-          </a:p>
-          <a:p>
-            <a:pPr marL="0" marR="0" lvl="0" indent="0" algn="l" defTabSz="914400" rtl="0" eaLnBrk="1" fontAlgn="auto" latinLnBrk="0" hangingPunct="1">
-              <a:lnSpc>
-                <a:spcPct val="100000"/>
-              </a:lnSpc>
-              <a:spcBef>
-                <a:spcPts val="0"/>
-              </a:spcBef>
-              <a:spcAft>
-                <a:spcPts val="0"/>
-              </a:spcAft>
-              <a:buClrTx/>
-              <a:buSzTx/>
-              <a:buFontTx/>
-              <a:buNone/>
-              <a:tabLst/>
-              <a:defRPr/>
-            </a:pPr>
-            <a:r>
-              <a:rPr lang="en-US" dirty="0"/>
-              <a:t>Exercise 3 starts on page 13 of the textbook.  </a:t>
-            </a:r>
-          </a:p>
-          <a:p>
-            <a:pPr marL="0" marR="0" lvl="0" indent="0" algn="l" defTabSz="914400" rtl="0" eaLnBrk="1" fontAlgn="auto" latinLnBrk="0" hangingPunct="1">
-              <a:lnSpc>
-                <a:spcPct val="100000"/>
-              </a:lnSpc>
-              <a:spcBef>
-                <a:spcPts val="0"/>
-              </a:spcBef>
-              <a:spcAft>
-                <a:spcPts val="0"/>
-              </a:spcAft>
-              <a:buClrTx/>
-              <a:buSzTx/>
-              <a:buFontTx/>
-              <a:buNone/>
-              <a:tabLst/>
-              <a:defRPr/>
-            </a:pPr>
-            <a:endParaRPr lang="en-US" dirty="0"/>
+              <a:t>Adam naming the animals in the Biblical story.  Variable naming and standards are critically important.</a:t>
+            </a:r>
           </a:p>
         </p:txBody>
       </p:sp>
@@ -3729,7 +2929,7 @@
     </p:spTree>
     <p:extLst>
       <p:ext uri="{BB962C8B-B14F-4D97-AF65-F5344CB8AC3E}">
-        <p14:creationId xmlns:p14="http://schemas.microsoft.com/office/powerpoint/2010/main" val="880453606"/>
+        <p14:creationId xmlns:p14="http://schemas.microsoft.com/office/powerpoint/2010/main" val="828379136"/>
       </p:ext>
     </p:extLst>
   </p:cSld>
@@ -3886,7 +3086,7 @@
           <a:p>
             <a:fld id="{C3F78080-8D0A-4BE8-A5B4-CB115102D524}" type="datetimeFigureOut">
               <a:rPr lang="en-US" smtClean="0"/>
-              <a:t>2/7/2022</a:t>
+              <a:t>6/1/2022</a:t>
             </a:fld>
             <a:endParaRPr lang="en-US"/>
           </a:p>
@@ -4084,7 +3284,7 @@
           <a:p>
             <a:fld id="{C3F78080-8D0A-4BE8-A5B4-CB115102D524}" type="datetimeFigureOut">
               <a:rPr lang="en-US" smtClean="0"/>
-              <a:t>2/7/2022</a:t>
+              <a:t>6/1/2022</a:t>
             </a:fld>
             <a:endParaRPr lang="en-US"/>
           </a:p>
@@ -4292,7 +3492,7 @@
           <a:p>
             <a:fld id="{C3F78080-8D0A-4BE8-A5B4-CB115102D524}" type="datetimeFigureOut">
               <a:rPr lang="en-US" smtClean="0"/>
-              <a:t>2/7/2022</a:t>
+              <a:t>6/1/2022</a:t>
             </a:fld>
             <a:endParaRPr lang="en-US"/>
           </a:p>
@@ -4490,7 +3690,7 @@
           <a:p>
             <a:fld id="{C3F78080-8D0A-4BE8-A5B4-CB115102D524}" type="datetimeFigureOut">
               <a:rPr lang="en-US" smtClean="0"/>
-              <a:t>2/7/2022</a:t>
+              <a:t>6/1/2022</a:t>
             </a:fld>
             <a:endParaRPr lang="en-US"/>
           </a:p>
@@ -4765,7 +3965,7 @@
           <a:p>
             <a:fld id="{C3F78080-8D0A-4BE8-A5B4-CB115102D524}" type="datetimeFigureOut">
               <a:rPr lang="en-US" smtClean="0"/>
-              <a:t>2/7/2022</a:t>
+              <a:t>6/1/2022</a:t>
             </a:fld>
             <a:endParaRPr lang="en-US"/>
           </a:p>
@@ -5030,7 +4230,7 @@
           <a:p>
             <a:fld id="{C3F78080-8D0A-4BE8-A5B4-CB115102D524}" type="datetimeFigureOut">
               <a:rPr lang="en-US" smtClean="0"/>
-              <a:t>2/7/2022</a:t>
+              <a:t>6/1/2022</a:t>
             </a:fld>
             <a:endParaRPr lang="en-US"/>
           </a:p>
@@ -5442,7 +4642,7 @@
           <a:p>
             <a:fld id="{C3F78080-8D0A-4BE8-A5B4-CB115102D524}" type="datetimeFigureOut">
               <a:rPr lang="en-US" smtClean="0"/>
-              <a:t>2/7/2022</a:t>
+              <a:t>6/1/2022</a:t>
             </a:fld>
             <a:endParaRPr lang="en-US"/>
           </a:p>
@@ -5583,7 +4783,7 @@
           <a:p>
             <a:fld id="{C3F78080-8D0A-4BE8-A5B4-CB115102D524}" type="datetimeFigureOut">
               <a:rPr lang="en-US" smtClean="0"/>
-              <a:t>2/7/2022</a:t>
+              <a:t>6/1/2022</a:t>
             </a:fld>
             <a:endParaRPr lang="en-US"/>
           </a:p>
@@ -5696,7 +4896,7 @@
           <a:p>
             <a:fld id="{C3F78080-8D0A-4BE8-A5B4-CB115102D524}" type="datetimeFigureOut">
               <a:rPr lang="en-US" smtClean="0"/>
-              <a:t>2/7/2022</a:t>
+              <a:t>6/1/2022</a:t>
             </a:fld>
             <a:endParaRPr lang="en-US"/>
           </a:p>
@@ -6007,7 +5207,7 @@
           <a:p>
             <a:fld id="{C3F78080-8D0A-4BE8-A5B4-CB115102D524}" type="datetimeFigureOut">
               <a:rPr lang="en-US" smtClean="0"/>
-              <a:t>2/7/2022</a:t>
+              <a:t>6/1/2022</a:t>
             </a:fld>
             <a:endParaRPr lang="en-US"/>
           </a:p>
@@ -6295,7 +5495,7 @@
           <a:p>
             <a:fld id="{C3F78080-8D0A-4BE8-A5B4-CB115102D524}" type="datetimeFigureOut">
               <a:rPr lang="en-US" smtClean="0"/>
-              <a:t>2/7/2022</a:t>
+              <a:t>6/1/2022</a:t>
             </a:fld>
             <a:endParaRPr lang="en-US"/>
           </a:p>
@@ -6536,7 +5736,7 @@
           <a:p>
             <a:fld id="{C3F78080-8D0A-4BE8-A5B4-CB115102D524}" type="datetimeFigureOut">
               <a:rPr lang="en-US" smtClean="0"/>
-              <a:t>2/7/2022</a:t>
+              <a:t>6/1/2022</a:t>
             </a:fld>
             <a:endParaRPr lang="en-US"/>
           </a:p>
@@ -7069,422 +6269,6 @@
       </p:grpSpPr>
       <p:pic>
         <p:nvPicPr>
-          <p:cNvPr id="2050" name="Picture 2" descr="Icon of Adam Naming the Animals - 15th c. Meteora - (1AA10) - Uncut  Mountain Supply">
-            <a:extLst>
-              <a:ext uri="{FF2B5EF4-FFF2-40B4-BE49-F238E27FC236}">
-                <a16:creationId xmlns:a16="http://schemas.microsoft.com/office/drawing/2014/main" id="{A8A604AE-38F9-4BA8-858C-E33429DF7680}"/>
-              </a:ext>
-            </a:extLst>
-          </p:cNvPr>
-          <p:cNvPicPr>
-            <a:picLocks noChangeAspect="1" noChangeArrowheads="1"/>
-          </p:cNvPicPr>
-          <p:nvPr/>
-        </p:nvPicPr>
-        <p:blipFill>
-          <a:blip r:embed="rId3">
-            <a:extLst>
-              <a:ext uri="{28A0092B-C50C-407E-A947-70E740481C1C}">
-                <a14:useLocalDpi xmlns:a14="http://schemas.microsoft.com/office/drawing/2010/main" val="0"/>
-              </a:ext>
-            </a:extLst>
-          </a:blip>
-          <a:srcRect/>
-          <a:stretch>
-            <a:fillRect/>
-          </a:stretch>
-        </p:blipFill>
-        <p:spPr bwMode="auto">
-          <a:xfrm>
-            <a:off x="2785598" y="1290062"/>
-            <a:ext cx="6620804" cy="4277875"/>
-          </a:xfrm>
-          <a:prstGeom prst="rect">
-            <a:avLst/>
-          </a:prstGeom>
-          <a:noFill/>
-          <a:ln w="3175">
-            <a:solidFill>
-              <a:schemeClr val="tx1">
-                <a:lumMod val="75000"/>
-                <a:lumOff val="25000"/>
-              </a:schemeClr>
-            </a:solidFill>
-          </a:ln>
-          <a:effectLst>
-            <a:outerShdw blurRad="50800" dist="38100" dir="2700000" algn="tl" rotWithShape="0">
-              <a:prstClr val="black">
-                <a:alpha val="40000"/>
-              </a:prstClr>
-            </a:outerShdw>
-          </a:effectLst>
-          <a:extLst>
-            <a:ext uri="{909E8E84-426E-40DD-AFC4-6F175D3DCCD1}">
-              <a14:hiddenFill xmlns:a14="http://schemas.microsoft.com/office/drawing/2010/main">
-                <a:solidFill>
-                  <a:srgbClr val="FFFFFF"/>
-                </a:solidFill>
-              </a14:hiddenFill>
-            </a:ext>
-          </a:extLst>
-        </p:spPr>
-      </p:pic>
-      <p:sp>
-        <p:nvSpPr>
-          <p:cNvPr id="6" name="TextBox 5">
-            <a:extLst>
-              <a:ext uri="{FF2B5EF4-FFF2-40B4-BE49-F238E27FC236}">
-                <a16:creationId xmlns:a16="http://schemas.microsoft.com/office/drawing/2014/main" id="{29F3E589-6F1A-4BB3-B969-F58FCA3DE9E0}"/>
-              </a:ext>
-            </a:extLst>
-          </p:cNvPr>
-          <p:cNvSpPr txBox="1"/>
-          <p:nvPr/>
-        </p:nvSpPr>
-        <p:spPr>
-          <a:xfrm>
-            <a:off x="0" y="6550223"/>
-            <a:ext cx="12192000" cy="307777"/>
-          </a:xfrm>
-          <a:prstGeom prst="rect">
-            <a:avLst/>
-          </a:prstGeom>
-          <a:noFill/>
-        </p:spPr>
-        <p:txBody>
-          <a:bodyPr wrap="square" rtlCol="0">
-            <a:spAutoFit/>
-          </a:bodyPr>
-          <a:lstStyle/>
-          <a:p>
-            <a:r>
-              <a:rPr lang="en-US" sz="1400" dirty="0">
-                <a:solidFill>
-                  <a:schemeClr val="tx1">
-                    <a:lumMod val="65000"/>
-                    <a:lumOff val="35000"/>
-                  </a:schemeClr>
-                </a:solidFill>
-                <a:latin typeface="+mj-lt"/>
-                <a:ea typeface="Verdana" panose="020B0604030504040204" pitchFamily="34" charset="0"/>
-              </a:rPr>
-              <a:t>Image Credit: </a:t>
-            </a:r>
-            <a:r>
-              <a:rPr lang="en-US" sz="1400" dirty="0">
-                <a:solidFill>
-                  <a:schemeClr val="tx1">
-                    <a:lumMod val="65000"/>
-                    <a:lumOff val="35000"/>
-                  </a:schemeClr>
-                </a:solidFill>
-                <a:latin typeface="+mj-lt"/>
-              </a:rPr>
-              <a:t>https://www.uncutmountainsupply.com/icons/of-saints/by-name/a/icon-of-adam-naming-the-animals-15th-c-meteora-1aa10/</a:t>
-            </a:r>
-            <a:endParaRPr lang="en-US" sz="1400" dirty="0">
-              <a:solidFill>
-                <a:schemeClr val="tx1">
-                  <a:lumMod val="65000"/>
-                  <a:lumOff val="35000"/>
-                </a:schemeClr>
-              </a:solidFill>
-              <a:latin typeface="+mj-lt"/>
-              <a:ea typeface="Verdana" panose="020B0604030504040204" pitchFamily="34" charset="0"/>
-            </a:endParaRPr>
-          </a:p>
-        </p:txBody>
-      </p:sp>
-    </p:spTree>
-    <p:extLst>
-      <p:ext uri="{BB962C8B-B14F-4D97-AF65-F5344CB8AC3E}">
-        <p14:creationId xmlns:p14="http://schemas.microsoft.com/office/powerpoint/2010/main" val="4083169647"/>
-      </p:ext>
-    </p:extLst>
-  </p:cSld>
-  <p:clrMapOvr>
-    <a:masterClrMapping/>
-  </p:clrMapOvr>
-  <mc:AlternateContent xmlns:mc="http://schemas.openxmlformats.org/markup-compatibility/2006" xmlns:p14="http://schemas.microsoft.com/office/powerpoint/2010/main">
-    <mc:Choice Requires="p14">
-      <p:transition spd="med" p14:dur="700">
-        <p:fade/>
-      </p:transition>
-    </mc:Choice>
-    <mc:Fallback xmlns="">
-      <p:transition spd="med">
-        <p:fade/>
-      </p:transition>
-    </mc:Fallback>
-  </mc:AlternateContent>
-</p:sld>
-</file>
-
-<file path=ppt/slides/slide11.xml><?xml version="1.0" encoding="utf-8"?>
-<p:sld xmlns:a="http://schemas.openxmlformats.org/drawingml/2006/main" xmlns:r="http://schemas.openxmlformats.org/officeDocument/2006/relationships" xmlns:p="http://schemas.openxmlformats.org/presentationml/2006/main">
-  <p:cSld>
-    <p:spTree>
-      <p:nvGrpSpPr>
-        <p:cNvPr id="1" name=""/>
-        <p:cNvGrpSpPr/>
-        <p:nvPr/>
-      </p:nvGrpSpPr>
-      <p:grpSpPr>
-        <a:xfrm>
-          <a:off x="0" y="0"/>
-          <a:ext cx="0" cy="0"/>
-          <a:chOff x="0" y="0"/>
-          <a:chExt cx="0" cy="0"/>
-        </a:xfrm>
-      </p:grpSpPr>
-      <p:sp>
-        <p:nvSpPr>
-          <p:cNvPr id="4" name="Title 3">
-            <a:extLst>
-              <a:ext uri="{FF2B5EF4-FFF2-40B4-BE49-F238E27FC236}">
-                <a16:creationId xmlns:a16="http://schemas.microsoft.com/office/drawing/2014/main" id="{A022B8E0-DD9C-49D7-82FB-ACD3443312AF}"/>
-              </a:ext>
-            </a:extLst>
-          </p:cNvPr>
-          <p:cNvSpPr>
-            <a:spLocks noGrp="1"/>
-          </p:cNvSpPr>
-          <p:nvPr>
-            <p:ph type="title"/>
-          </p:nvPr>
-        </p:nvSpPr>
-        <p:spPr>
-          <a:xfrm>
-            <a:off x="0" y="2766219"/>
-            <a:ext cx="12192000" cy="805144"/>
-          </a:xfrm>
-        </p:spPr>
-        <p:txBody>
-          <a:bodyPr/>
-          <a:lstStyle/>
-          <a:p>
-            <a:r>
-              <a:rPr lang="en-US" sz="4400" dirty="0">
-                <a:solidFill>
-                  <a:schemeClr val="tx1">
-                    <a:lumMod val="65000"/>
-                    <a:lumOff val="35000"/>
-                  </a:schemeClr>
-                </a:solidFill>
-                <a:latin typeface="Palatino Linotype" panose="02040502050505030304" pitchFamily="18" charset="0"/>
-              </a:rPr>
-              <a:t>			4: Variable Names</a:t>
-            </a:r>
-            <a:endParaRPr lang="en-US" dirty="0">
-              <a:solidFill>
-                <a:schemeClr val="tx1">
-                  <a:lumMod val="65000"/>
-                  <a:lumOff val="35000"/>
-                </a:schemeClr>
-              </a:solidFill>
-              <a:latin typeface="Palatino Linotype" panose="02040502050505030304" pitchFamily="18" charset="0"/>
-            </a:endParaRPr>
-          </a:p>
-        </p:txBody>
-      </p:sp>
-      <p:pic>
-        <p:nvPicPr>
-          <p:cNvPr id="3" name="Picture 2">
-            <a:extLst>
-              <a:ext uri="{FF2B5EF4-FFF2-40B4-BE49-F238E27FC236}">
-                <a16:creationId xmlns:a16="http://schemas.microsoft.com/office/drawing/2014/main" id="{CF9CAFA8-A58C-4D72-8C05-EEBBF12A1B0F}"/>
-              </a:ext>
-            </a:extLst>
-          </p:cNvPr>
-          <p:cNvPicPr>
-            <a:picLocks noChangeAspect="1"/>
-          </p:cNvPicPr>
-          <p:nvPr/>
-        </p:nvPicPr>
-        <p:blipFill>
-          <a:blip r:embed="rId3"/>
-          <a:stretch>
-            <a:fillRect/>
-          </a:stretch>
-        </p:blipFill>
-        <p:spPr>
-          <a:xfrm>
-            <a:off x="0" y="365760"/>
-            <a:ext cx="3233668" cy="805144"/>
-          </a:xfrm>
-          <a:prstGeom prst="rect">
-            <a:avLst/>
-          </a:prstGeom>
-        </p:spPr>
-      </p:pic>
-      <p:sp>
-        <p:nvSpPr>
-          <p:cNvPr id="5" name="Title 3">
-            <a:extLst>
-              <a:ext uri="{FF2B5EF4-FFF2-40B4-BE49-F238E27FC236}">
-                <a16:creationId xmlns:a16="http://schemas.microsoft.com/office/drawing/2014/main" id="{31B605CB-D775-4707-9AD1-C75F78D99E2A}"/>
-              </a:ext>
-            </a:extLst>
-          </p:cNvPr>
-          <p:cNvSpPr txBox="1">
-            <a:spLocks/>
-          </p:cNvSpPr>
-          <p:nvPr/>
-        </p:nvSpPr>
-        <p:spPr>
-          <a:xfrm>
-            <a:off x="1" y="3675535"/>
-            <a:ext cx="12192000" cy="805144"/>
-          </a:xfrm>
-          <a:prstGeom prst="rect">
-            <a:avLst/>
-          </a:prstGeom>
-        </p:spPr>
-        <p:txBody>
-          <a:bodyPr vert="horz" lIns="91440" tIns="45720" rIns="91440" bIns="45720" rtlCol="0" anchor="ctr">
-            <a:normAutofit/>
-          </a:bodyPr>
-          <a:lstStyle>
-            <a:lvl1pPr algn="l" defTabSz="914400" rtl="0" eaLnBrk="1" latinLnBrk="0" hangingPunct="1">
-              <a:lnSpc>
-                <a:spcPct val="90000"/>
-              </a:lnSpc>
-              <a:spcBef>
-                <a:spcPct val="0"/>
-              </a:spcBef>
-              <a:buNone/>
-              <a:defRPr sz="4400" kern="1200">
-                <a:solidFill>
-                  <a:schemeClr val="tx1"/>
-                </a:solidFill>
-                <a:latin typeface="+mj-lt"/>
-                <a:ea typeface="+mj-ea"/>
-                <a:cs typeface="+mj-cs"/>
-              </a:defRPr>
-            </a:lvl1pPr>
-          </a:lstStyle>
-          <a:p>
-            <a:r>
-              <a:rPr lang="en-US" dirty="0">
-                <a:solidFill>
-                  <a:schemeClr val="tx1">
-                    <a:lumMod val="65000"/>
-                    <a:lumOff val="35000"/>
-                  </a:schemeClr>
-                </a:solidFill>
-                <a:latin typeface="Palatino Linotype" panose="02040502050505030304" pitchFamily="18" charset="0"/>
-              </a:rPr>
-              <a:t>			5: Multiple Variables</a:t>
-            </a:r>
-          </a:p>
-        </p:txBody>
-      </p:sp>
-      <p:sp>
-        <p:nvSpPr>
-          <p:cNvPr id="6" name="Title 3">
-            <a:extLst>
-              <a:ext uri="{FF2B5EF4-FFF2-40B4-BE49-F238E27FC236}">
-                <a16:creationId xmlns:a16="http://schemas.microsoft.com/office/drawing/2014/main" id="{2A3FA6CF-AE89-44ED-B4E8-8BF8DEC367F0}"/>
-              </a:ext>
-            </a:extLst>
-          </p:cNvPr>
-          <p:cNvSpPr txBox="1">
-            <a:spLocks/>
-          </p:cNvSpPr>
-          <p:nvPr/>
-        </p:nvSpPr>
-        <p:spPr>
-          <a:xfrm>
-            <a:off x="0" y="4480679"/>
-            <a:ext cx="12192000" cy="909317"/>
-          </a:xfrm>
-          <a:prstGeom prst="rect">
-            <a:avLst/>
-          </a:prstGeom>
-        </p:spPr>
-        <p:txBody>
-          <a:bodyPr vert="horz" lIns="91440" tIns="45720" rIns="91440" bIns="45720" rtlCol="0" anchor="ctr">
-            <a:normAutofit/>
-          </a:bodyPr>
-          <a:lstStyle>
-            <a:lvl1pPr algn="l" defTabSz="914400" rtl="0" eaLnBrk="1" latinLnBrk="0" hangingPunct="1">
-              <a:lnSpc>
-                <a:spcPct val="90000"/>
-              </a:lnSpc>
-              <a:spcBef>
-                <a:spcPct val="0"/>
-              </a:spcBef>
-              <a:buNone/>
-              <a:defRPr sz="4400" kern="1200">
-                <a:solidFill>
-                  <a:schemeClr val="tx1"/>
-                </a:solidFill>
-                <a:latin typeface="+mj-lt"/>
-                <a:ea typeface="+mj-ea"/>
-                <a:cs typeface="+mj-cs"/>
-              </a:defRPr>
-            </a:lvl1pPr>
-          </a:lstStyle>
-          <a:p>
-            <a:r>
-              <a:rPr lang="en-US" dirty="0">
-                <a:solidFill>
-                  <a:schemeClr val="tx1">
-                    <a:lumMod val="65000"/>
-                    <a:lumOff val="35000"/>
-                  </a:schemeClr>
-                </a:solidFill>
-                <a:latin typeface="Palatino Linotype" panose="02040502050505030304" pitchFamily="18" charset="0"/>
-              </a:rPr>
-              <a:t>			6: Comments</a:t>
-            </a:r>
-          </a:p>
-        </p:txBody>
-      </p:sp>
-    </p:spTree>
-    <p:extLst>
-      <p:ext uri="{BB962C8B-B14F-4D97-AF65-F5344CB8AC3E}">
-        <p14:creationId xmlns:p14="http://schemas.microsoft.com/office/powerpoint/2010/main" val="3151510691"/>
-      </p:ext>
-    </p:extLst>
-  </p:cSld>
-  <p:clrMapOvr>
-    <a:masterClrMapping/>
-  </p:clrMapOvr>
-  <mc:AlternateContent xmlns:mc="http://schemas.openxmlformats.org/markup-compatibility/2006" xmlns:p14="http://schemas.microsoft.com/office/powerpoint/2010/main">
-    <mc:Choice Requires="p14">
-      <p:transition spd="med" p14:dur="700">
-        <p:fade/>
-      </p:transition>
-    </mc:Choice>
-    <mc:Fallback xmlns="">
-      <p:transition spd="med">
-        <p:fade/>
-      </p:transition>
-    </mc:Fallback>
-  </mc:AlternateContent>
-</p:sld>
-</file>
-
-<file path=ppt/slides/slide12.xml><?xml version="1.0" encoding="utf-8"?>
-<p:sld xmlns:a="http://schemas.openxmlformats.org/drawingml/2006/main" xmlns:r="http://schemas.openxmlformats.org/officeDocument/2006/relationships" xmlns:p="http://schemas.openxmlformats.org/presentationml/2006/main">
-  <p:cSld>
-    <p:spTree>
-      <p:nvGrpSpPr>
-        <p:cNvPr id="1" name=""/>
-        <p:cNvGrpSpPr/>
-        <p:nvPr/>
-      </p:nvGrpSpPr>
-      <p:grpSpPr>
-        <a:xfrm>
-          <a:off x="0" y="0"/>
-          <a:ext cx="0" cy="0"/>
-          <a:chOff x="0" y="0"/>
-          <a:chExt cx="0" cy="0"/>
-        </a:xfrm>
-      </p:grpSpPr>
-      <p:pic>
-        <p:nvPicPr>
           <p:cNvPr id="3074" name="Picture 2" descr="String (computer science) - Wikipedia">
             <a:extLst>
               <a:ext uri="{FF2B5EF4-FFF2-40B4-BE49-F238E27FC236}">
@@ -7555,7 +6339,7 @@
 </p:sld>
 </file>
 
-<file path=ppt/slides/slide13.xml><?xml version="1.0" encoding="utf-8"?>
+<file path=ppt/slides/slide11.xml><?xml version="1.0" encoding="utf-8"?>
 <p:sld xmlns:a="http://schemas.openxmlformats.org/drawingml/2006/main" xmlns:r="http://schemas.openxmlformats.org/officeDocument/2006/relationships" xmlns:p="http://schemas.openxmlformats.org/presentationml/2006/main">
   <p:cSld>
     <p:spTree>
@@ -7627,6 +6411,293 @@
 </p:sld>
 </file>
 
+<file path=ppt/slides/slide12.xml><?xml version="1.0" encoding="utf-8"?>
+<p:sld xmlns:a="http://schemas.openxmlformats.org/drawingml/2006/main" xmlns:r="http://schemas.openxmlformats.org/officeDocument/2006/relationships" xmlns:p="http://schemas.openxmlformats.org/presentationml/2006/main">
+  <p:cSld>
+    <p:spTree>
+      <p:nvGrpSpPr>
+        <p:cNvPr id="1" name=""/>
+        <p:cNvGrpSpPr/>
+        <p:nvPr/>
+      </p:nvGrpSpPr>
+      <p:grpSpPr>
+        <a:xfrm>
+          <a:off x="0" y="0"/>
+          <a:ext cx="0" cy="0"/>
+          <a:chOff x="0" y="0"/>
+          <a:chExt cx="0" cy="0"/>
+        </a:xfrm>
+      </p:grpSpPr>
+      <p:pic>
+        <p:nvPicPr>
+          <p:cNvPr id="3" name="Picture 2">
+            <a:extLst>
+              <a:ext uri="{FF2B5EF4-FFF2-40B4-BE49-F238E27FC236}">
+                <a16:creationId xmlns:a16="http://schemas.microsoft.com/office/drawing/2014/main" id="{765BD16E-6F7E-4BB3-B14E-321F8EABC368}"/>
+              </a:ext>
+            </a:extLst>
+          </p:cNvPr>
+          <p:cNvPicPr>
+            <a:picLocks noChangeAspect="1"/>
+          </p:cNvPicPr>
+          <p:nvPr/>
+        </p:nvPicPr>
+        <p:blipFill>
+          <a:blip r:embed="rId3"/>
+          <a:stretch>
+            <a:fillRect/>
+          </a:stretch>
+        </p:blipFill>
+        <p:spPr>
+          <a:xfrm>
+            <a:off x="2886075" y="1333500"/>
+            <a:ext cx="6419850" cy="4191000"/>
+          </a:xfrm>
+          <a:prstGeom prst="rect">
+            <a:avLst/>
+          </a:prstGeom>
+        </p:spPr>
+      </p:pic>
+      <p:sp>
+        <p:nvSpPr>
+          <p:cNvPr id="5" name="Title 4">
+            <a:extLst>
+              <a:ext uri="{FF2B5EF4-FFF2-40B4-BE49-F238E27FC236}">
+                <a16:creationId xmlns:a16="http://schemas.microsoft.com/office/drawing/2014/main" id="{0BF7903E-A0BF-4F75-BE02-8F3B808B0F73}"/>
+              </a:ext>
+            </a:extLst>
+          </p:cNvPr>
+          <p:cNvSpPr>
+            <a:spLocks noGrp="1"/>
+          </p:cNvSpPr>
+          <p:nvPr>
+            <p:ph type="title"/>
+          </p:nvPr>
+        </p:nvSpPr>
+        <p:spPr/>
+        <p:txBody>
+          <a:bodyPr/>
+          <a:lstStyle/>
+          <a:p>
+            <a:endParaRPr lang="en-US"/>
+          </a:p>
+        </p:txBody>
+      </p:sp>
+    </p:spTree>
+    <p:extLst>
+      <p:ext uri="{BB962C8B-B14F-4D97-AF65-F5344CB8AC3E}">
+        <p14:creationId xmlns:p14="http://schemas.microsoft.com/office/powerpoint/2010/main" val="2021418747"/>
+      </p:ext>
+    </p:extLst>
+  </p:cSld>
+  <p:clrMapOvr>
+    <a:masterClrMapping/>
+  </p:clrMapOvr>
+  <mc:AlternateContent xmlns:mc="http://schemas.openxmlformats.org/markup-compatibility/2006" xmlns:p14="http://schemas.microsoft.com/office/powerpoint/2010/main">
+    <mc:Choice Requires="p14">
+      <p:transition spd="med" p14:dur="700">
+        <p:fade/>
+      </p:transition>
+    </mc:Choice>
+    <mc:Fallback xmlns="">
+      <p:transition spd="med">
+        <p:fade/>
+      </p:transition>
+    </mc:Fallback>
+  </mc:AlternateContent>
+</p:sld>
+</file>
+
+<file path=ppt/slides/slide13.xml><?xml version="1.0" encoding="utf-8"?>
+<p:sld xmlns:a="http://schemas.openxmlformats.org/drawingml/2006/main" xmlns:r="http://schemas.openxmlformats.org/officeDocument/2006/relationships" xmlns:p="http://schemas.openxmlformats.org/presentationml/2006/main">
+  <p:cSld>
+    <p:spTree>
+      <p:nvGrpSpPr>
+        <p:cNvPr id="1" name=""/>
+        <p:cNvGrpSpPr/>
+        <p:nvPr/>
+      </p:nvGrpSpPr>
+      <p:grpSpPr>
+        <a:xfrm>
+          <a:off x="0" y="0"/>
+          <a:ext cx="0" cy="0"/>
+          <a:chOff x="0" y="0"/>
+          <a:chExt cx="0" cy="0"/>
+        </a:xfrm>
+      </p:grpSpPr>
+      <p:pic>
+        <p:nvPicPr>
+          <p:cNvPr id="1026" name="Picture 2" descr="Python Datatype conversion">
+            <a:extLst>
+              <a:ext uri="{FF2B5EF4-FFF2-40B4-BE49-F238E27FC236}">
+                <a16:creationId xmlns:a16="http://schemas.microsoft.com/office/drawing/2014/main" id="{C5A4E410-78DF-44F2-BB04-9461EED29C66}"/>
+              </a:ext>
+            </a:extLst>
+          </p:cNvPr>
+          <p:cNvPicPr>
+            <a:picLocks noChangeAspect="1" noChangeArrowheads="1"/>
+          </p:cNvPicPr>
+          <p:nvPr/>
+        </p:nvPicPr>
+        <p:blipFill>
+          <a:blip r:embed="rId3">
+            <a:extLst>
+              <a:ext uri="{28A0092B-C50C-407E-A947-70E740481C1C}">
+                <a14:useLocalDpi xmlns:a14="http://schemas.microsoft.com/office/drawing/2010/main" val="0"/>
+              </a:ext>
+            </a:extLst>
+          </a:blip>
+          <a:srcRect/>
+          <a:stretch>
+            <a:fillRect/>
+          </a:stretch>
+        </p:blipFill>
+        <p:spPr bwMode="auto">
+          <a:xfrm>
+            <a:off x="2400255" y="2404008"/>
+            <a:ext cx="7391489" cy="2049983"/>
+          </a:xfrm>
+          <a:prstGeom prst="rect">
+            <a:avLst/>
+          </a:prstGeom>
+          <a:noFill/>
+          <a:extLst>
+            <a:ext uri="{909E8E84-426E-40DD-AFC4-6F175D3DCCD1}">
+              <a14:hiddenFill xmlns:a14="http://schemas.microsoft.com/office/drawing/2010/main">
+                <a:solidFill>
+                  <a:srgbClr val="FFFFFF"/>
+                </a:solidFill>
+              </a14:hiddenFill>
+            </a:ext>
+          </a:extLst>
+        </p:spPr>
+      </p:pic>
+      <p:pic>
+        <p:nvPicPr>
+          <p:cNvPr id="4" name="Picture 3">
+            <a:extLst>
+              <a:ext uri="{FF2B5EF4-FFF2-40B4-BE49-F238E27FC236}">
+                <a16:creationId xmlns:a16="http://schemas.microsoft.com/office/drawing/2014/main" id="{D20A1309-E55E-44DB-9811-96C67DA5C666}"/>
+              </a:ext>
+            </a:extLst>
+          </p:cNvPr>
+          <p:cNvPicPr>
+            <a:picLocks noChangeAspect="1"/>
+          </p:cNvPicPr>
+          <p:nvPr/>
+        </p:nvPicPr>
+        <p:blipFill>
+          <a:blip r:embed="rId4">
+            <a:extLst>
+              <a:ext uri="{28A0092B-C50C-407E-A947-70E740481C1C}">
+                <a14:useLocalDpi xmlns:a14="http://schemas.microsoft.com/office/drawing/2010/main" val="0"/>
+              </a:ext>
+            </a:extLst>
+          </a:blip>
+          <a:stretch>
+            <a:fillRect/>
+          </a:stretch>
+        </p:blipFill>
+        <p:spPr>
+          <a:xfrm>
+            <a:off x="10066897" y="4529137"/>
+            <a:ext cx="2116085" cy="2328862"/>
+          </a:xfrm>
+          <a:prstGeom prst="rect">
+            <a:avLst/>
+          </a:prstGeom>
+        </p:spPr>
+      </p:pic>
+      <p:sp>
+        <p:nvSpPr>
+          <p:cNvPr id="8" name="TextBox 7">
+            <a:extLst>
+              <a:ext uri="{FF2B5EF4-FFF2-40B4-BE49-F238E27FC236}">
+                <a16:creationId xmlns:a16="http://schemas.microsoft.com/office/drawing/2014/main" id="{FBA9AB83-FE78-48D0-8549-1BCE5EAB6D3A}"/>
+              </a:ext>
+            </a:extLst>
+          </p:cNvPr>
+          <p:cNvSpPr txBox="1"/>
+          <p:nvPr/>
+        </p:nvSpPr>
+        <p:spPr>
+          <a:xfrm>
+            <a:off x="0" y="6550223"/>
+            <a:ext cx="12192000" cy="307777"/>
+          </a:xfrm>
+          <a:prstGeom prst="rect">
+            <a:avLst/>
+          </a:prstGeom>
+          <a:noFill/>
+        </p:spPr>
+        <p:txBody>
+          <a:bodyPr wrap="square" rtlCol="0">
+            <a:spAutoFit/>
+          </a:bodyPr>
+          <a:lstStyle/>
+          <a:p>
+            <a:r>
+              <a:rPr lang="en-US" sz="1400" dirty="0">
+                <a:solidFill>
+                  <a:schemeClr val="tx1">
+                    <a:lumMod val="65000"/>
+                    <a:lumOff val="35000"/>
+                  </a:schemeClr>
+                </a:solidFill>
+                <a:latin typeface="+mj-lt"/>
+                <a:ea typeface="Verdana" panose="020B0604030504040204" pitchFamily="34" charset="0"/>
+              </a:rPr>
+              <a:t>Image Credit: </a:t>
+            </a:r>
+            <a:r>
+              <a:rPr lang="en-US" sz="1400" dirty="0">
+                <a:solidFill>
+                  <a:schemeClr val="tx1">
+                    <a:lumMod val="65000"/>
+                    <a:lumOff val="35000"/>
+                  </a:schemeClr>
+                </a:solidFill>
+              </a:rPr>
+              <a:t>https://www.vectorstock.com/royalty-free-vector/cartoon-wizard-vector-1693529</a:t>
+            </a:r>
+            <a:endParaRPr lang="en-US" sz="1400" dirty="0">
+              <a:solidFill>
+                <a:schemeClr val="tx1">
+                  <a:lumMod val="65000"/>
+                  <a:lumOff val="35000"/>
+                </a:schemeClr>
+              </a:solidFill>
+              <a:latin typeface="+mj-lt"/>
+              <a:ea typeface="Verdana" panose="020B0604030504040204" pitchFamily="34" charset="0"/>
+            </a:endParaRPr>
+          </a:p>
+        </p:txBody>
+      </p:sp>
+    </p:spTree>
+    <p:extLst>
+      <p:ext uri="{BB962C8B-B14F-4D97-AF65-F5344CB8AC3E}">
+        <p14:creationId xmlns:p14="http://schemas.microsoft.com/office/powerpoint/2010/main" val="3192052037"/>
+      </p:ext>
+    </p:extLst>
+  </p:cSld>
+  <p:clrMapOvr>
+    <a:masterClrMapping/>
+  </p:clrMapOvr>
+  <mc:AlternateContent xmlns:mc="http://schemas.openxmlformats.org/markup-compatibility/2006" xmlns:p14="http://schemas.microsoft.com/office/powerpoint/2010/main">
+    <mc:Choice Requires="p14">
+      <p:transition spd="med" p14:dur="700">
+        <p:fade/>
+      </p:transition>
+    </mc:Choice>
+    <mc:Fallback xmlns="">
+      <p:transition spd="med">
+        <p:fade/>
+      </p:transition>
+    </mc:Fallback>
+  </mc:AlternateContent>
+</p:sld>
+</file>
+
 <file path=ppt/slides/slide14.xml><?xml version="1.0" encoding="utf-8"?>
 <p:sld xmlns:a="http://schemas.openxmlformats.org/drawingml/2006/main" xmlns:r="http://schemas.openxmlformats.org/officeDocument/2006/relationships" xmlns:p="http://schemas.openxmlformats.org/presentationml/2006/main">
   <p:cSld>
@@ -7646,10 +6717,10 @@
       </p:grpSpPr>
       <p:sp>
         <p:nvSpPr>
-          <p:cNvPr id="4" name="Title 3">
-            <a:extLst>
-              <a:ext uri="{FF2B5EF4-FFF2-40B4-BE49-F238E27FC236}">
-                <a16:creationId xmlns:a16="http://schemas.microsoft.com/office/drawing/2014/main" id="{A022B8E0-DD9C-49D7-82FB-ACD3443312AF}"/>
+          <p:cNvPr id="2" name="Title 1">
+            <a:extLst>
+              <a:ext uri="{FF2B5EF4-FFF2-40B4-BE49-F238E27FC236}">
+                <a16:creationId xmlns:a16="http://schemas.microsoft.com/office/drawing/2014/main" id="{8306FF31-301F-43F0-8202-A782726E446A}"/>
               </a:ext>
             </a:extLst>
           </p:cNvPr>
@@ -7662,73 +6733,66 @@
         </p:nvSpPr>
         <p:spPr>
           <a:xfrm>
-            <a:off x="0" y="2766218"/>
-            <a:ext cx="12192000" cy="1325563"/>
+            <a:off x="0" y="365127"/>
+            <a:ext cx="12191999" cy="827416"/>
           </a:xfrm>
         </p:spPr>
         <p:txBody>
-          <a:bodyPr/>
+          <a:bodyPr>
+            <a:normAutofit/>
+          </a:bodyPr>
           <a:lstStyle/>
           <a:p>
             <a:pPr algn="ctr"/>
             <a:r>
-              <a:rPr lang="en-US" sz="4400" dirty="0">
-                <a:solidFill>
-                  <a:schemeClr val="tx1">
-                    <a:lumMod val="65000"/>
-                    <a:lumOff val="35000"/>
-                  </a:schemeClr>
-                </a:solidFill>
+              <a:rPr lang="en-US" sz="4000" dirty="0">
                 <a:latin typeface="Palatino Linotype" panose="02040502050505030304" pitchFamily="18" charset="0"/>
+                <a:cs typeface="Segoe UI Light" panose="020B0502040204020203" pitchFamily="34" charset="0"/>
               </a:rPr>
-              <a:t>7: String Error Syntax</a:t>
-            </a:r>
-            <a:endParaRPr lang="en-US" dirty="0">
-              <a:solidFill>
-                <a:schemeClr val="tx1">
-                  <a:lumMod val="65000"/>
-                  <a:lumOff val="35000"/>
-                </a:schemeClr>
-              </a:solidFill>
-              <a:latin typeface="Palatino Linotype" panose="02040502050505030304" pitchFamily="18" charset="0"/>
-            </a:endParaRPr>
+              <a:t>Architecture (Interpreted Languages)</a:t>
+            </a:r>
           </a:p>
         </p:txBody>
       </p:sp>
       <p:pic>
         <p:nvPicPr>
-          <p:cNvPr id="3" name="Picture 2">
-            <a:extLst>
-              <a:ext uri="{FF2B5EF4-FFF2-40B4-BE49-F238E27FC236}">
-                <a16:creationId xmlns:a16="http://schemas.microsoft.com/office/drawing/2014/main" id="{737003CD-FEFE-49FF-BEE6-0842CEA80D35}"/>
+          <p:cNvPr id="5" name="Content Placeholder 12">
+            <a:extLst>
+              <a:ext uri="{FF2B5EF4-FFF2-40B4-BE49-F238E27FC236}">
+                <a16:creationId xmlns:a16="http://schemas.microsoft.com/office/drawing/2014/main" id="{67D6BD1D-3F09-4338-B1FF-CD4EABF496E1}"/>
               </a:ext>
             </a:extLst>
           </p:cNvPr>
           <p:cNvPicPr>
-            <a:picLocks noChangeAspect="1"/>
+            <a:picLocks noGrp="1" noChangeAspect="1"/>
           </p:cNvPicPr>
-          <p:nvPr/>
+          <p:nvPr>
+            <p:ph idx="1"/>
+          </p:nvPr>
         </p:nvPicPr>
         <p:blipFill>
-          <a:blip r:embed="rId3"/>
+          <a:blip r:embed="rId3">
+            <a:extLst>
+              <a:ext uri="{28A0092B-C50C-407E-A947-70E740481C1C}">
+                <a14:useLocalDpi xmlns:a14="http://schemas.microsoft.com/office/drawing/2010/main" val="0"/>
+              </a:ext>
+            </a:extLst>
+          </a:blip>
           <a:stretch>
             <a:fillRect/>
           </a:stretch>
         </p:blipFill>
         <p:spPr>
           <a:xfrm>
-            <a:off x="0" y="365760"/>
-            <a:ext cx="3233668" cy="805144"/>
+            <a:off x="813319" y="1982277"/>
+            <a:ext cx="10149431" cy="3437166"/>
           </a:xfrm>
-          <a:prstGeom prst="rect">
-            <a:avLst/>
-          </a:prstGeom>
         </p:spPr>
       </p:pic>
     </p:spTree>
     <p:extLst>
       <p:ext uri="{BB962C8B-B14F-4D97-AF65-F5344CB8AC3E}">
-        <p14:creationId xmlns:p14="http://schemas.microsoft.com/office/powerpoint/2010/main" val="2383824223"/>
+        <p14:creationId xmlns:p14="http://schemas.microsoft.com/office/powerpoint/2010/main" val="791954200"/>
       </p:ext>
     </p:extLst>
   </p:cSld>
@@ -7767,303 +6831,134 @@
           <a:chExt cx="0" cy="0"/>
         </a:xfrm>
       </p:grpSpPr>
-      <p:pic>
-        <p:nvPicPr>
-          <p:cNvPr id="3" name="Picture 2">
-            <a:extLst>
-              <a:ext uri="{FF2B5EF4-FFF2-40B4-BE49-F238E27FC236}">
-                <a16:creationId xmlns:a16="http://schemas.microsoft.com/office/drawing/2014/main" id="{765BD16E-6F7E-4BB3-B14E-321F8EABC368}"/>
-              </a:ext>
-            </a:extLst>
-          </p:cNvPr>
-          <p:cNvPicPr>
-            <a:picLocks noChangeAspect="1"/>
-          </p:cNvPicPr>
-          <p:nvPr/>
-        </p:nvPicPr>
-        <p:blipFill>
-          <a:blip r:embed="rId3"/>
-          <a:stretch>
-            <a:fillRect/>
-          </a:stretch>
-        </p:blipFill>
+      <p:sp>
+        <p:nvSpPr>
+          <p:cNvPr id="2" name="Title 1">
+            <a:extLst>
+              <a:ext uri="{FF2B5EF4-FFF2-40B4-BE49-F238E27FC236}">
+                <a16:creationId xmlns:a16="http://schemas.microsoft.com/office/drawing/2014/main" id="{8306FF31-301F-43F0-8202-A782726E446A}"/>
+              </a:ext>
+            </a:extLst>
+          </p:cNvPr>
+          <p:cNvSpPr>
+            <a:spLocks noGrp="1"/>
+          </p:cNvSpPr>
+          <p:nvPr>
+            <p:ph type="title"/>
+          </p:nvPr>
+        </p:nvSpPr>
         <p:spPr>
           <a:xfrm>
-            <a:off x="2886075" y="1333500"/>
-            <a:ext cx="6419850" cy="4191000"/>
-          </a:xfrm>
-          <a:prstGeom prst="rect">
-            <a:avLst/>
-          </a:prstGeom>
-        </p:spPr>
-      </p:pic>
-      <p:sp>
-        <p:nvSpPr>
-          <p:cNvPr id="5" name="Title 4">
-            <a:extLst>
-              <a:ext uri="{FF2B5EF4-FFF2-40B4-BE49-F238E27FC236}">
-                <a16:creationId xmlns:a16="http://schemas.microsoft.com/office/drawing/2014/main" id="{0BF7903E-A0BF-4F75-BE02-8F3B808B0F73}"/>
-              </a:ext>
-            </a:extLst>
-          </p:cNvPr>
-          <p:cNvSpPr>
-            <a:spLocks noGrp="1"/>
-          </p:cNvSpPr>
-          <p:nvPr>
-            <p:ph type="title"/>
-          </p:nvPr>
-        </p:nvSpPr>
-        <p:spPr/>
-        <p:txBody>
-          <a:bodyPr/>
-          <a:lstStyle/>
-          <a:p>
-            <a:endParaRPr lang="en-US"/>
-          </a:p>
-        </p:txBody>
-      </p:sp>
-    </p:spTree>
-    <p:extLst>
-      <p:ext uri="{BB962C8B-B14F-4D97-AF65-F5344CB8AC3E}">
-        <p14:creationId xmlns:p14="http://schemas.microsoft.com/office/powerpoint/2010/main" val="2021418747"/>
-      </p:ext>
-    </p:extLst>
-  </p:cSld>
-  <p:clrMapOvr>
-    <a:masterClrMapping/>
-  </p:clrMapOvr>
-  <mc:AlternateContent xmlns:mc="http://schemas.openxmlformats.org/markup-compatibility/2006" xmlns:p14="http://schemas.microsoft.com/office/powerpoint/2010/main">
-    <mc:Choice Requires="p14">
-      <p:transition spd="med" p14:dur="700">
-        <p:fade/>
-      </p:transition>
-    </mc:Choice>
-    <mc:Fallback xmlns="">
-      <p:transition spd="med">
-        <p:fade/>
-      </p:transition>
-    </mc:Fallback>
-  </mc:AlternateContent>
-</p:sld>
-</file>
-
-<file path=ppt/slides/slide16.xml><?xml version="1.0" encoding="utf-8"?>
-<p:sld xmlns:a="http://schemas.openxmlformats.org/drawingml/2006/main" xmlns:r="http://schemas.openxmlformats.org/officeDocument/2006/relationships" xmlns:p="http://schemas.openxmlformats.org/presentationml/2006/main">
-  <p:cSld>
-    <p:spTree>
-      <p:nvGrpSpPr>
-        <p:cNvPr id="1" name=""/>
-        <p:cNvGrpSpPr/>
-        <p:nvPr/>
-      </p:nvGrpSpPr>
-      <p:grpSpPr>
-        <a:xfrm>
-          <a:off x="0" y="0"/>
-          <a:ext cx="0" cy="0"/>
-          <a:chOff x="0" y="0"/>
-          <a:chExt cx="0" cy="0"/>
-        </a:xfrm>
-      </p:grpSpPr>
-      <p:sp>
-        <p:nvSpPr>
-          <p:cNvPr id="4" name="Title 3">
-            <a:extLst>
-              <a:ext uri="{FF2B5EF4-FFF2-40B4-BE49-F238E27FC236}">
-                <a16:creationId xmlns:a16="http://schemas.microsoft.com/office/drawing/2014/main" id="{A022B8E0-DD9C-49D7-82FB-ACD3443312AF}"/>
-              </a:ext>
-            </a:extLst>
-          </p:cNvPr>
-          <p:cNvSpPr>
-            <a:spLocks noGrp="1"/>
-          </p:cNvSpPr>
-          <p:nvPr>
-            <p:ph type="title"/>
-          </p:nvPr>
-        </p:nvSpPr>
-        <p:spPr>
-          <a:xfrm>
-            <a:off x="0" y="2766218"/>
-            <a:ext cx="12192000" cy="805145"/>
+            <a:off x="0" y="365127"/>
+            <a:ext cx="12191999" cy="827416"/>
           </a:xfrm>
         </p:spPr>
         <p:txBody>
-          <a:bodyPr/>
-          <a:lstStyle/>
-          <a:p>
-            <a:r>
-              <a:rPr lang="en-US" sz="4400" dirty="0">
+          <a:bodyPr>
+            <a:normAutofit/>
+          </a:bodyPr>
+          <a:lstStyle/>
+          <a:p>
+            <a:pPr algn="ctr"/>
+            <a:r>
+              <a:rPr lang="en-US" sz="4000" dirty="0">
                 <a:solidFill>
                   <a:schemeClr val="tx1">
-                    <a:lumMod val="65000"/>
-                    <a:lumOff val="35000"/>
+                    <a:lumMod val="75000"/>
+                    <a:lumOff val="25000"/>
+                  </a:schemeClr>
+                </a:solidFill>
+                <a:latin typeface="Palatino Linotype" panose="02040502050505030304" pitchFamily="18" charset="0"/>
+                <a:cs typeface="Segoe UI Light" panose="020B0502040204020203" pitchFamily="34" charset="0"/>
+              </a:rPr>
+              <a:t>Workshop Agenda</a:t>
+            </a:r>
+          </a:p>
+        </p:txBody>
+      </p:sp>
+      <p:sp>
+        <p:nvSpPr>
+          <p:cNvPr id="4" name="Content Placeholder 3">
+            <a:extLst>
+              <a:ext uri="{FF2B5EF4-FFF2-40B4-BE49-F238E27FC236}">
+                <a16:creationId xmlns:a16="http://schemas.microsoft.com/office/drawing/2014/main" id="{659531AF-92C6-4F92-AA59-2FD12D624E53}"/>
+              </a:ext>
+            </a:extLst>
+          </p:cNvPr>
+          <p:cNvSpPr>
+            <a:spLocks noGrp="1"/>
+          </p:cNvSpPr>
+          <p:nvPr>
+            <p:ph idx="1"/>
+          </p:nvPr>
+        </p:nvSpPr>
+        <p:spPr/>
+        <p:txBody>
+          <a:bodyPr>
+            <a:normAutofit/>
+          </a:bodyPr>
+          <a:lstStyle/>
+          <a:p>
+            <a:pPr marL="514350" indent="-514350">
+              <a:lnSpc>
+                <a:spcPct val="150000"/>
+              </a:lnSpc>
+              <a:buFont typeface="+mj-lt"/>
+              <a:buAutoNum type="arabicPeriod"/>
+            </a:pPr>
+            <a:r>
+              <a:rPr lang="en-US" sz="3200" dirty="0">
+                <a:solidFill>
+                  <a:schemeClr val="tx1">
+                    <a:lumMod val="75000"/>
+                    <a:lumOff val="25000"/>
                   </a:schemeClr>
                 </a:solidFill>
                 <a:latin typeface="Palatino Linotype" panose="02040502050505030304" pitchFamily="18" charset="0"/>
               </a:rPr>
-              <a:t>			8: Displaying Strings</a:t>
-            </a:r>
-            <a:endParaRPr lang="en-US" dirty="0">
-              <a:solidFill>
-                <a:schemeClr val="tx1">
-                  <a:lumMod val="65000"/>
-                  <a:lumOff val="35000"/>
-                </a:schemeClr>
-              </a:solidFill>
-              <a:latin typeface="Palatino Linotype" panose="02040502050505030304" pitchFamily="18" charset="0"/>
-            </a:endParaRPr>
-          </a:p>
-        </p:txBody>
-      </p:sp>
-      <p:pic>
-        <p:nvPicPr>
-          <p:cNvPr id="3" name="Picture 2">
-            <a:extLst>
-              <a:ext uri="{FF2B5EF4-FFF2-40B4-BE49-F238E27FC236}">
-                <a16:creationId xmlns:a16="http://schemas.microsoft.com/office/drawing/2014/main" id="{5CEB019D-75D6-4863-A2EA-E0721684252C}"/>
-              </a:ext>
-            </a:extLst>
-          </p:cNvPr>
-          <p:cNvPicPr>
-            <a:picLocks noChangeAspect="1"/>
-          </p:cNvPicPr>
-          <p:nvPr/>
-        </p:nvPicPr>
-        <p:blipFill>
-          <a:blip r:embed="rId3"/>
-          <a:stretch>
-            <a:fillRect/>
-          </a:stretch>
-        </p:blipFill>
-        <p:spPr>
-          <a:xfrm>
-            <a:off x="0" y="365760"/>
-            <a:ext cx="3233668" cy="805144"/>
-          </a:xfrm>
-          <a:prstGeom prst="rect">
-            <a:avLst/>
-          </a:prstGeom>
-        </p:spPr>
-      </p:pic>
-      <p:sp>
-        <p:nvSpPr>
-          <p:cNvPr id="5" name="Title 3">
-            <a:extLst>
-              <a:ext uri="{FF2B5EF4-FFF2-40B4-BE49-F238E27FC236}">
-                <a16:creationId xmlns:a16="http://schemas.microsoft.com/office/drawing/2014/main" id="{E1919E5C-26D9-40E1-A718-5EE42D99F88A}"/>
-              </a:ext>
-            </a:extLst>
-          </p:cNvPr>
-          <p:cNvSpPr txBox="1">
-            <a:spLocks/>
-          </p:cNvSpPr>
-          <p:nvPr/>
-        </p:nvSpPr>
-        <p:spPr>
-          <a:xfrm>
-            <a:off x="1" y="3694122"/>
-            <a:ext cx="12192000" cy="805145"/>
-          </a:xfrm>
-          <a:prstGeom prst="rect">
-            <a:avLst/>
-          </a:prstGeom>
-        </p:spPr>
-        <p:txBody>
-          <a:bodyPr vert="horz" lIns="91440" tIns="45720" rIns="91440" bIns="45720" rtlCol="0" anchor="ctr">
-            <a:normAutofit/>
-          </a:bodyPr>
-          <a:lstStyle>
-            <a:lvl1pPr algn="l" defTabSz="914400" rtl="0" eaLnBrk="1" latinLnBrk="0" hangingPunct="1">
+              <a:t> JupyterLab</a:t>
+            </a:r>
+          </a:p>
+          <a:p>
+            <a:pPr marL="514350" indent="-514350">
               <a:lnSpc>
-                <a:spcPct val="90000"/>
+                <a:spcPct val="150000"/>
               </a:lnSpc>
-              <a:spcBef>
-                <a:spcPct val="0"/>
-              </a:spcBef>
-              <a:buNone/>
-              <a:defRPr sz="4400" kern="1200">
-                <a:solidFill>
-                  <a:schemeClr val="tx1"/>
-                </a:solidFill>
-                <a:latin typeface="+mj-lt"/>
-                <a:ea typeface="+mj-ea"/>
-                <a:cs typeface="+mj-cs"/>
-              </a:defRPr>
-            </a:lvl1pPr>
-          </a:lstStyle>
-          <a:p>
-            <a:r>
-              <a:rPr lang="en-US" dirty="0">
+              <a:buFont typeface="+mj-lt"/>
+              <a:buAutoNum type="arabicPeriod"/>
+            </a:pPr>
+            <a:r>
+              <a:rPr lang="en-US" sz="3200" dirty="0">
                 <a:solidFill>
                   <a:schemeClr val="tx1">
-                    <a:lumMod val="65000"/>
-                    <a:lumOff val="35000"/>
+                    <a:lumMod val="75000"/>
+                    <a:lumOff val="25000"/>
                   </a:schemeClr>
                 </a:solidFill>
                 <a:latin typeface="Palatino Linotype" panose="02040502050505030304" pitchFamily="18" charset="0"/>
               </a:rPr>
-              <a:t>			9: String Concatenation</a:t>
-            </a:r>
-          </a:p>
-        </p:txBody>
-      </p:sp>
-      <p:sp>
-        <p:nvSpPr>
-          <p:cNvPr id="6" name="Title 3">
-            <a:extLst>
-              <a:ext uri="{FF2B5EF4-FFF2-40B4-BE49-F238E27FC236}">
-                <a16:creationId xmlns:a16="http://schemas.microsoft.com/office/drawing/2014/main" id="{2C2EE507-379F-4528-8B8D-DE2CF4BBBB95}"/>
-              </a:ext>
-            </a:extLst>
-          </p:cNvPr>
-          <p:cNvSpPr txBox="1">
-            <a:spLocks/>
-          </p:cNvSpPr>
-          <p:nvPr/>
-        </p:nvSpPr>
-        <p:spPr>
-          <a:xfrm>
-            <a:off x="0" y="4622026"/>
-            <a:ext cx="12192000" cy="805145"/>
-          </a:xfrm>
-          <a:prstGeom prst="rect">
-            <a:avLst/>
-          </a:prstGeom>
-        </p:spPr>
-        <p:txBody>
-          <a:bodyPr vert="horz" lIns="91440" tIns="45720" rIns="91440" bIns="45720" rtlCol="0" anchor="ctr">
-            <a:normAutofit/>
-          </a:bodyPr>
-          <a:lstStyle>
-            <a:lvl1pPr algn="l" defTabSz="914400" rtl="0" eaLnBrk="1" latinLnBrk="0" hangingPunct="1">
+              <a:t> Learning Strategies</a:t>
+            </a:r>
+          </a:p>
+          <a:p>
+            <a:pPr marL="514350" indent="-514350">
               <a:lnSpc>
-                <a:spcPct val="90000"/>
+                <a:spcPct val="150000"/>
               </a:lnSpc>
-              <a:spcBef>
-                <a:spcPct val="0"/>
-              </a:spcBef>
-              <a:buNone/>
-              <a:defRPr sz="4400" kern="1200">
-                <a:solidFill>
-                  <a:schemeClr val="tx1"/>
-                </a:solidFill>
-                <a:latin typeface="+mj-lt"/>
-                <a:ea typeface="+mj-ea"/>
-                <a:cs typeface="+mj-cs"/>
-              </a:defRPr>
-            </a:lvl1pPr>
-          </a:lstStyle>
-          <a:p>
-            <a:r>
-              <a:rPr lang="en-US" dirty="0">
+              <a:buFont typeface="+mj-lt"/>
+              <a:buAutoNum type="arabicPeriod"/>
+            </a:pPr>
+            <a:r>
+              <a:rPr lang="en-US" sz="3200" dirty="0">
                 <a:solidFill>
                   <a:schemeClr val="tx1">
-                    <a:lumMod val="65000"/>
-                    <a:lumOff val="35000"/>
+                    <a:lumMod val="75000"/>
+                    <a:lumOff val="25000"/>
                   </a:schemeClr>
                 </a:solidFill>
                 <a:latin typeface="Palatino Linotype" panose="02040502050505030304" pitchFamily="18" charset="0"/>
               </a:rPr>
-              <a:t>		     10: String Methods</a:t>
+              <a:t> Basics, Variables, and Strings</a:t>
             </a:r>
           </a:p>
         </p:txBody>
@@ -8071,460 +6966,7 @@
     </p:spTree>
     <p:extLst>
       <p:ext uri="{BB962C8B-B14F-4D97-AF65-F5344CB8AC3E}">
-        <p14:creationId xmlns:p14="http://schemas.microsoft.com/office/powerpoint/2010/main" val="1169395481"/>
-      </p:ext>
-    </p:extLst>
-  </p:cSld>
-  <p:clrMapOvr>
-    <a:masterClrMapping/>
-  </p:clrMapOvr>
-  <mc:AlternateContent xmlns:mc="http://schemas.openxmlformats.org/markup-compatibility/2006" xmlns:p14="http://schemas.microsoft.com/office/powerpoint/2010/main">
-    <mc:Choice Requires="p14">
-      <p:transition spd="med" p14:dur="700">
-        <p:fade/>
-      </p:transition>
-    </mc:Choice>
-    <mc:Fallback xmlns="">
-      <p:transition spd="med">
-        <p:fade/>
-      </p:transition>
-    </mc:Fallback>
-  </mc:AlternateContent>
-</p:sld>
-</file>
-
-<file path=ppt/slides/slide17.xml><?xml version="1.0" encoding="utf-8"?>
-<p:sld xmlns:a="http://schemas.openxmlformats.org/drawingml/2006/main" xmlns:r="http://schemas.openxmlformats.org/officeDocument/2006/relationships" xmlns:p="http://schemas.openxmlformats.org/presentationml/2006/main">
-  <p:cSld>
-    <p:spTree>
-      <p:nvGrpSpPr>
-        <p:cNvPr id="1" name=""/>
-        <p:cNvGrpSpPr/>
-        <p:nvPr/>
-      </p:nvGrpSpPr>
-      <p:grpSpPr>
-        <a:xfrm>
-          <a:off x="0" y="0"/>
-          <a:ext cx="0" cy="0"/>
-          <a:chOff x="0" y="0"/>
-          <a:chExt cx="0" cy="0"/>
-        </a:xfrm>
-      </p:grpSpPr>
-      <p:pic>
-        <p:nvPicPr>
-          <p:cNvPr id="1026" name="Picture 2" descr="Python Datatype conversion">
-            <a:extLst>
-              <a:ext uri="{FF2B5EF4-FFF2-40B4-BE49-F238E27FC236}">
-                <a16:creationId xmlns:a16="http://schemas.microsoft.com/office/drawing/2014/main" id="{C5A4E410-78DF-44F2-BB04-9461EED29C66}"/>
-              </a:ext>
-            </a:extLst>
-          </p:cNvPr>
-          <p:cNvPicPr>
-            <a:picLocks noChangeAspect="1" noChangeArrowheads="1"/>
-          </p:cNvPicPr>
-          <p:nvPr/>
-        </p:nvPicPr>
-        <p:blipFill>
-          <a:blip r:embed="rId3">
-            <a:extLst>
-              <a:ext uri="{28A0092B-C50C-407E-A947-70E740481C1C}">
-                <a14:useLocalDpi xmlns:a14="http://schemas.microsoft.com/office/drawing/2010/main" val="0"/>
-              </a:ext>
-            </a:extLst>
-          </a:blip>
-          <a:srcRect/>
-          <a:stretch>
-            <a:fillRect/>
-          </a:stretch>
-        </p:blipFill>
-        <p:spPr bwMode="auto">
-          <a:xfrm>
-            <a:off x="2400255" y="2404008"/>
-            <a:ext cx="7391489" cy="2049983"/>
-          </a:xfrm>
-          <a:prstGeom prst="rect">
-            <a:avLst/>
-          </a:prstGeom>
-          <a:noFill/>
-          <a:extLst>
-            <a:ext uri="{909E8E84-426E-40DD-AFC4-6F175D3DCCD1}">
-              <a14:hiddenFill xmlns:a14="http://schemas.microsoft.com/office/drawing/2010/main">
-                <a:solidFill>
-                  <a:srgbClr val="FFFFFF"/>
-                </a:solidFill>
-              </a14:hiddenFill>
-            </a:ext>
-          </a:extLst>
-        </p:spPr>
-      </p:pic>
-      <p:pic>
-        <p:nvPicPr>
-          <p:cNvPr id="4" name="Picture 3">
-            <a:extLst>
-              <a:ext uri="{FF2B5EF4-FFF2-40B4-BE49-F238E27FC236}">
-                <a16:creationId xmlns:a16="http://schemas.microsoft.com/office/drawing/2014/main" id="{D20A1309-E55E-44DB-9811-96C67DA5C666}"/>
-              </a:ext>
-            </a:extLst>
-          </p:cNvPr>
-          <p:cNvPicPr>
-            <a:picLocks noChangeAspect="1"/>
-          </p:cNvPicPr>
-          <p:nvPr/>
-        </p:nvPicPr>
-        <p:blipFill>
-          <a:blip r:embed="rId4">
-            <a:extLst>
-              <a:ext uri="{28A0092B-C50C-407E-A947-70E740481C1C}">
-                <a14:useLocalDpi xmlns:a14="http://schemas.microsoft.com/office/drawing/2010/main" val="0"/>
-              </a:ext>
-            </a:extLst>
-          </a:blip>
-          <a:stretch>
-            <a:fillRect/>
-          </a:stretch>
-        </p:blipFill>
-        <p:spPr>
-          <a:xfrm>
-            <a:off x="10066897" y="4529137"/>
-            <a:ext cx="2116085" cy="2328862"/>
-          </a:xfrm>
-          <a:prstGeom prst="rect">
-            <a:avLst/>
-          </a:prstGeom>
-        </p:spPr>
-      </p:pic>
-      <p:sp>
-        <p:nvSpPr>
-          <p:cNvPr id="8" name="TextBox 7">
-            <a:extLst>
-              <a:ext uri="{FF2B5EF4-FFF2-40B4-BE49-F238E27FC236}">
-                <a16:creationId xmlns:a16="http://schemas.microsoft.com/office/drawing/2014/main" id="{FBA9AB83-FE78-48D0-8549-1BCE5EAB6D3A}"/>
-              </a:ext>
-            </a:extLst>
-          </p:cNvPr>
-          <p:cNvSpPr txBox="1"/>
-          <p:nvPr/>
-        </p:nvSpPr>
-        <p:spPr>
-          <a:xfrm>
-            <a:off x="0" y="6550223"/>
-            <a:ext cx="12192000" cy="307777"/>
-          </a:xfrm>
-          <a:prstGeom prst="rect">
-            <a:avLst/>
-          </a:prstGeom>
-          <a:noFill/>
-        </p:spPr>
-        <p:txBody>
-          <a:bodyPr wrap="square" rtlCol="0">
-            <a:spAutoFit/>
-          </a:bodyPr>
-          <a:lstStyle/>
-          <a:p>
-            <a:r>
-              <a:rPr lang="en-US" sz="1400" dirty="0">
-                <a:solidFill>
-                  <a:schemeClr val="tx1">
-                    <a:lumMod val="65000"/>
-                    <a:lumOff val="35000"/>
-                  </a:schemeClr>
-                </a:solidFill>
-                <a:latin typeface="+mj-lt"/>
-                <a:ea typeface="Verdana" panose="020B0604030504040204" pitchFamily="34" charset="0"/>
-              </a:rPr>
-              <a:t>Image Credit: </a:t>
-            </a:r>
-            <a:r>
-              <a:rPr lang="en-US" sz="1400" dirty="0">
-                <a:solidFill>
-                  <a:schemeClr val="tx1">
-                    <a:lumMod val="65000"/>
-                    <a:lumOff val="35000"/>
-                  </a:schemeClr>
-                </a:solidFill>
-              </a:rPr>
-              <a:t>https://www.vectorstock.com/royalty-free-vector/cartoon-wizard-vector-1693529</a:t>
-            </a:r>
-            <a:endParaRPr lang="en-US" sz="1400" dirty="0">
-              <a:solidFill>
-                <a:schemeClr val="tx1">
-                  <a:lumMod val="65000"/>
-                  <a:lumOff val="35000"/>
-                </a:schemeClr>
-              </a:solidFill>
-              <a:latin typeface="+mj-lt"/>
-              <a:ea typeface="Verdana" panose="020B0604030504040204" pitchFamily="34" charset="0"/>
-            </a:endParaRPr>
-          </a:p>
-        </p:txBody>
-      </p:sp>
-    </p:spTree>
-    <p:extLst>
-      <p:ext uri="{BB962C8B-B14F-4D97-AF65-F5344CB8AC3E}">
-        <p14:creationId xmlns:p14="http://schemas.microsoft.com/office/powerpoint/2010/main" val="3192052037"/>
-      </p:ext>
-    </p:extLst>
-  </p:cSld>
-  <p:clrMapOvr>
-    <a:masterClrMapping/>
-  </p:clrMapOvr>
-  <mc:AlternateContent xmlns:mc="http://schemas.openxmlformats.org/markup-compatibility/2006" xmlns:p14="http://schemas.microsoft.com/office/powerpoint/2010/main">
-    <mc:Choice Requires="p14">
-      <p:transition spd="med" p14:dur="700">
-        <p:fade/>
-      </p:transition>
-    </mc:Choice>
-    <mc:Fallback xmlns="">
-      <p:transition spd="med">
-        <p:fade/>
-      </p:transition>
-    </mc:Fallback>
-  </mc:AlternateContent>
-</p:sld>
-</file>
-
-<file path=ppt/slides/slide18.xml><?xml version="1.0" encoding="utf-8"?>
-<p:sld xmlns:a="http://schemas.openxmlformats.org/drawingml/2006/main" xmlns:r="http://schemas.openxmlformats.org/officeDocument/2006/relationships" xmlns:p="http://schemas.openxmlformats.org/presentationml/2006/main">
-  <p:cSld>
-    <p:spTree>
-      <p:nvGrpSpPr>
-        <p:cNvPr id="1" name=""/>
-        <p:cNvGrpSpPr/>
-        <p:nvPr/>
-      </p:nvGrpSpPr>
-      <p:grpSpPr>
-        <a:xfrm>
-          <a:off x="0" y="0"/>
-          <a:ext cx="0" cy="0"/>
-          <a:chOff x="0" y="0"/>
-          <a:chExt cx="0" cy="0"/>
-        </a:xfrm>
-      </p:grpSpPr>
-      <p:sp>
-        <p:nvSpPr>
-          <p:cNvPr id="4" name="Title 3">
-            <a:extLst>
-              <a:ext uri="{FF2B5EF4-FFF2-40B4-BE49-F238E27FC236}">
-                <a16:creationId xmlns:a16="http://schemas.microsoft.com/office/drawing/2014/main" id="{A022B8E0-DD9C-49D7-82FB-ACD3443312AF}"/>
-              </a:ext>
-            </a:extLst>
-          </p:cNvPr>
-          <p:cNvSpPr>
-            <a:spLocks noGrp="1"/>
-          </p:cNvSpPr>
-          <p:nvPr>
-            <p:ph type="title"/>
-          </p:nvPr>
-        </p:nvSpPr>
-        <p:spPr>
-          <a:xfrm>
-            <a:off x="0" y="2824092"/>
-            <a:ext cx="12192000" cy="805144"/>
-          </a:xfrm>
-        </p:spPr>
-        <p:txBody>
-          <a:bodyPr/>
-          <a:lstStyle/>
-          <a:p>
-            <a:r>
-              <a:rPr lang="en-US" dirty="0">
-                <a:solidFill>
-                  <a:schemeClr val="tx1">
-                    <a:lumMod val="65000"/>
-                    <a:lumOff val="35000"/>
-                  </a:schemeClr>
-                </a:solidFill>
-                <a:latin typeface="Palatino Linotype" panose="02040502050505030304" pitchFamily="18" charset="0"/>
-              </a:rPr>
-              <a:t>			</a:t>
-            </a:r>
-            <a:r>
-              <a:rPr lang="en-US" sz="4400" dirty="0">
-                <a:solidFill>
-                  <a:schemeClr val="tx1">
-                    <a:lumMod val="65000"/>
-                    <a:lumOff val="35000"/>
-                  </a:schemeClr>
-                </a:solidFill>
-                <a:latin typeface="Palatino Linotype" panose="02040502050505030304" pitchFamily="18" charset="0"/>
-              </a:rPr>
-              <a:t>11: Types and Casting</a:t>
-            </a:r>
-            <a:endParaRPr lang="en-US" dirty="0">
-              <a:solidFill>
-                <a:schemeClr val="tx1">
-                  <a:lumMod val="65000"/>
-                  <a:lumOff val="35000"/>
-                </a:schemeClr>
-              </a:solidFill>
-              <a:latin typeface="Palatino Linotype" panose="02040502050505030304" pitchFamily="18" charset="0"/>
-            </a:endParaRPr>
-          </a:p>
-        </p:txBody>
-      </p:sp>
-      <p:pic>
-        <p:nvPicPr>
-          <p:cNvPr id="3" name="Picture 2">
-            <a:extLst>
-              <a:ext uri="{FF2B5EF4-FFF2-40B4-BE49-F238E27FC236}">
-                <a16:creationId xmlns:a16="http://schemas.microsoft.com/office/drawing/2014/main" id="{E991FB8A-9929-4CEF-8E43-B75B10ED5C15}"/>
-              </a:ext>
-            </a:extLst>
-          </p:cNvPr>
-          <p:cNvPicPr>
-            <a:picLocks noChangeAspect="1"/>
-          </p:cNvPicPr>
-          <p:nvPr/>
-        </p:nvPicPr>
-        <p:blipFill>
-          <a:blip r:embed="rId3"/>
-          <a:stretch>
-            <a:fillRect/>
-          </a:stretch>
-        </p:blipFill>
-        <p:spPr>
-          <a:xfrm>
-            <a:off x="0" y="365760"/>
-            <a:ext cx="3233668" cy="805144"/>
-          </a:xfrm>
-          <a:prstGeom prst="rect">
-            <a:avLst/>
-          </a:prstGeom>
-        </p:spPr>
-      </p:pic>
-      <p:sp>
-        <p:nvSpPr>
-          <p:cNvPr id="5" name="Title 3">
-            <a:extLst>
-              <a:ext uri="{FF2B5EF4-FFF2-40B4-BE49-F238E27FC236}">
-                <a16:creationId xmlns:a16="http://schemas.microsoft.com/office/drawing/2014/main" id="{8951B9FC-D7F4-4ED5-BCB3-C9F8FEF1BE5E}"/>
-              </a:ext>
-            </a:extLst>
-          </p:cNvPr>
-          <p:cNvSpPr txBox="1">
-            <a:spLocks/>
-          </p:cNvSpPr>
-          <p:nvPr/>
-        </p:nvSpPr>
-        <p:spPr>
-          <a:xfrm>
-            <a:off x="0" y="3717272"/>
-            <a:ext cx="12192000" cy="805144"/>
-          </a:xfrm>
-          <a:prstGeom prst="rect">
-            <a:avLst/>
-          </a:prstGeom>
-        </p:spPr>
-        <p:txBody>
-          <a:bodyPr vert="horz" lIns="91440" tIns="45720" rIns="91440" bIns="45720" rtlCol="0" anchor="ctr">
-            <a:normAutofit/>
-          </a:bodyPr>
-          <a:lstStyle>
-            <a:lvl1pPr algn="l" defTabSz="914400" rtl="0" eaLnBrk="1" latinLnBrk="0" hangingPunct="1">
-              <a:lnSpc>
-                <a:spcPct val="90000"/>
-              </a:lnSpc>
-              <a:spcBef>
-                <a:spcPct val="0"/>
-              </a:spcBef>
-              <a:buNone/>
-              <a:defRPr sz="4400" kern="1200">
-                <a:solidFill>
-                  <a:schemeClr val="tx1"/>
-                </a:solidFill>
-                <a:latin typeface="+mj-lt"/>
-                <a:ea typeface="+mj-ea"/>
-                <a:cs typeface="+mj-cs"/>
-              </a:defRPr>
-            </a:lvl1pPr>
-          </a:lstStyle>
-          <a:p>
-            <a:r>
-              <a:rPr lang="en-US" dirty="0">
-                <a:solidFill>
-                  <a:schemeClr val="tx1">
-                    <a:lumMod val="65000"/>
-                    <a:lumOff val="35000"/>
-                  </a:schemeClr>
-                </a:solidFill>
-                <a:latin typeface="Palatino Linotype" panose="02040502050505030304" pitchFamily="18" charset="0"/>
-              </a:rPr>
-              <a:t>			12: The Input() Function</a:t>
-            </a:r>
-          </a:p>
-        </p:txBody>
-      </p:sp>
-    </p:spTree>
-    <p:extLst>
-      <p:ext uri="{BB962C8B-B14F-4D97-AF65-F5344CB8AC3E}">
-        <p14:creationId xmlns:p14="http://schemas.microsoft.com/office/powerpoint/2010/main" val="3672836271"/>
-      </p:ext>
-    </p:extLst>
-  </p:cSld>
-  <p:clrMapOvr>
-    <a:masterClrMapping/>
-  </p:clrMapOvr>
-  <mc:AlternateContent xmlns:mc="http://schemas.openxmlformats.org/markup-compatibility/2006" xmlns:p14="http://schemas.microsoft.com/office/powerpoint/2010/main">
-    <mc:Choice Requires="p14">
-      <p:transition spd="med" p14:dur="700">
-        <p:fade/>
-      </p:transition>
-    </mc:Choice>
-    <mc:Fallback xmlns="">
-      <p:transition spd="med">
-        <p:fade/>
-      </p:transition>
-    </mc:Fallback>
-  </mc:AlternateContent>
-</p:sld>
-</file>
-
-<file path=ppt/slides/slide19.xml><?xml version="1.0" encoding="utf-8"?>
-<p:sld xmlns:a="http://schemas.openxmlformats.org/drawingml/2006/main" xmlns:r="http://schemas.openxmlformats.org/officeDocument/2006/relationships" xmlns:p="http://schemas.openxmlformats.org/presentationml/2006/main">
-  <p:cSld>
-    <p:spTree>
-      <p:nvGrpSpPr>
-        <p:cNvPr id="1" name=""/>
-        <p:cNvGrpSpPr/>
-        <p:nvPr/>
-      </p:nvGrpSpPr>
-      <p:grpSpPr>
-        <a:xfrm>
-          <a:off x="0" y="0"/>
-          <a:ext cx="0" cy="0"/>
-          <a:chOff x="0" y="0"/>
-          <a:chExt cx="0" cy="0"/>
-        </a:xfrm>
-      </p:grpSpPr>
-      <p:sp>
-        <p:nvSpPr>
-          <p:cNvPr id="6" name="Title 5">
-            <a:extLst>
-              <a:ext uri="{FF2B5EF4-FFF2-40B4-BE49-F238E27FC236}">
-                <a16:creationId xmlns:a16="http://schemas.microsoft.com/office/drawing/2014/main" id="{A079804B-14F8-4F05-A2D6-796B56991174}"/>
-              </a:ext>
-            </a:extLst>
-          </p:cNvPr>
-          <p:cNvSpPr>
-            <a:spLocks noGrp="1"/>
-          </p:cNvSpPr>
-          <p:nvPr>
-            <p:ph type="title"/>
-          </p:nvPr>
-        </p:nvSpPr>
-        <p:spPr/>
-        <p:txBody>
-          <a:bodyPr/>
-          <a:lstStyle/>
-          <a:p>
-            <a:endParaRPr lang="en-US"/>
-          </a:p>
-        </p:txBody>
-      </p:sp>
-    </p:spTree>
-    <p:extLst>
-      <p:ext uri="{BB962C8B-B14F-4D97-AF65-F5344CB8AC3E}">
-        <p14:creationId xmlns:p14="http://schemas.microsoft.com/office/powerpoint/2010/main" val="3160873198"/>
+        <p14:creationId xmlns:p14="http://schemas.microsoft.com/office/powerpoint/2010/main" val="1262685859"/>
       </p:ext>
     </p:extLst>
   </p:cSld>
@@ -8603,7 +7045,7 @@
                 <a:latin typeface="Palatino Linotype" panose="02040502050505030304" pitchFamily="18" charset="0"/>
                 <a:cs typeface="Segoe UI Light" panose="020B0502040204020203" pitchFamily="34" charset="0"/>
               </a:rPr>
-              <a:t>Agenda</a:t>
+              <a:t>Today’s Agenda</a:t>
             </a:r>
           </a:p>
         </p:txBody>
@@ -8648,7 +7090,7 @@
                 </a:solidFill>
                 <a:latin typeface="Palatino Linotype" panose="02040502050505030304" pitchFamily="18" charset="0"/>
               </a:rPr>
-              <a:t> JupyterLab</a:t>
+              <a:t>Python Intro (Part I)</a:t>
             </a:r>
           </a:p>
           <a:p>
@@ -8669,7 +7111,7 @@
                 </a:solidFill>
                 <a:latin typeface="Palatino Linotype" panose="02040502050505030304" pitchFamily="18" charset="0"/>
               </a:rPr>
-              <a:t> Learning Strategies</a:t>
+              <a:t>Python Intro (Part II) &amp; Libraries</a:t>
             </a:r>
           </a:p>
           <a:p>
@@ -8690,7 +7132,49 @@
                 </a:solidFill>
                 <a:latin typeface="Palatino Linotype" panose="02040502050505030304" pitchFamily="18" charset="0"/>
               </a:rPr>
-              <a:t> Basics, Variables, and Strings</a:t>
+              <a:t>Loops, Conditionals, Functions</a:t>
+            </a:r>
+          </a:p>
+          <a:p>
+            <a:pPr marL="514350" indent="-514350">
+              <a:lnSpc>
+                <a:spcPct val="150000"/>
+              </a:lnSpc>
+              <a:buFont typeface="+mj-lt"/>
+              <a:buAutoNum type="arabicPeriod"/>
+            </a:pPr>
+            <a:r>
+              <a:rPr lang="en-US" sz="3200" dirty="0">
+                <a:solidFill>
+                  <a:schemeClr val="tx1">
+                    <a:lumMod val="75000"/>
+                    <a:lumOff val="25000"/>
+                  </a:schemeClr>
+                </a:solidFill>
+                <a:latin typeface="Palatino Linotype" panose="02040502050505030304" pitchFamily="18" charset="0"/>
+              </a:rPr>
+              <a:t>Data Wrangling</a:t>
+            </a:r>
+          </a:p>
+          <a:p>
+            <a:pPr marL="514350" indent="-514350">
+              <a:lnSpc>
+                <a:spcPct val="150000"/>
+              </a:lnSpc>
+              <a:buFont typeface="+mj-lt"/>
+              <a:buAutoNum type="arabicPeriod"/>
+            </a:pPr>
+            <a:r>
+              <a:rPr lang="en-US" sz="3200" dirty="0">
+                <a:solidFill>
+                  <a:schemeClr val="tx1">
+                    <a:lumMod val="75000"/>
+                    <a:lumOff val="25000"/>
+                  </a:schemeClr>
+                </a:solidFill>
+                <a:latin typeface="Palatino Linotype" panose="02040502050505030304" pitchFamily="18" charset="0"/>
+              </a:rPr>
+              <a:t>Neural Networks – Basics &amp; Vocabulary</a:t>
             </a:r>
           </a:p>
         </p:txBody>
@@ -8699,122 +7183,6 @@
     <p:extLst>
       <p:ext uri="{BB962C8B-B14F-4D97-AF65-F5344CB8AC3E}">
         <p14:creationId xmlns:p14="http://schemas.microsoft.com/office/powerpoint/2010/main" val="3933901158"/>
-      </p:ext>
-    </p:extLst>
-  </p:cSld>
-  <p:clrMapOvr>
-    <a:masterClrMapping/>
-  </p:clrMapOvr>
-  <mc:AlternateContent xmlns:mc="http://schemas.openxmlformats.org/markup-compatibility/2006" xmlns:p14="http://schemas.microsoft.com/office/powerpoint/2010/main">
-    <mc:Choice Requires="p14">
-      <p:transition spd="med" p14:dur="700">
-        <p:fade/>
-      </p:transition>
-    </mc:Choice>
-    <mc:Fallback xmlns="">
-      <p:transition spd="med">
-        <p:fade/>
-      </p:transition>
-    </mc:Fallback>
-  </mc:AlternateContent>
-</p:sld>
-</file>
-
-<file path=ppt/slides/slide20.xml><?xml version="1.0" encoding="utf-8"?>
-<p:sld xmlns:a="http://schemas.openxmlformats.org/drawingml/2006/main" xmlns:r="http://schemas.openxmlformats.org/officeDocument/2006/relationships" xmlns:p="http://schemas.openxmlformats.org/presentationml/2006/main">
-  <p:cSld>
-    <p:spTree>
-      <p:nvGrpSpPr>
-        <p:cNvPr id="1" name=""/>
-        <p:cNvGrpSpPr/>
-        <p:nvPr/>
-      </p:nvGrpSpPr>
-      <p:grpSpPr>
-        <a:xfrm>
-          <a:off x="0" y="0"/>
-          <a:ext cx="0" cy="0"/>
-          <a:chOff x="0" y="0"/>
-          <a:chExt cx="0" cy="0"/>
-        </a:xfrm>
-      </p:grpSpPr>
-      <p:sp>
-        <p:nvSpPr>
-          <p:cNvPr id="2" name="Title 1">
-            <a:extLst>
-              <a:ext uri="{FF2B5EF4-FFF2-40B4-BE49-F238E27FC236}">
-                <a16:creationId xmlns:a16="http://schemas.microsoft.com/office/drawing/2014/main" id="{8306FF31-301F-43F0-8202-A782726E446A}"/>
-              </a:ext>
-            </a:extLst>
-          </p:cNvPr>
-          <p:cNvSpPr>
-            <a:spLocks noGrp="1"/>
-          </p:cNvSpPr>
-          <p:nvPr>
-            <p:ph type="title"/>
-          </p:nvPr>
-        </p:nvSpPr>
-        <p:spPr>
-          <a:xfrm>
-            <a:off x="0" y="365127"/>
-            <a:ext cx="12191999" cy="827416"/>
-          </a:xfrm>
-        </p:spPr>
-        <p:txBody>
-          <a:bodyPr>
-            <a:normAutofit/>
-          </a:bodyPr>
-          <a:lstStyle/>
-          <a:p>
-            <a:pPr algn="ctr"/>
-            <a:r>
-              <a:rPr lang="en-US" sz="4000" dirty="0">
-                <a:latin typeface="Palatino Linotype" panose="02040502050505030304" pitchFamily="18" charset="0"/>
-                <a:cs typeface="Segoe UI Light" panose="020B0502040204020203" pitchFamily="34" charset="0"/>
-              </a:rPr>
-              <a:t>Architecture (Interpreted Languages)</a:t>
-            </a:r>
-          </a:p>
-        </p:txBody>
-      </p:sp>
-      <p:pic>
-        <p:nvPicPr>
-          <p:cNvPr id="5" name="Content Placeholder 12">
-            <a:extLst>
-              <a:ext uri="{FF2B5EF4-FFF2-40B4-BE49-F238E27FC236}">
-                <a16:creationId xmlns:a16="http://schemas.microsoft.com/office/drawing/2014/main" id="{67D6BD1D-3F09-4338-B1FF-CD4EABF496E1}"/>
-              </a:ext>
-            </a:extLst>
-          </p:cNvPr>
-          <p:cNvPicPr>
-            <a:picLocks noGrp="1" noChangeAspect="1"/>
-          </p:cNvPicPr>
-          <p:nvPr>
-            <p:ph idx="1"/>
-          </p:nvPr>
-        </p:nvPicPr>
-        <p:blipFill>
-          <a:blip r:embed="rId3">
-            <a:extLst>
-              <a:ext uri="{28A0092B-C50C-407E-A947-70E740481C1C}">
-                <a14:useLocalDpi xmlns:a14="http://schemas.microsoft.com/office/drawing/2010/main" val="0"/>
-              </a:ext>
-            </a:extLst>
-          </a:blip>
-          <a:stretch>
-            <a:fillRect/>
-          </a:stretch>
-        </p:blipFill>
-        <p:spPr>
-          <a:xfrm>
-            <a:off x="813319" y="1982277"/>
-            <a:ext cx="10149431" cy="3437166"/>
-          </a:xfrm>
-        </p:spPr>
-      </p:pic>
-    </p:spTree>
-    <p:extLst>
-      <p:ext uri="{BB962C8B-B14F-4D97-AF65-F5344CB8AC3E}">
-        <p14:creationId xmlns:p14="http://schemas.microsoft.com/office/powerpoint/2010/main" val="791954200"/>
       </p:ext>
     </p:extLst>
   </p:cSld>
@@ -8853,12 +7221,57 @@
           <a:chExt cx="0" cy="0"/>
         </a:xfrm>
       </p:grpSpPr>
+      <p:sp>
+        <p:nvSpPr>
+          <p:cNvPr id="2" name="Title 1">
+            <a:extLst>
+              <a:ext uri="{FF2B5EF4-FFF2-40B4-BE49-F238E27FC236}">
+                <a16:creationId xmlns:a16="http://schemas.microsoft.com/office/drawing/2014/main" id="{8306FF31-301F-43F0-8202-A782726E446A}"/>
+              </a:ext>
+            </a:extLst>
+          </p:cNvPr>
+          <p:cNvSpPr>
+            <a:spLocks noGrp="1"/>
+          </p:cNvSpPr>
+          <p:nvPr>
+            <p:ph type="title"/>
+          </p:nvPr>
+        </p:nvSpPr>
+        <p:spPr>
+          <a:xfrm>
+            <a:off x="0" y="365127"/>
+            <a:ext cx="12191999" cy="827416"/>
+          </a:xfrm>
+        </p:spPr>
+        <p:txBody>
+          <a:bodyPr>
+            <a:normAutofit/>
+          </a:bodyPr>
+          <a:lstStyle/>
+          <a:p>
+            <a:pPr algn="ctr"/>
+            <a:r>
+              <a:rPr lang="en-US" sz="4000" dirty="0">
+                <a:solidFill>
+                  <a:schemeClr val="tx1">
+                    <a:lumMod val="75000"/>
+                    <a:lumOff val="25000"/>
+                  </a:schemeClr>
+                </a:solidFill>
+                <a:latin typeface="Palatino Linotype" panose="02040502050505030304" pitchFamily="18" charset="0"/>
+                <a:cs typeface="Segoe UI Light" panose="020B0502040204020203" pitchFamily="34" charset="0"/>
+              </a:rPr>
+              <a:t>Audience</a:t>
+            </a:r>
+          </a:p>
+        </p:txBody>
+      </p:sp>
       <p:pic>
         <p:nvPicPr>
-          <p:cNvPr id="1026" name="Picture 2" descr="Project Jupyter - Wikipedia">
-            <a:extLst>
-              <a:ext uri="{FF2B5EF4-FFF2-40B4-BE49-F238E27FC236}">
-                <a16:creationId xmlns:a16="http://schemas.microsoft.com/office/drawing/2014/main" id="{2E199D10-634D-4257-BA3C-C6BFAF6D0A76}"/>
+          <p:cNvPr id="1026" name="Picture 2" descr="Movie Audience Wearing 3d Glasses Print Cinema Spectators | Etsy in 2022 |  3d glasses, Glasses print, Photo art">
+            <a:extLst>
+              <a:ext uri="{FF2B5EF4-FFF2-40B4-BE49-F238E27FC236}">
+                <a16:creationId xmlns:a16="http://schemas.microsoft.com/office/drawing/2014/main" id="{A97A21E1-767D-44BC-B0AD-D57A183ECFB7}"/>
               </a:ext>
             </a:extLst>
           </p:cNvPr>
@@ -8882,13 +7295,20 @@
         </p:blipFill>
         <p:spPr bwMode="auto">
           <a:xfrm>
-            <a:off x="4581999" y="1674108"/>
-            <a:ext cx="3028001" cy="3509783"/>
+            <a:off x="4424989" y="1628362"/>
+            <a:ext cx="3342022" cy="4177527"/>
           </a:xfrm>
           <a:prstGeom prst="rect">
             <a:avLst/>
           </a:prstGeom>
           <a:noFill/>
+          <a:effectLst>
+            <a:outerShdw blurRad="50800" dist="38100" dir="2700000" algn="tl" rotWithShape="0">
+              <a:prstClr val="black">
+                <a:alpha val="40000"/>
+              </a:prstClr>
+            </a:outerShdw>
+          </a:effectLst>
           <a:extLst>
             <a:ext uri="{909E8E84-426E-40DD-AFC4-6F175D3DCCD1}">
               <a14:hiddenFill xmlns:a14="http://schemas.microsoft.com/office/drawing/2010/main">
@@ -8903,7 +7323,7 @@
     </p:spTree>
     <p:extLst>
       <p:ext uri="{BB962C8B-B14F-4D97-AF65-F5344CB8AC3E}">
-        <p14:creationId xmlns:p14="http://schemas.microsoft.com/office/powerpoint/2010/main" val="2383651979"/>
+        <p14:creationId xmlns:p14="http://schemas.microsoft.com/office/powerpoint/2010/main" val="2037991049"/>
       </p:ext>
     </p:extLst>
   </p:cSld>
@@ -9682,38 +8102,55 @@
       </p:grpSpPr>
       <p:pic>
         <p:nvPicPr>
-          <p:cNvPr id="6" name="Picture 5">
-            <a:extLst>
-              <a:ext uri="{FF2B5EF4-FFF2-40B4-BE49-F238E27FC236}">
-                <a16:creationId xmlns:a16="http://schemas.microsoft.com/office/drawing/2014/main" id="{5212B4CC-59B9-452D-AFCB-6E4FCFC20CB8}"/>
+          <p:cNvPr id="1026" name="Picture 2" descr="Project Jupyter - Wikipedia">
+            <a:extLst>
+              <a:ext uri="{FF2B5EF4-FFF2-40B4-BE49-F238E27FC236}">
+                <a16:creationId xmlns:a16="http://schemas.microsoft.com/office/drawing/2014/main" id="{2E199D10-634D-4257-BA3C-C6BFAF6D0A76}"/>
               </a:ext>
             </a:extLst>
           </p:cNvPr>
           <p:cNvPicPr>
-            <a:picLocks noChangeAspect="1"/>
+            <a:picLocks noChangeAspect="1" noChangeArrowheads="1"/>
           </p:cNvPicPr>
           <p:nvPr/>
         </p:nvPicPr>
         <p:blipFill>
-          <a:blip r:embed="rId3"/>
+          <a:blip r:embed="rId3">
+            <a:extLst>
+              <a:ext uri="{28A0092B-C50C-407E-A947-70E740481C1C}">
+                <a14:useLocalDpi xmlns:a14="http://schemas.microsoft.com/office/drawing/2010/main" val="0"/>
+              </a:ext>
+            </a:extLst>
+          </a:blip>
+          <a:srcRect/>
           <a:stretch>
             <a:fillRect/>
           </a:stretch>
         </p:blipFill>
-        <p:spPr>
+        <p:spPr bwMode="auto">
           <a:xfrm>
-            <a:off x="4038600" y="1566862"/>
-            <a:ext cx="4114800" cy="3724275"/>
+            <a:off x="4581999" y="1674108"/>
+            <a:ext cx="3028001" cy="3509783"/>
           </a:xfrm>
           <a:prstGeom prst="rect">
             <a:avLst/>
           </a:prstGeom>
+          <a:noFill/>
+          <a:extLst>
+            <a:ext uri="{909E8E84-426E-40DD-AFC4-6F175D3DCCD1}">
+              <a14:hiddenFill xmlns:a14="http://schemas.microsoft.com/office/drawing/2010/main">
+                <a:solidFill>
+                  <a:srgbClr val="FFFFFF"/>
+                </a:solidFill>
+              </a14:hiddenFill>
+            </a:ext>
+          </a:extLst>
         </p:spPr>
       </p:pic>
     </p:spTree>
     <p:extLst>
       <p:ext uri="{BB962C8B-B14F-4D97-AF65-F5344CB8AC3E}">
-        <p14:creationId xmlns:p14="http://schemas.microsoft.com/office/powerpoint/2010/main" val="811428612"/>
+        <p14:creationId xmlns:p14="http://schemas.microsoft.com/office/powerpoint/2010/main" val="2383651979"/>
       </p:ext>
     </p:extLst>
   </p:cSld>
@@ -9752,63 +8189,12 @@
           <a:chExt cx="0" cy="0"/>
         </a:xfrm>
       </p:grpSpPr>
-      <p:sp>
-        <p:nvSpPr>
-          <p:cNvPr id="4" name="Title 3">
-            <a:extLst>
-              <a:ext uri="{FF2B5EF4-FFF2-40B4-BE49-F238E27FC236}">
-                <a16:creationId xmlns:a16="http://schemas.microsoft.com/office/drawing/2014/main" id="{A022B8E0-DD9C-49D7-82FB-ACD3443312AF}"/>
-              </a:ext>
-            </a:extLst>
-          </p:cNvPr>
-          <p:cNvSpPr>
-            <a:spLocks noGrp="1"/>
-          </p:cNvSpPr>
-          <p:nvPr>
-            <p:ph type="title"/>
-          </p:nvPr>
-        </p:nvSpPr>
-        <p:spPr>
-          <a:xfrm>
-            <a:off x="0" y="2766218"/>
-            <a:ext cx="12192000" cy="1325563"/>
-          </a:xfrm>
-        </p:spPr>
-        <p:txBody>
-          <a:bodyPr/>
-          <a:lstStyle/>
-          <a:p>
-            <a:pPr algn="ctr"/>
-            <a:r>
-              <a:rPr lang="en-US" sz="4400" dirty="0">
-                <a:solidFill>
-                  <a:schemeClr val="tx1">
-                    <a:lumMod val="65000"/>
-                    <a:lumOff val="35000"/>
-                  </a:schemeClr>
-                </a:solidFill>
-                <a:latin typeface="Palatino Linotype" panose="02040502050505030304" pitchFamily="18" charset="0"/>
-              </a:rPr>
-              <a:t>1: Order of Operations</a:t>
-            </a:r>
-            <a:endParaRPr lang="en-US" dirty="0">
-              <a:solidFill>
-                <a:schemeClr val="tx1">
-                  <a:lumMod val="65000"/>
-                  <a:lumOff val="35000"/>
-                </a:schemeClr>
-              </a:solidFill>
-              <a:latin typeface="Palatino Linotype" panose="02040502050505030304" pitchFamily="18" charset="0"/>
-            </a:endParaRPr>
-          </a:p>
-        </p:txBody>
-      </p:sp>
       <p:pic>
         <p:nvPicPr>
-          <p:cNvPr id="3" name="Picture 2">
-            <a:extLst>
-              <a:ext uri="{FF2B5EF4-FFF2-40B4-BE49-F238E27FC236}">
-                <a16:creationId xmlns:a16="http://schemas.microsoft.com/office/drawing/2014/main" id="{1BB76F47-07B7-4B3D-AEA7-FB9B67125C17}"/>
+          <p:cNvPr id="6" name="Picture 5">
+            <a:extLst>
+              <a:ext uri="{FF2B5EF4-FFF2-40B4-BE49-F238E27FC236}">
+                <a16:creationId xmlns:a16="http://schemas.microsoft.com/office/drawing/2014/main" id="{5212B4CC-59B9-452D-AFCB-6E4FCFC20CB8}"/>
               </a:ext>
             </a:extLst>
           </p:cNvPr>
@@ -9825,8 +8211,8 @@
         </p:blipFill>
         <p:spPr>
           <a:xfrm>
-            <a:off x="0" y="365760"/>
-            <a:ext cx="3233668" cy="805144"/>
+            <a:off x="4038600" y="1566862"/>
+            <a:ext cx="4114800" cy="3724275"/>
           </a:xfrm>
           <a:prstGeom prst="rect">
             <a:avLst/>
@@ -9836,7 +8222,7 @@
     </p:spTree>
     <p:extLst>
       <p:ext uri="{BB962C8B-B14F-4D97-AF65-F5344CB8AC3E}">
-        <p14:creationId xmlns:p14="http://schemas.microsoft.com/office/powerpoint/2010/main" val="2261991877"/>
+        <p14:creationId xmlns:p14="http://schemas.microsoft.com/office/powerpoint/2010/main" val="811428612"/>
       </p:ext>
     </p:extLst>
   </p:cSld>
@@ -10162,152 +8548,138 @@
           <a:chExt cx="0" cy="0"/>
         </a:xfrm>
       </p:grpSpPr>
-      <p:sp>
-        <p:nvSpPr>
-          <p:cNvPr id="4" name="Title 3">
-            <a:extLst>
-              <a:ext uri="{FF2B5EF4-FFF2-40B4-BE49-F238E27FC236}">
-                <a16:creationId xmlns:a16="http://schemas.microsoft.com/office/drawing/2014/main" id="{A022B8E0-DD9C-49D7-82FB-ACD3443312AF}"/>
-              </a:ext>
-            </a:extLst>
-          </p:cNvPr>
-          <p:cNvSpPr>
-            <a:spLocks noGrp="1"/>
-          </p:cNvSpPr>
-          <p:nvPr>
-            <p:ph type="title"/>
-          </p:nvPr>
+      <p:pic>
+        <p:nvPicPr>
+          <p:cNvPr id="2050" name="Picture 2" descr="Icon of Adam Naming the Animals - 15th c. Meteora - (1AA10) - Uncut  Mountain Supply">
+            <a:extLst>
+              <a:ext uri="{FF2B5EF4-FFF2-40B4-BE49-F238E27FC236}">
+                <a16:creationId xmlns:a16="http://schemas.microsoft.com/office/drawing/2014/main" id="{A8A604AE-38F9-4BA8-858C-E33429DF7680}"/>
+              </a:ext>
+            </a:extLst>
+          </p:cNvPr>
+          <p:cNvPicPr>
+            <a:picLocks noChangeAspect="1" noChangeArrowheads="1"/>
+          </p:cNvPicPr>
+          <p:nvPr/>
+        </p:nvPicPr>
+        <p:blipFill>
+          <a:blip r:embed="rId3">
+            <a:extLst>
+              <a:ext uri="{28A0092B-C50C-407E-A947-70E740481C1C}">
+                <a14:useLocalDpi xmlns:a14="http://schemas.microsoft.com/office/drawing/2010/main" val="0"/>
+              </a:ext>
+            </a:extLst>
+          </a:blip>
+          <a:srcRect/>
+          <a:stretch>
+            <a:fillRect/>
+          </a:stretch>
+        </p:blipFill>
+        <p:spPr bwMode="auto">
+          <a:xfrm>
+            <a:off x="2785598" y="1290062"/>
+            <a:ext cx="6620804" cy="4277875"/>
+          </a:xfrm>
+          <a:prstGeom prst="rect">
+            <a:avLst/>
+          </a:prstGeom>
+          <a:noFill/>
+          <a:ln w="3175">
+            <a:solidFill>
+              <a:schemeClr val="tx1">
+                <a:lumMod val="75000"/>
+                <a:lumOff val="25000"/>
+              </a:schemeClr>
+            </a:solidFill>
+          </a:ln>
+          <a:effectLst>
+            <a:outerShdw blurRad="50800" dist="38100" dir="2700000" algn="tl" rotWithShape="0">
+              <a:prstClr val="black">
+                <a:alpha val="40000"/>
+              </a:prstClr>
+            </a:outerShdw>
+          </a:effectLst>
+          <a:extLst>
+            <a:ext uri="{909E8E84-426E-40DD-AFC4-6F175D3DCCD1}">
+              <a14:hiddenFill xmlns:a14="http://schemas.microsoft.com/office/drawing/2010/main">
+                <a:solidFill>
+                  <a:srgbClr val="FFFFFF"/>
+                </a:solidFill>
+              </a14:hiddenFill>
+            </a:ext>
+          </a:extLst>
+        </p:spPr>
+      </p:pic>
+      <p:sp>
+        <p:nvSpPr>
+          <p:cNvPr id="6" name="TextBox 5">
+            <a:extLst>
+              <a:ext uri="{FF2B5EF4-FFF2-40B4-BE49-F238E27FC236}">
+                <a16:creationId xmlns:a16="http://schemas.microsoft.com/office/drawing/2014/main" id="{29F3E589-6F1A-4BB3-B969-F58FCA3DE9E0}"/>
+              </a:ext>
+            </a:extLst>
+          </p:cNvPr>
+          <p:cNvSpPr txBox="1"/>
+          <p:nvPr/>
         </p:nvSpPr>
         <p:spPr>
           <a:xfrm>
-            <a:off x="0" y="2916690"/>
-            <a:ext cx="12192000" cy="916329"/>
+            <a:off x="0" y="6550223"/>
+            <a:ext cx="12192000" cy="307777"/>
           </a:xfrm>
+          <a:prstGeom prst="rect">
+            <a:avLst/>
+          </a:prstGeom>
+          <a:noFill/>
         </p:spPr>
         <p:txBody>
-          <a:bodyPr/>
-          <a:lstStyle/>
-          <a:p>
-            <a:r>
-              <a:rPr lang="en-US" sz="4400" dirty="0">
+          <a:bodyPr wrap="square" rtlCol="0">
+            <a:spAutoFit/>
+          </a:bodyPr>
+          <a:lstStyle/>
+          <a:p>
+            <a:r>
+              <a:rPr lang="en-US" sz="1400" dirty="0">
                 <a:solidFill>
                   <a:schemeClr val="tx1">
                     <a:lumMod val="65000"/>
                     <a:lumOff val="35000"/>
                   </a:schemeClr>
                 </a:solidFill>
-                <a:latin typeface="Palatino Linotype" panose="02040502050505030304" pitchFamily="18" charset="0"/>
+                <a:latin typeface="+mj-lt"/>
+                <a:ea typeface="Verdana" panose="020B0604030504040204" pitchFamily="34" charset="0"/>
               </a:rPr>
-              <a:t>			2: Integer &amp; Float Types</a:t>
-            </a:r>
-            <a:endParaRPr lang="en-US" dirty="0">
+              <a:t>Image Credit: </a:t>
+            </a:r>
+            <a:r>
+              <a:rPr lang="en-US" sz="1400" dirty="0">
+                <a:solidFill>
+                  <a:schemeClr val="tx1">
+                    <a:lumMod val="65000"/>
+                    <a:lumOff val="35000"/>
+                  </a:schemeClr>
+                </a:solidFill>
+                <a:latin typeface="+mj-lt"/>
+              </a:rPr>
+              <a:t>https://www.uncutmountainsupply.com/icons/of-saints/by-name/a/icon-of-adam-naming-the-animals-15th-c-meteora-1aa10/</a:t>
+            </a:r>
+            <a:endParaRPr lang="en-US" sz="1400" dirty="0">
               <a:solidFill>
                 <a:schemeClr val="tx1">
                   <a:lumMod val="65000"/>
                   <a:lumOff val="35000"/>
                 </a:schemeClr>
               </a:solidFill>
-              <a:latin typeface="Palatino Linotype" panose="02040502050505030304" pitchFamily="18" charset="0"/>
+              <a:latin typeface="+mj-lt"/>
+              <a:ea typeface="Verdana" panose="020B0604030504040204" pitchFamily="34" charset="0"/>
             </a:endParaRPr>
-          </a:p>
-        </p:txBody>
-      </p:sp>
-      <p:pic>
-        <p:nvPicPr>
-          <p:cNvPr id="3" name="Picture 2">
-            <a:extLst>
-              <a:ext uri="{FF2B5EF4-FFF2-40B4-BE49-F238E27FC236}">
-                <a16:creationId xmlns:a16="http://schemas.microsoft.com/office/drawing/2014/main" id="{B9BA4890-A549-4FB7-B9C3-A09D71B504A2}"/>
-              </a:ext>
-            </a:extLst>
-          </p:cNvPr>
-          <p:cNvPicPr>
-            <a:picLocks noChangeAspect="1"/>
-          </p:cNvPicPr>
-          <p:nvPr/>
-        </p:nvPicPr>
-        <p:blipFill>
-          <a:blip r:embed="rId3"/>
-          <a:stretch>
-            <a:fillRect/>
-          </a:stretch>
-        </p:blipFill>
-        <p:spPr>
-          <a:xfrm>
-            <a:off x="0" y="365760"/>
-            <a:ext cx="3233668" cy="805144"/>
-          </a:xfrm>
-          <a:prstGeom prst="rect">
-            <a:avLst/>
-          </a:prstGeom>
-        </p:spPr>
-      </p:pic>
-      <p:sp>
-        <p:nvSpPr>
-          <p:cNvPr id="5" name="Title 3">
-            <a:extLst>
-              <a:ext uri="{FF2B5EF4-FFF2-40B4-BE49-F238E27FC236}">
-                <a16:creationId xmlns:a16="http://schemas.microsoft.com/office/drawing/2014/main" id="{001E5E7E-11A1-4A70-8A2D-6965FAEA7CCA}"/>
-              </a:ext>
-            </a:extLst>
-          </p:cNvPr>
-          <p:cNvSpPr txBox="1">
-            <a:spLocks/>
-          </p:cNvSpPr>
-          <p:nvPr/>
-        </p:nvSpPr>
-        <p:spPr>
-          <a:xfrm>
-            <a:off x="0" y="3833019"/>
-            <a:ext cx="12192000" cy="916330"/>
-          </a:xfrm>
-          <a:prstGeom prst="rect">
-            <a:avLst/>
-          </a:prstGeom>
-        </p:spPr>
-        <p:txBody>
-          <a:bodyPr vert="horz" lIns="91440" tIns="45720" rIns="91440" bIns="45720" rtlCol="0" anchor="ctr">
-            <a:normAutofit/>
-          </a:bodyPr>
-          <a:lstStyle>
-            <a:lvl1pPr algn="l" defTabSz="914400" rtl="0" eaLnBrk="1" latinLnBrk="0" hangingPunct="1">
-              <a:lnSpc>
-                <a:spcPct val="90000"/>
-              </a:lnSpc>
-              <a:spcBef>
-                <a:spcPct val="0"/>
-              </a:spcBef>
-              <a:buNone/>
-              <a:defRPr sz="4400" kern="1200">
-                <a:solidFill>
-                  <a:schemeClr val="tx1"/>
-                </a:solidFill>
-                <a:latin typeface="+mj-lt"/>
-                <a:ea typeface="+mj-ea"/>
-                <a:cs typeface="+mj-cs"/>
-              </a:defRPr>
-            </a:lvl1pPr>
-          </a:lstStyle>
-          <a:p>
-            <a:r>
-              <a:rPr lang="en-US" dirty="0">
-                <a:solidFill>
-                  <a:schemeClr val="tx1">
-                    <a:lumMod val="65000"/>
-                    <a:lumOff val="35000"/>
-                  </a:schemeClr>
-                </a:solidFill>
-                <a:latin typeface="Palatino Linotype" panose="02040502050505030304" pitchFamily="18" charset="0"/>
-              </a:rPr>
-              <a:t>			3: Assigning Variables</a:t>
-            </a:r>
           </a:p>
         </p:txBody>
       </p:sp>
     </p:spTree>
     <p:extLst>
       <p:ext uri="{BB962C8B-B14F-4D97-AF65-F5344CB8AC3E}">
-        <p14:creationId xmlns:p14="http://schemas.microsoft.com/office/powerpoint/2010/main" val="491246926"/>
+        <p14:creationId xmlns:p14="http://schemas.microsoft.com/office/powerpoint/2010/main" val="4083169647"/>
       </p:ext>
     </p:extLst>
   </p:cSld>

</xml_diff>

<commit_message>
Added a code block for reading csv file from GitHub repo + minor edits to presentation.
</commit_message>
<xml_diff>
--- a/presentations/01_getting_started.pptx
+++ b/presentations/01_getting_started.pptx
@@ -1215,6 +1215,12 @@
         <p:txBody>
           <a:bodyPr/>
           <a:lstStyle/>
+          <a:p>
+            <a:r>
+              <a:rPr lang="en-US" dirty="0"/>
+              <a:t>The learning objectives for each Python session can be found here: https://github.com/PracticumAI/python</a:t>
+            </a:r>
+          </a:p>
           <a:p>
             <a:endParaRPr lang="en-US" dirty="0"/>
           </a:p>
@@ -7320,6 +7326,68 @@
           </a:extLst>
         </p:spPr>
       </p:pic>
+      <p:sp>
+        <p:nvSpPr>
+          <p:cNvPr id="4" name="TextBox 3">
+            <a:extLst>
+              <a:ext uri="{FF2B5EF4-FFF2-40B4-BE49-F238E27FC236}">
+                <a16:creationId xmlns:a16="http://schemas.microsoft.com/office/drawing/2014/main" id="{D9374C58-4DB1-4DF7-A3B9-688B76E7FA7B}"/>
+              </a:ext>
+            </a:extLst>
+          </p:cNvPr>
+          <p:cNvSpPr txBox="1"/>
+          <p:nvPr/>
+        </p:nvSpPr>
+        <p:spPr>
+          <a:xfrm>
+            <a:off x="0" y="6550223"/>
+            <a:ext cx="12192000" cy="523220"/>
+          </a:xfrm>
+          <a:prstGeom prst="rect">
+            <a:avLst/>
+          </a:prstGeom>
+          <a:noFill/>
+        </p:spPr>
+        <p:txBody>
+          <a:bodyPr wrap="square" rtlCol="0">
+            <a:spAutoFit/>
+          </a:bodyPr>
+          <a:lstStyle/>
+          <a:p>
+            <a:r>
+              <a:rPr lang="en-US" sz="1400" dirty="0">
+                <a:solidFill>
+                  <a:schemeClr val="tx1">
+                    <a:lumMod val="65000"/>
+                    <a:lumOff val="35000"/>
+                  </a:schemeClr>
+                </a:solidFill>
+                <a:latin typeface="+mj-lt"/>
+                <a:ea typeface="Verdana" panose="020B0604030504040204" pitchFamily="34" charset="0"/>
+              </a:rPr>
+              <a:t>Image Credit: </a:t>
+            </a:r>
+            <a:r>
+              <a:rPr lang="en-US" sz="1400" dirty="0">
+                <a:latin typeface="+mj-lt"/>
+              </a:rPr>
+              <a:t>https://www.pinterest.com/pin/movie-audience-wearing-3d-glasses-print-cinema-spectators--1125829606821478194/</a:t>
+            </a:r>
+          </a:p>
+          <a:p>
+            <a:endParaRPr lang="en-US" sz="1400" dirty="0">
+              <a:solidFill>
+                <a:schemeClr val="tx1">
+                  <a:lumMod val="65000"/>
+                  <a:lumOff val="35000"/>
+                </a:schemeClr>
+              </a:solidFill>
+              <a:latin typeface="+mj-lt"/>
+              <a:ea typeface="Verdana" panose="020B0604030504040204" pitchFamily="34" charset="0"/>
+            </a:endParaRPr>
+          </a:p>
+        </p:txBody>
+      </p:sp>
     </p:spTree>
     <p:extLst>
       <p:ext uri="{BB962C8B-B14F-4D97-AF65-F5344CB8AC3E}">

</xml_diff>

<commit_message>
Added book recommendations slide.
</commit_message>
<xml_diff>
--- a/presentations/01_getting_started.pptx
+++ b/presentations/01_getting_started.pptx
@@ -5,24 +5,25 @@
     <p:sldMasterId id="2147483648" r:id="rId1"/>
   </p:sldMasterIdLst>
   <p:notesMasterIdLst>
-    <p:notesMasterId r:id="rId17"/>
+    <p:notesMasterId r:id="rId18"/>
   </p:notesMasterIdLst>
   <p:sldIdLst>
     <p:sldId id="324" r:id="rId2"/>
     <p:sldId id="266" r:id="rId3"/>
     <p:sldId id="326" r:id="rId4"/>
     <p:sldId id="304" r:id="rId5"/>
-    <p:sldId id="323" r:id="rId6"/>
-    <p:sldId id="278" r:id="rId7"/>
-    <p:sldId id="282" r:id="rId8"/>
-    <p:sldId id="277" r:id="rId9"/>
-    <p:sldId id="280" r:id="rId10"/>
-    <p:sldId id="287" r:id="rId11"/>
-    <p:sldId id="296" r:id="rId12"/>
-    <p:sldId id="289" r:id="rId13"/>
-    <p:sldId id="293" r:id="rId14"/>
-    <p:sldId id="276" r:id="rId15"/>
-    <p:sldId id="325" r:id="rId16"/>
+    <p:sldId id="327" r:id="rId6"/>
+    <p:sldId id="323" r:id="rId7"/>
+    <p:sldId id="278" r:id="rId8"/>
+    <p:sldId id="282" r:id="rId9"/>
+    <p:sldId id="277" r:id="rId10"/>
+    <p:sldId id="280" r:id="rId11"/>
+    <p:sldId id="287" r:id="rId12"/>
+    <p:sldId id="296" r:id="rId13"/>
+    <p:sldId id="289" r:id="rId14"/>
+    <p:sldId id="293" r:id="rId15"/>
+    <p:sldId id="276" r:id="rId16"/>
+    <p:sldId id="325" r:id="rId17"/>
   </p:sldIdLst>
   <p:sldSz cx="12192000" cy="6858000"/>
   <p:notesSz cx="6858000" cy="9144000"/>
@@ -222,7 +223,7 @@
           <a:p>
             <a:fld id="{FD93C9B2-20F6-4DB1-B471-224337D0AC79}" type="datetimeFigureOut">
               <a:rPr lang="en-US" smtClean="0"/>
-              <a:t>6/1/2022</a:t>
+              <a:t>6/3/2022</a:t>
             </a:fld>
             <a:endParaRPr lang="en-US"/>
           </a:p>
@@ -641,7 +642,10 @@
               <a:tabLst/>
               <a:defRPr/>
             </a:pPr>
-            <a:endParaRPr lang="en-US" dirty="0"/>
+            <a:r>
+              <a:rPr lang="en-US" dirty="0"/>
+              <a:t>Adam naming the animals in the Biblical story.  Variable naming and standards are critically important.</a:t>
+            </a:r>
           </a:p>
         </p:txBody>
       </p:sp>
@@ -671,7 +675,7 @@
     </p:spTree>
     <p:extLst>
       <p:ext uri="{BB962C8B-B14F-4D97-AF65-F5344CB8AC3E}">
-        <p14:creationId xmlns:p14="http://schemas.microsoft.com/office/powerpoint/2010/main" val="2996454508"/>
+        <p14:creationId xmlns:p14="http://schemas.microsoft.com/office/powerpoint/2010/main" val="828379136"/>
       </p:ext>
     </p:extLst>
   </p:cSld>
@@ -772,7 +776,7 @@
     </p:spTree>
     <p:extLst>
       <p:ext uri="{BB962C8B-B14F-4D97-AF65-F5344CB8AC3E}">
-        <p14:creationId xmlns:p14="http://schemas.microsoft.com/office/powerpoint/2010/main" val="30799508"/>
+        <p14:creationId xmlns:p14="http://schemas.microsoft.com/office/powerpoint/2010/main" val="2996454508"/>
       </p:ext>
     </p:extLst>
   </p:cSld>
@@ -873,7 +877,7 @@
     </p:spTree>
     <p:extLst>
       <p:ext uri="{BB962C8B-B14F-4D97-AF65-F5344CB8AC3E}">
-        <p14:creationId xmlns:p14="http://schemas.microsoft.com/office/powerpoint/2010/main" val="555085068"/>
+        <p14:creationId xmlns:p14="http://schemas.microsoft.com/office/powerpoint/2010/main" val="30799508"/>
       </p:ext>
     </p:extLst>
   </p:cSld>
@@ -974,7 +978,7 @@
     </p:spTree>
     <p:extLst>
       <p:ext uri="{BB962C8B-B14F-4D97-AF65-F5344CB8AC3E}">
-        <p14:creationId xmlns:p14="http://schemas.microsoft.com/office/powerpoint/2010/main" val="651591465"/>
+        <p14:creationId xmlns:p14="http://schemas.microsoft.com/office/powerpoint/2010/main" val="555085068"/>
       </p:ext>
     </p:extLst>
   </p:cSld>
@@ -1045,10 +1049,7 @@
               <a:tabLst/>
               <a:defRPr/>
             </a:pPr>
-            <a:r>
-              <a:rPr lang="en-US" dirty="0"/>
-              <a:t>Interpreted languages are much slower than compiled languages.  When performance matters, an interpreted language may not be the best solution.  If that’s the case with you, Nvidia provides the Cuda development environment which supports the C and C++ languages.  These are compiled languages as opposed to interpreted. </a:t>
-            </a:r>
+            <a:endParaRPr lang="en-US" dirty="0"/>
           </a:p>
         </p:txBody>
       </p:sp>
@@ -1078,7 +1079,7 @@
     </p:spTree>
     <p:extLst>
       <p:ext uri="{BB962C8B-B14F-4D97-AF65-F5344CB8AC3E}">
-        <p14:creationId xmlns:p14="http://schemas.microsoft.com/office/powerpoint/2010/main" val="4129922841"/>
+        <p14:creationId xmlns:p14="http://schemas.microsoft.com/office/powerpoint/2010/main" val="651591465"/>
       </p:ext>
     </p:extLst>
   </p:cSld>
@@ -1132,7 +1133,27 @@
           <a:bodyPr/>
           <a:lstStyle/>
           <a:p>
-            <a:endParaRPr lang="en-US" dirty="0"/>
+            <a:pPr marL="0" marR="0" lvl="0" indent="0" algn="l" defTabSz="914400" rtl="0" eaLnBrk="1" fontAlgn="auto" latinLnBrk="0" hangingPunct="1">
+              <a:lnSpc>
+                <a:spcPct val="100000"/>
+              </a:lnSpc>
+              <a:spcBef>
+                <a:spcPts val="0"/>
+              </a:spcBef>
+              <a:spcAft>
+                <a:spcPts val="0"/>
+              </a:spcAft>
+              <a:buClrTx/>
+              <a:buSzTx/>
+              <a:buFontTx/>
+              <a:buNone/>
+              <a:tabLst/>
+              <a:defRPr/>
+            </a:pPr>
+            <a:r>
+              <a:rPr lang="en-US" dirty="0"/>
+              <a:t>Interpreted languages are much slower than compiled languages.  When performance matters, an interpreted language may not be the best solution.  If that’s the case with you, Nvidia provides the Cuda development environment which supports the C and C++ languages.  These are compiled languages as opposed to interpreted. </a:t>
+            </a:r>
           </a:p>
         </p:txBody>
       </p:sp>
@@ -1154,6 +1175,90 @@
             <a:fld id="{3148858F-F1DB-4027-9C85-CCA6849540DD}" type="slidenum">
               <a:rPr lang="en-US" smtClean="0"/>
               <a:t>15</a:t>
+            </a:fld>
+            <a:endParaRPr lang="en-US"/>
+          </a:p>
+        </p:txBody>
+      </p:sp>
+    </p:spTree>
+    <p:extLst>
+      <p:ext uri="{BB962C8B-B14F-4D97-AF65-F5344CB8AC3E}">
+        <p14:creationId xmlns:p14="http://schemas.microsoft.com/office/powerpoint/2010/main" val="4129922841"/>
+      </p:ext>
+    </p:extLst>
+  </p:cSld>
+  <p:clrMapOvr>
+    <a:masterClrMapping/>
+  </p:clrMapOvr>
+</p:notes>
+</file>
+
+<file path=ppt/notesSlides/notesSlide16.xml><?xml version="1.0" encoding="utf-8"?>
+<p:notes xmlns:a="http://schemas.openxmlformats.org/drawingml/2006/main" xmlns:r="http://schemas.openxmlformats.org/officeDocument/2006/relationships" xmlns:p="http://schemas.openxmlformats.org/presentationml/2006/main">
+  <p:cSld>
+    <p:spTree>
+      <p:nvGrpSpPr>
+        <p:cNvPr id="1" name=""/>
+        <p:cNvGrpSpPr/>
+        <p:nvPr/>
+      </p:nvGrpSpPr>
+      <p:grpSpPr>
+        <a:xfrm>
+          <a:off x="0" y="0"/>
+          <a:ext cx="0" cy="0"/>
+          <a:chOff x="0" y="0"/>
+          <a:chExt cx="0" cy="0"/>
+        </a:xfrm>
+      </p:grpSpPr>
+      <p:sp>
+        <p:nvSpPr>
+          <p:cNvPr id="2" name="Slide Image Placeholder 1"/>
+          <p:cNvSpPr>
+            <a:spLocks noGrp="1" noRot="1" noChangeAspect="1"/>
+          </p:cNvSpPr>
+          <p:nvPr>
+            <p:ph type="sldImg"/>
+          </p:nvPr>
+        </p:nvSpPr>
+        <p:spPr/>
+      </p:sp>
+      <p:sp>
+        <p:nvSpPr>
+          <p:cNvPr id="3" name="Notes Placeholder 2"/>
+          <p:cNvSpPr>
+            <a:spLocks noGrp="1"/>
+          </p:cNvSpPr>
+          <p:nvPr>
+            <p:ph type="body" idx="1"/>
+          </p:nvPr>
+        </p:nvSpPr>
+        <p:spPr/>
+        <p:txBody>
+          <a:bodyPr/>
+          <a:lstStyle/>
+          <a:p>
+            <a:endParaRPr lang="en-US" dirty="0"/>
+          </a:p>
+        </p:txBody>
+      </p:sp>
+      <p:sp>
+        <p:nvSpPr>
+          <p:cNvPr id="4" name="Slide Number Placeholder 3"/>
+          <p:cNvSpPr>
+            <a:spLocks noGrp="1"/>
+          </p:cNvSpPr>
+          <p:nvPr>
+            <p:ph type="sldNum" sz="quarter" idx="5"/>
+          </p:nvPr>
+        </p:nvSpPr>
+        <p:spPr/>
+        <p:txBody>
+          <a:bodyPr/>
+          <a:lstStyle/>
+          <a:p>
+            <a:fld id="{3148858F-F1DB-4027-9C85-CCA6849540DD}" type="slidenum">
+              <a:rPr lang="en-US" smtClean="0"/>
+              <a:t>16</a:t>
             </a:fld>
             <a:endParaRPr lang="en-US"/>
           </a:p>
@@ -2413,27 +2518,7 @@
           <a:bodyPr/>
           <a:lstStyle/>
           <a:p>
-            <a:pPr marL="0" marR="0" lvl="0" indent="0" algn="l" defTabSz="914400" rtl="0" eaLnBrk="1" fontAlgn="auto" latinLnBrk="0" hangingPunct="1">
-              <a:lnSpc>
-                <a:spcPct val="100000"/>
-              </a:lnSpc>
-              <a:spcBef>
-                <a:spcPts val="0"/>
-              </a:spcBef>
-              <a:spcAft>
-                <a:spcPts val="0"/>
-              </a:spcAft>
-              <a:buClrTx/>
-              <a:buSzTx/>
-              <a:buFontTx/>
-              <a:buNone/>
-              <a:tabLst/>
-              <a:defRPr/>
-            </a:pPr>
-            <a:r>
-              <a:rPr lang="en-US" dirty="0"/>
-              <a:t>Setup Instructions…</a:t>
-            </a:r>
+            <a:endParaRPr lang="en-US" dirty="0"/>
           </a:p>
         </p:txBody>
       </p:sp>
@@ -2463,7 +2548,7 @@
     </p:spTree>
     <p:extLst>
       <p:ext uri="{BB962C8B-B14F-4D97-AF65-F5344CB8AC3E}">
-        <p14:creationId xmlns:p14="http://schemas.microsoft.com/office/powerpoint/2010/main" val="1279646560"/>
+        <p14:creationId xmlns:p14="http://schemas.microsoft.com/office/powerpoint/2010/main" val="771029687"/>
       </p:ext>
     </p:extLst>
   </p:cSld>
@@ -2534,7 +2619,10 @@
               <a:tabLst/>
               <a:defRPr/>
             </a:pPr>
-            <a:endParaRPr lang="en-US" dirty="0"/>
+            <a:r>
+              <a:rPr lang="en-US" dirty="0"/>
+              <a:t>Setup Instructions…</a:t>
+            </a:r>
           </a:p>
         </p:txBody>
       </p:sp>
@@ -2564,7 +2652,7 @@
     </p:spTree>
     <p:extLst>
       <p:ext uri="{BB962C8B-B14F-4D97-AF65-F5344CB8AC3E}">
-        <p14:creationId xmlns:p14="http://schemas.microsoft.com/office/powerpoint/2010/main" val="4054386845"/>
+        <p14:creationId xmlns:p14="http://schemas.microsoft.com/office/powerpoint/2010/main" val="1279646560"/>
       </p:ext>
     </p:extLst>
   </p:cSld>
@@ -2618,25 +2706,6 @@
           <a:bodyPr/>
           <a:lstStyle/>
           <a:p>
-            <a:r>
-              <a:rPr lang="en-US" baseline="0" dirty="0"/>
-              <a:t>In computer science, a variable is a named location in memory.  Consider this clear plastic container with a variety of objects in it.  Each object is a specific size and takes up a certain amount of space.  Now think of this container as your computer’s memory.  Each time you create and assign a specific value to a variable, the software allocates space in memory large enough to contain whatever you assign to it.  Or using a container analogy,  it creates a box to hold its value.  The variable’s </a:t>
-            </a:r>
-            <a:r>
-              <a:rPr lang="en-US" b="1" baseline="0" dirty="0"/>
-              <a:t>datatype </a:t>
-            </a:r>
-            <a:r>
-              <a:rPr lang="en-US" b="0" baseline="0" dirty="0"/>
-              <a:t>determines the amount of memory required to hold it, just as we see in this picture.  </a:t>
-            </a:r>
-            <a:r>
-              <a:rPr lang="en-US" baseline="0" dirty="0"/>
-              <a:t>Behind the name you use for a variable, there’s a hidden address or pointer to its location or compartment in memory.</a:t>
-            </a:r>
-            <a:endParaRPr lang="en-US" dirty="0"/>
-          </a:p>
-          <a:p>
             <a:pPr marL="0" marR="0" lvl="0" indent="0" algn="l" defTabSz="914400" rtl="0" eaLnBrk="1" fontAlgn="auto" latinLnBrk="0" hangingPunct="1">
               <a:lnSpc>
                 <a:spcPct val="100000"/>
@@ -2684,7 +2753,7 @@
     </p:spTree>
     <p:extLst>
       <p:ext uri="{BB962C8B-B14F-4D97-AF65-F5344CB8AC3E}">
-        <p14:creationId xmlns:p14="http://schemas.microsoft.com/office/powerpoint/2010/main" val="2360977460"/>
+        <p14:creationId xmlns:p14="http://schemas.microsoft.com/office/powerpoint/2010/main" val="4054386845"/>
       </p:ext>
     </p:extLst>
   </p:cSld>
@@ -2738,27 +2807,23 @@
           <a:bodyPr/>
           <a:lstStyle/>
           <a:p>
-            <a:pPr marL="0" marR="0" lvl="0" indent="0" algn="l" defTabSz="914400" rtl="0" eaLnBrk="1" fontAlgn="auto" latinLnBrk="0" hangingPunct="1">
-              <a:lnSpc>
-                <a:spcPct val="100000"/>
-              </a:lnSpc>
-              <a:spcBef>
-                <a:spcPts val="0"/>
-              </a:spcBef>
-              <a:spcAft>
-                <a:spcPts val="0"/>
-              </a:spcAft>
-              <a:buClrTx/>
-              <a:buSzTx/>
-              <a:buFontTx/>
-              <a:buNone/>
-              <a:tabLst/>
-              <a:defRPr/>
-            </a:pPr>
-            <a:r>
-              <a:rPr lang="en-US" dirty="0"/>
-              <a:t>And this graphic shows Python’s datatypes.</a:t>
-            </a:r>
+            <a:r>
+              <a:rPr lang="en-US" baseline="0" dirty="0"/>
+              <a:t>In computer science, a variable is a named location in memory.  Consider this clear plastic container with a variety of objects in it.  Each object is a specific size and takes up a certain amount of space.  Now think of this container as your computer’s memory.  Each time you create and assign a specific value to a variable, the software allocates space in memory large enough to contain whatever you assign to it.  Or using a container analogy,  it creates a box to hold its value.  The variable’s </a:t>
+            </a:r>
+            <a:r>
+              <a:rPr lang="en-US" b="1" baseline="0" dirty="0"/>
+              <a:t>datatype </a:t>
+            </a:r>
+            <a:r>
+              <a:rPr lang="en-US" b="0" baseline="0" dirty="0"/>
+              <a:t>determines the amount of memory required to hold it, just as we see in this picture.  </a:t>
+            </a:r>
+            <a:r>
+              <a:rPr lang="en-US" baseline="0" dirty="0"/>
+              <a:t>Behind the name you use for a variable, there’s a hidden address or pointer to its location or compartment in memory.</a:t>
+            </a:r>
+            <a:endParaRPr lang="en-US" dirty="0"/>
           </a:p>
           <a:p>
             <a:pPr marL="0" marR="0" lvl="0" indent="0" algn="l" defTabSz="914400" rtl="0" eaLnBrk="1" fontAlgn="auto" latinLnBrk="0" hangingPunct="1">
@@ -2780,29 +2845,6 @@
             </a:pPr>
             <a:endParaRPr lang="en-US" dirty="0"/>
           </a:p>
-          <a:p>
-            <a:pPr marL="0" marR="0" lvl="0" indent="0" algn="l" defTabSz="914400" rtl="0" eaLnBrk="1" fontAlgn="auto" latinLnBrk="0" hangingPunct="1">
-              <a:lnSpc>
-                <a:spcPct val="100000"/>
-              </a:lnSpc>
-              <a:spcBef>
-                <a:spcPts val="0"/>
-              </a:spcBef>
-              <a:spcAft>
-                <a:spcPts val="0"/>
-              </a:spcAft>
-              <a:buClrTx/>
-              <a:buSzTx/>
-              <a:buFontTx/>
-              <a:buNone/>
-              <a:tabLst/>
-              <a:defRPr/>
-            </a:pPr>
-            <a:r>
-              <a:rPr lang="en-US" dirty="0"/>
-              <a:t>https://pynative.com/python-data-types/</a:t>
-            </a:r>
-          </a:p>
         </p:txBody>
       </p:sp>
       <p:sp>
@@ -2831,7 +2873,7 @@
     </p:spTree>
     <p:extLst>
       <p:ext uri="{BB962C8B-B14F-4D97-AF65-F5344CB8AC3E}">
-        <p14:creationId xmlns:p14="http://schemas.microsoft.com/office/powerpoint/2010/main" val="62286822"/>
+        <p14:creationId xmlns:p14="http://schemas.microsoft.com/office/powerpoint/2010/main" val="2360977460"/>
       </p:ext>
     </p:extLst>
   </p:cSld>
@@ -2904,7 +2946,50 @@
             </a:pPr>
             <a:r>
               <a:rPr lang="en-US" dirty="0"/>
-              <a:t>Adam naming the animals in the Biblical story.  Variable naming and standards are critically important.</a:t>
+              <a:t>And this graphic shows Python’s datatypes.</a:t>
+            </a:r>
+          </a:p>
+          <a:p>
+            <a:pPr marL="0" marR="0" lvl="0" indent="0" algn="l" defTabSz="914400" rtl="0" eaLnBrk="1" fontAlgn="auto" latinLnBrk="0" hangingPunct="1">
+              <a:lnSpc>
+                <a:spcPct val="100000"/>
+              </a:lnSpc>
+              <a:spcBef>
+                <a:spcPts val="0"/>
+              </a:spcBef>
+              <a:spcAft>
+                <a:spcPts val="0"/>
+              </a:spcAft>
+              <a:buClrTx/>
+              <a:buSzTx/>
+              <a:buFontTx/>
+              <a:buNone/>
+              <a:tabLst/>
+              <a:defRPr/>
+            </a:pPr>
+            <a:endParaRPr lang="en-US" dirty="0"/>
+          </a:p>
+          <a:p>
+            <a:pPr marL="0" marR="0" lvl="0" indent="0" algn="l" defTabSz="914400" rtl="0" eaLnBrk="1" fontAlgn="auto" latinLnBrk="0" hangingPunct="1">
+              <a:lnSpc>
+                <a:spcPct val="100000"/>
+              </a:lnSpc>
+              <a:spcBef>
+                <a:spcPts val="0"/>
+              </a:spcBef>
+              <a:spcAft>
+                <a:spcPts val="0"/>
+              </a:spcAft>
+              <a:buClrTx/>
+              <a:buSzTx/>
+              <a:buFontTx/>
+              <a:buNone/>
+              <a:tabLst/>
+              <a:defRPr/>
+            </a:pPr>
+            <a:r>
+              <a:rPr lang="en-US" dirty="0"/>
+              <a:t>https://pynative.com/python-data-types/</a:t>
             </a:r>
           </a:p>
         </p:txBody>
@@ -2935,7 +3020,7 @@
     </p:spTree>
     <p:extLst>
       <p:ext uri="{BB962C8B-B14F-4D97-AF65-F5344CB8AC3E}">
-        <p14:creationId xmlns:p14="http://schemas.microsoft.com/office/powerpoint/2010/main" val="828379136"/>
+        <p14:creationId xmlns:p14="http://schemas.microsoft.com/office/powerpoint/2010/main" val="62286822"/>
       </p:ext>
     </p:extLst>
   </p:cSld>
@@ -3092,7 +3177,7 @@
           <a:p>
             <a:fld id="{C3F78080-8D0A-4BE8-A5B4-CB115102D524}" type="datetimeFigureOut">
               <a:rPr lang="en-US" smtClean="0"/>
-              <a:t>6/1/2022</a:t>
+              <a:t>6/3/2022</a:t>
             </a:fld>
             <a:endParaRPr lang="en-US"/>
           </a:p>
@@ -3290,7 +3375,7 @@
           <a:p>
             <a:fld id="{C3F78080-8D0A-4BE8-A5B4-CB115102D524}" type="datetimeFigureOut">
               <a:rPr lang="en-US" smtClean="0"/>
-              <a:t>6/1/2022</a:t>
+              <a:t>6/3/2022</a:t>
             </a:fld>
             <a:endParaRPr lang="en-US"/>
           </a:p>
@@ -3498,7 +3583,7 @@
           <a:p>
             <a:fld id="{C3F78080-8D0A-4BE8-A5B4-CB115102D524}" type="datetimeFigureOut">
               <a:rPr lang="en-US" smtClean="0"/>
-              <a:t>6/1/2022</a:t>
+              <a:t>6/3/2022</a:t>
             </a:fld>
             <a:endParaRPr lang="en-US"/>
           </a:p>
@@ -3696,7 +3781,7 @@
           <a:p>
             <a:fld id="{C3F78080-8D0A-4BE8-A5B4-CB115102D524}" type="datetimeFigureOut">
               <a:rPr lang="en-US" smtClean="0"/>
-              <a:t>6/1/2022</a:t>
+              <a:t>6/3/2022</a:t>
             </a:fld>
             <a:endParaRPr lang="en-US"/>
           </a:p>
@@ -3971,7 +4056,7 @@
           <a:p>
             <a:fld id="{C3F78080-8D0A-4BE8-A5B4-CB115102D524}" type="datetimeFigureOut">
               <a:rPr lang="en-US" smtClean="0"/>
-              <a:t>6/1/2022</a:t>
+              <a:t>6/3/2022</a:t>
             </a:fld>
             <a:endParaRPr lang="en-US"/>
           </a:p>
@@ -4236,7 +4321,7 @@
           <a:p>
             <a:fld id="{C3F78080-8D0A-4BE8-A5B4-CB115102D524}" type="datetimeFigureOut">
               <a:rPr lang="en-US" smtClean="0"/>
-              <a:t>6/1/2022</a:t>
+              <a:t>6/3/2022</a:t>
             </a:fld>
             <a:endParaRPr lang="en-US"/>
           </a:p>
@@ -4648,7 +4733,7 @@
           <a:p>
             <a:fld id="{C3F78080-8D0A-4BE8-A5B4-CB115102D524}" type="datetimeFigureOut">
               <a:rPr lang="en-US" smtClean="0"/>
-              <a:t>6/1/2022</a:t>
+              <a:t>6/3/2022</a:t>
             </a:fld>
             <a:endParaRPr lang="en-US"/>
           </a:p>
@@ -4789,7 +4874,7 @@
           <a:p>
             <a:fld id="{C3F78080-8D0A-4BE8-A5B4-CB115102D524}" type="datetimeFigureOut">
               <a:rPr lang="en-US" smtClean="0"/>
-              <a:t>6/1/2022</a:t>
+              <a:t>6/3/2022</a:t>
             </a:fld>
             <a:endParaRPr lang="en-US"/>
           </a:p>
@@ -4902,7 +4987,7 @@
           <a:p>
             <a:fld id="{C3F78080-8D0A-4BE8-A5B4-CB115102D524}" type="datetimeFigureOut">
               <a:rPr lang="en-US" smtClean="0"/>
-              <a:t>6/1/2022</a:t>
+              <a:t>6/3/2022</a:t>
             </a:fld>
             <a:endParaRPr lang="en-US"/>
           </a:p>
@@ -5213,7 +5298,7 @@
           <a:p>
             <a:fld id="{C3F78080-8D0A-4BE8-A5B4-CB115102D524}" type="datetimeFigureOut">
               <a:rPr lang="en-US" smtClean="0"/>
-              <a:t>6/1/2022</a:t>
+              <a:t>6/3/2022</a:t>
             </a:fld>
             <a:endParaRPr lang="en-US"/>
           </a:p>
@@ -5501,7 +5586,7 @@
           <a:p>
             <a:fld id="{C3F78080-8D0A-4BE8-A5B4-CB115102D524}" type="datetimeFigureOut">
               <a:rPr lang="en-US" smtClean="0"/>
-              <a:t>6/1/2022</a:t>
+              <a:t>6/3/2022</a:t>
             </a:fld>
             <a:endParaRPr lang="en-US"/>
           </a:p>
@@ -5742,7 +5827,7 @@
           <a:p>
             <a:fld id="{C3F78080-8D0A-4BE8-A5B4-CB115102D524}" type="datetimeFigureOut">
               <a:rPr lang="en-US" smtClean="0"/>
-              <a:t>6/1/2022</a:t>
+              <a:t>6/3/2022</a:t>
             </a:fld>
             <a:endParaRPr lang="en-US"/>
           </a:p>
@@ -6275,6 +6360,176 @@
       </p:grpSpPr>
       <p:pic>
         <p:nvPicPr>
+          <p:cNvPr id="2050" name="Picture 2" descr="Icon of Adam Naming the Animals - 15th c. Meteora - (1AA10) - Uncut  Mountain Supply">
+            <a:extLst>
+              <a:ext uri="{FF2B5EF4-FFF2-40B4-BE49-F238E27FC236}">
+                <a16:creationId xmlns:a16="http://schemas.microsoft.com/office/drawing/2014/main" id="{A8A604AE-38F9-4BA8-858C-E33429DF7680}"/>
+              </a:ext>
+            </a:extLst>
+          </p:cNvPr>
+          <p:cNvPicPr>
+            <a:picLocks noChangeAspect="1" noChangeArrowheads="1"/>
+          </p:cNvPicPr>
+          <p:nvPr/>
+        </p:nvPicPr>
+        <p:blipFill>
+          <a:blip r:embed="rId3">
+            <a:extLst>
+              <a:ext uri="{28A0092B-C50C-407E-A947-70E740481C1C}">
+                <a14:useLocalDpi xmlns:a14="http://schemas.microsoft.com/office/drawing/2010/main" val="0"/>
+              </a:ext>
+            </a:extLst>
+          </a:blip>
+          <a:srcRect/>
+          <a:stretch>
+            <a:fillRect/>
+          </a:stretch>
+        </p:blipFill>
+        <p:spPr bwMode="auto">
+          <a:xfrm>
+            <a:off x="2785598" y="1290062"/>
+            <a:ext cx="6620804" cy="4277875"/>
+          </a:xfrm>
+          <a:prstGeom prst="rect">
+            <a:avLst/>
+          </a:prstGeom>
+          <a:noFill/>
+          <a:ln w="3175">
+            <a:solidFill>
+              <a:schemeClr val="tx1">
+                <a:lumMod val="75000"/>
+                <a:lumOff val="25000"/>
+              </a:schemeClr>
+            </a:solidFill>
+          </a:ln>
+          <a:effectLst>
+            <a:outerShdw blurRad="50800" dist="38100" dir="2700000" algn="tl" rotWithShape="0">
+              <a:prstClr val="black">
+                <a:alpha val="40000"/>
+              </a:prstClr>
+            </a:outerShdw>
+          </a:effectLst>
+          <a:extLst>
+            <a:ext uri="{909E8E84-426E-40DD-AFC4-6F175D3DCCD1}">
+              <a14:hiddenFill xmlns:a14="http://schemas.microsoft.com/office/drawing/2010/main">
+                <a:solidFill>
+                  <a:srgbClr val="FFFFFF"/>
+                </a:solidFill>
+              </a14:hiddenFill>
+            </a:ext>
+          </a:extLst>
+        </p:spPr>
+      </p:pic>
+      <p:sp>
+        <p:nvSpPr>
+          <p:cNvPr id="6" name="TextBox 5">
+            <a:extLst>
+              <a:ext uri="{FF2B5EF4-FFF2-40B4-BE49-F238E27FC236}">
+                <a16:creationId xmlns:a16="http://schemas.microsoft.com/office/drawing/2014/main" id="{29F3E589-6F1A-4BB3-B969-F58FCA3DE9E0}"/>
+              </a:ext>
+            </a:extLst>
+          </p:cNvPr>
+          <p:cNvSpPr txBox="1"/>
+          <p:nvPr/>
+        </p:nvSpPr>
+        <p:spPr>
+          <a:xfrm>
+            <a:off x="0" y="6550223"/>
+            <a:ext cx="12192000" cy="307777"/>
+          </a:xfrm>
+          <a:prstGeom prst="rect">
+            <a:avLst/>
+          </a:prstGeom>
+          <a:noFill/>
+        </p:spPr>
+        <p:txBody>
+          <a:bodyPr wrap="square" rtlCol="0">
+            <a:spAutoFit/>
+          </a:bodyPr>
+          <a:lstStyle/>
+          <a:p>
+            <a:r>
+              <a:rPr lang="en-US" sz="1400" dirty="0">
+                <a:solidFill>
+                  <a:schemeClr val="tx1">
+                    <a:lumMod val="65000"/>
+                    <a:lumOff val="35000"/>
+                  </a:schemeClr>
+                </a:solidFill>
+                <a:latin typeface="+mj-lt"/>
+                <a:ea typeface="Verdana" panose="020B0604030504040204" pitchFamily="34" charset="0"/>
+              </a:rPr>
+              <a:t>Image Credit: </a:t>
+            </a:r>
+            <a:r>
+              <a:rPr lang="en-US" sz="1400" dirty="0">
+                <a:solidFill>
+                  <a:schemeClr val="tx1">
+                    <a:lumMod val="65000"/>
+                    <a:lumOff val="35000"/>
+                  </a:schemeClr>
+                </a:solidFill>
+                <a:latin typeface="+mj-lt"/>
+              </a:rPr>
+              <a:t>https://www.uncutmountainsupply.com/icons/of-saints/by-name/a/icon-of-adam-naming-the-animals-15th-c-meteora-1aa10/</a:t>
+            </a:r>
+            <a:endParaRPr lang="en-US" sz="1400" dirty="0">
+              <a:solidFill>
+                <a:schemeClr val="tx1">
+                  <a:lumMod val="65000"/>
+                  <a:lumOff val="35000"/>
+                </a:schemeClr>
+              </a:solidFill>
+              <a:latin typeface="+mj-lt"/>
+              <a:ea typeface="Verdana" panose="020B0604030504040204" pitchFamily="34" charset="0"/>
+            </a:endParaRPr>
+          </a:p>
+        </p:txBody>
+      </p:sp>
+    </p:spTree>
+    <p:extLst>
+      <p:ext uri="{BB962C8B-B14F-4D97-AF65-F5344CB8AC3E}">
+        <p14:creationId xmlns:p14="http://schemas.microsoft.com/office/powerpoint/2010/main" val="4083169647"/>
+      </p:ext>
+    </p:extLst>
+  </p:cSld>
+  <p:clrMapOvr>
+    <a:masterClrMapping/>
+  </p:clrMapOvr>
+  <mc:AlternateContent xmlns:mc="http://schemas.openxmlformats.org/markup-compatibility/2006" xmlns:p14="http://schemas.microsoft.com/office/powerpoint/2010/main">
+    <mc:Choice Requires="p14">
+      <p:transition spd="med" p14:dur="700">
+        <p:fade/>
+      </p:transition>
+    </mc:Choice>
+    <mc:Fallback xmlns="">
+      <p:transition spd="med">
+        <p:fade/>
+      </p:transition>
+    </mc:Fallback>
+  </mc:AlternateContent>
+</p:sld>
+</file>
+
+<file path=ppt/slides/slide11.xml><?xml version="1.0" encoding="utf-8"?>
+<p:sld xmlns:a="http://schemas.openxmlformats.org/drawingml/2006/main" xmlns:r="http://schemas.openxmlformats.org/officeDocument/2006/relationships" xmlns:p="http://schemas.openxmlformats.org/presentationml/2006/main">
+  <p:cSld>
+    <p:spTree>
+      <p:nvGrpSpPr>
+        <p:cNvPr id="1" name=""/>
+        <p:cNvGrpSpPr/>
+        <p:nvPr/>
+      </p:nvGrpSpPr>
+      <p:grpSpPr>
+        <a:xfrm>
+          <a:off x="0" y="0"/>
+          <a:ext cx="0" cy="0"/>
+          <a:chOff x="0" y="0"/>
+          <a:chExt cx="0" cy="0"/>
+        </a:xfrm>
+      </p:grpSpPr>
+      <p:pic>
+        <p:nvPicPr>
           <p:cNvPr id="3074" name="Picture 2" descr="String (computer science) - Wikipedia">
             <a:extLst>
               <a:ext uri="{FF2B5EF4-FFF2-40B4-BE49-F238E27FC236}">
@@ -6345,7 +6600,7 @@
 </p:sld>
 </file>
 
-<file path=ppt/slides/slide11.xml><?xml version="1.0" encoding="utf-8"?>
+<file path=ppt/slides/slide12.xml><?xml version="1.0" encoding="utf-8"?>
 <p:sld xmlns:a="http://schemas.openxmlformats.org/drawingml/2006/main" xmlns:r="http://schemas.openxmlformats.org/officeDocument/2006/relationships" xmlns:p="http://schemas.openxmlformats.org/presentationml/2006/main">
   <p:cSld>
     <p:spTree>
@@ -6417,7 +6672,7 @@
 </p:sld>
 </file>
 
-<file path=ppt/slides/slide12.xml><?xml version="1.0" encoding="utf-8"?>
+<file path=ppt/slides/slide13.xml><?xml version="1.0" encoding="utf-8"?>
 <p:sld xmlns:a="http://schemas.openxmlformats.org/drawingml/2006/main" xmlns:r="http://schemas.openxmlformats.org/officeDocument/2006/relationships" xmlns:p="http://schemas.openxmlformats.org/presentationml/2006/main">
   <p:cSld>
     <p:spTree>
@@ -6493,196 +6748,6 @@
     <p:extLst>
       <p:ext uri="{BB962C8B-B14F-4D97-AF65-F5344CB8AC3E}">
         <p14:creationId xmlns:p14="http://schemas.microsoft.com/office/powerpoint/2010/main" val="2021418747"/>
-      </p:ext>
-    </p:extLst>
-  </p:cSld>
-  <p:clrMapOvr>
-    <a:masterClrMapping/>
-  </p:clrMapOvr>
-  <mc:AlternateContent xmlns:mc="http://schemas.openxmlformats.org/markup-compatibility/2006" xmlns:p14="http://schemas.microsoft.com/office/powerpoint/2010/main">
-    <mc:Choice Requires="p14">
-      <p:transition spd="med" p14:dur="700">
-        <p:fade/>
-      </p:transition>
-    </mc:Choice>
-    <mc:Fallback xmlns="">
-      <p:transition spd="med">
-        <p:fade/>
-      </p:transition>
-    </mc:Fallback>
-  </mc:AlternateContent>
-</p:sld>
-</file>
-
-<file path=ppt/slides/slide13.xml><?xml version="1.0" encoding="utf-8"?>
-<p:sld xmlns:a="http://schemas.openxmlformats.org/drawingml/2006/main" xmlns:r="http://schemas.openxmlformats.org/officeDocument/2006/relationships" xmlns:p="http://schemas.openxmlformats.org/presentationml/2006/main">
-  <p:cSld>
-    <p:spTree>
-      <p:nvGrpSpPr>
-        <p:cNvPr id="1" name=""/>
-        <p:cNvGrpSpPr/>
-        <p:nvPr/>
-      </p:nvGrpSpPr>
-      <p:grpSpPr>
-        <a:xfrm>
-          <a:off x="0" y="0"/>
-          <a:ext cx="0" cy="0"/>
-          <a:chOff x="0" y="0"/>
-          <a:chExt cx="0" cy="0"/>
-        </a:xfrm>
-      </p:grpSpPr>
-      <p:pic>
-        <p:nvPicPr>
-          <p:cNvPr id="1026" name="Picture 2" descr="Python Datatype conversion">
-            <a:extLst>
-              <a:ext uri="{FF2B5EF4-FFF2-40B4-BE49-F238E27FC236}">
-                <a16:creationId xmlns:a16="http://schemas.microsoft.com/office/drawing/2014/main" id="{C5A4E410-78DF-44F2-BB04-9461EED29C66}"/>
-              </a:ext>
-            </a:extLst>
-          </p:cNvPr>
-          <p:cNvPicPr>
-            <a:picLocks noChangeAspect="1" noChangeArrowheads="1"/>
-          </p:cNvPicPr>
-          <p:nvPr/>
-        </p:nvPicPr>
-        <p:blipFill>
-          <a:blip r:embed="rId3">
-            <a:extLst>
-              <a:ext uri="{28A0092B-C50C-407E-A947-70E740481C1C}">
-                <a14:useLocalDpi xmlns:a14="http://schemas.microsoft.com/office/drawing/2010/main" val="0"/>
-              </a:ext>
-            </a:extLst>
-          </a:blip>
-          <a:srcRect/>
-          <a:stretch>
-            <a:fillRect/>
-          </a:stretch>
-        </p:blipFill>
-        <p:spPr bwMode="auto">
-          <a:xfrm>
-            <a:off x="2400255" y="2404008"/>
-            <a:ext cx="7391489" cy="2049983"/>
-          </a:xfrm>
-          <a:prstGeom prst="rect">
-            <a:avLst/>
-          </a:prstGeom>
-          <a:noFill/>
-          <a:extLst>
-            <a:ext uri="{909E8E84-426E-40DD-AFC4-6F175D3DCCD1}">
-              <a14:hiddenFill xmlns:a14="http://schemas.microsoft.com/office/drawing/2010/main">
-                <a:solidFill>
-                  <a:srgbClr val="FFFFFF"/>
-                </a:solidFill>
-              </a14:hiddenFill>
-            </a:ext>
-          </a:extLst>
-        </p:spPr>
-      </p:pic>
-      <p:pic>
-        <p:nvPicPr>
-          <p:cNvPr id="4" name="Picture 3">
-            <a:extLst>
-              <a:ext uri="{FF2B5EF4-FFF2-40B4-BE49-F238E27FC236}">
-                <a16:creationId xmlns:a16="http://schemas.microsoft.com/office/drawing/2014/main" id="{D20A1309-E55E-44DB-9811-96C67DA5C666}"/>
-              </a:ext>
-            </a:extLst>
-          </p:cNvPr>
-          <p:cNvPicPr>
-            <a:picLocks noChangeAspect="1"/>
-          </p:cNvPicPr>
-          <p:nvPr/>
-        </p:nvPicPr>
-        <p:blipFill>
-          <a:blip r:embed="rId4">
-            <a:extLst>
-              <a:ext uri="{28A0092B-C50C-407E-A947-70E740481C1C}">
-                <a14:useLocalDpi xmlns:a14="http://schemas.microsoft.com/office/drawing/2010/main" val="0"/>
-              </a:ext>
-            </a:extLst>
-          </a:blip>
-          <a:stretch>
-            <a:fillRect/>
-          </a:stretch>
-        </p:blipFill>
-        <p:spPr>
-          <a:xfrm>
-            <a:off x="10066897" y="4529137"/>
-            <a:ext cx="2116085" cy="2328862"/>
-          </a:xfrm>
-          <a:prstGeom prst="rect">
-            <a:avLst/>
-          </a:prstGeom>
-        </p:spPr>
-      </p:pic>
-      <p:sp>
-        <p:nvSpPr>
-          <p:cNvPr id="8" name="TextBox 7">
-            <a:extLst>
-              <a:ext uri="{FF2B5EF4-FFF2-40B4-BE49-F238E27FC236}">
-                <a16:creationId xmlns:a16="http://schemas.microsoft.com/office/drawing/2014/main" id="{FBA9AB83-FE78-48D0-8549-1BCE5EAB6D3A}"/>
-              </a:ext>
-            </a:extLst>
-          </p:cNvPr>
-          <p:cNvSpPr txBox="1"/>
-          <p:nvPr/>
-        </p:nvSpPr>
-        <p:spPr>
-          <a:xfrm>
-            <a:off x="0" y="6550223"/>
-            <a:ext cx="12192000" cy="307777"/>
-          </a:xfrm>
-          <a:prstGeom prst="rect">
-            <a:avLst/>
-          </a:prstGeom>
-          <a:noFill/>
-        </p:spPr>
-        <p:txBody>
-          <a:bodyPr wrap="square" rtlCol="0">
-            <a:spAutoFit/>
-          </a:bodyPr>
-          <a:lstStyle/>
-          <a:p>
-            <a:r>
-              <a:rPr lang="en-US" sz="1400" dirty="0">
-                <a:solidFill>
-                  <a:schemeClr val="tx1">
-                    <a:lumMod val="65000"/>
-                    <a:lumOff val="35000"/>
-                  </a:schemeClr>
-                </a:solidFill>
-                <a:latin typeface="+mj-lt"/>
-                <a:ea typeface="Verdana" panose="020B0604030504040204" pitchFamily="34" charset="0"/>
-              </a:rPr>
-              <a:t>Image Credit: </a:t>
-            </a:r>
-            <a:r>
-              <a:rPr lang="en-US" sz="1400" dirty="0">
-                <a:solidFill>
-                  <a:schemeClr val="tx1">
-                    <a:lumMod val="65000"/>
-                    <a:lumOff val="35000"/>
-                  </a:schemeClr>
-                </a:solidFill>
-              </a:rPr>
-              <a:t>https://www.vectorstock.com/royalty-free-vector/cartoon-wizard-vector-1693529</a:t>
-            </a:r>
-            <a:endParaRPr lang="en-US" sz="1400" dirty="0">
-              <a:solidFill>
-                <a:schemeClr val="tx1">
-                  <a:lumMod val="65000"/>
-                  <a:lumOff val="35000"/>
-                </a:schemeClr>
-              </a:solidFill>
-              <a:latin typeface="+mj-lt"/>
-              <a:ea typeface="Verdana" panose="020B0604030504040204" pitchFamily="34" charset="0"/>
-            </a:endParaRPr>
-          </a:p>
-        </p:txBody>
-      </p:sp>
-    </p:spTree>
-    <p:extLst>
-      <p:ext uri="{BB962C8B-B14F-4D97-AF65-F5344CB8AC3E}">
-        <p14:creationId xmlns:p14="http://schemas.microsoft.com/office/powerpoint/2010/main" val="3192052037"/>
       </p:ext>
     </p:extLst>
   </p:cSld>
@@ -6721,6 +6786,196 @@
           <a:chExt cx="0" cy="0"/>
         </a:xfrm>
       </p:grpSpPr>
+      <p:pic>
+        <p:nvPicPr>
+          <p:cNvPr id="1026" name="Picture 2" descr="Python Datatype conversion">
+            <a:extLst>
+              <a:ext uri="{FF2B5EF4-FFF2-40B4-BE49-F238E27FC236}">
+                <a16:creationId xmlns:a16="http://schemas.microsoft.com/office/drawing/2014/main" id="{C5A4E410-78DF-44F2-BB04-9461EED29C66}"/>
+              </a:ext>
+            </a:extLst>
+          </p:cNvPr>
+          <p:cNvPicPr>
+            <a:picLocks noChangeAspect="1" noChangeArrowheads="1"/>
+          </p:cNvPicPr>
+          <p:nvPr/>
+        </p:nvPicPr>
+        <p:blipFill>
+          <a:blip r:embed="rId3">
+            <a:extLst>
+              <a:ext uri="{28A0092B-C50C-407E-A947-70E740481C1C}">
+                <a14:useLocalDpi xmlns:a14="http://schemas.microsoft.com/office/drawing/2010/main" val="0"/>
+              </a:ext>
+            </a:extLst>
+          </a:blip>
+          <a:srcRect/>
+          <a:stretch>
+            <a:fillRect/>
+          </a:stretch>
+        </p:blipFill>
+        <p:spPr bwMode="auto">
+          <a:xfrm>
+            <a:off x="2400255" y="2404008"/>
+            <a:ext cx="7391489" cy="2049983"/>
+          </a:xfrm>
+          <a:prstGeom prst="rect">
+            <a:avLst/>
+          </a:prstGeom>
+          <a:noFill/>
+          <a:extLst>
+            <a:ext uri="{909E8E84-426E-40DD-AFC4-6F175D3DCCD1}">
+              <a14:hiddenFill xmlns:a14="http://schemas.microsoft.com/office/drawing/2010/main">
+                <a:solidFill>
+                  <a:srgbClr val="FFFFFF"/>
+                </a:solidFill>
+              </a14:hiddenFill>
+            </a:ext>
+          </a:extLst>
+        </p:spPr>
+      </p:pic>
+      <p:pic>
+        <p:nvPicPr>
+          <p:cNvPr id="4" name="Picture 3">
+            <a:extLst>
+              <a:ext uri="{FF2B5EF4-FFF2-40B4-BE49-F238E27FC236}">
+                <a16:creationId xmlns:a16="http://schemas.microsoft.com/office/drawing/2014/main" id="{D20A1309-E55E-44DB-9811-96C67DA5C666}"/>
+              </a:ext>
+            </a:extLst>
+          </p:cNvPr>
+          <p:cNvPicPr>
+            <a:picLocks noChangeAspect="1"/>
+          </p:cNvPicPr>
+          <p:nvPr/>
+        </p:nvPicPr>
+        <p:blipFill>
+          <a:blip r:embed="rId4">
+            <a:extLst>
+              <a:ext uri="{28A0092B-C50C-407E-A947-70E740481C1C}">
+                <a14:useLocalDpi xmlns:a14="http://schemas.microsoft.com/office/drawing/2010/main" val="0"/>
+              </a:ext>
+            </a:extLst>
+          </a:blip>
+          <a:stretch>
+            <a:fillRect/>
+          </a:stretch>
+        </p:blipFill>
+        <p:spPr>
+          <a:xfrm>
+            <a:off x="10066897" y="4529137"/>
+            <a:ext cx="2116085" cy="2328862"/>
+          </a:xfrm>
+          <a:prstGeom prst="rect">
+            <a:avLst/>
+          </a:prstGeom>
+        </p:spPr>
+      </p:pic>
+      <p:sp>
+        <p:nvSpPr>
+          <p:cNvPr id="8" name="TextBox 7">
+            <a:extLst>
+              <a:ext uri="{FF2B5EF4-FFF2-40B4-BE49-F238E27FC236}">
+                <a16:creationId xmlns:a16="http://schemas.microsoft.com/office/drawing/2014/main" id="{FBA9AB83-FE78-48D0-8549-1BCE5EAB6D3A}"/>
+              </a:ext>
+            </a:extLst>
+          </p:cNvPr>
+          <p:cNvSpPr txBox="1"/>
+          <p:nvPr/>
+        </p:nvSpPr>
+        <p:spPr>
+          <a:xfrm>
+            <a:off x="0" y="6550223"/>
+            <a:ext cx="12192000" cy="307777"/>
+          </a:xfrm>
+          <a:prstGeom prst="rect">
+            <a:avLst/>
+          </a:prstGeom>
+          <a:noFill/>
+        </p:spPr>
+        <p:txBody>
+          <a:bodyPr wrap="square" rtlCol="0">
+            <a:spAutoFit/>
+          </a:bodyPr>
+          <a:lstStyle/>
+          <a:p>
+            <a:r>
+              <a:rPr lang="en-US" sz="1400" dirty="0">
+                <a:solidFill>
+                  <a:schemeClr val="tx1">
+                    <a:lumMod val="65000"/>
+                    <a:lumOff val="35000"/>
+                  </a:schemeClr>
+                </a:solidFill>
+                <a:latin typeface="+mj-lt"/>
+                <a:ea typeface="Verdana" panose="020B0604030504040204" pitchFamily="34" charset="0"/>
+              </a:rPr>
+              <a:t>Image Credit: </a:t>
+            </a:r>
+            <a:r>
+              <a:rPr lang="en-US" sz="1400" dirty="0">
+                <a:solidFill>
+                  <a:schemeClr val="tx1">
+                    <a:lumMod val="65000"/>
+                    <a:lumOff val="35000"/>
+                  </a:schemeClr>
+                </a:solidFill>
+              </a:rPr>
+              <a:t>https://www.vectorstock.com/royalty-free-vector/cartoon-wizard-vector-1693529</a:t>
+            </a:r>
+            <a:endParaRPr lang="en-US" sz="1400" dirty="0">
+              <a:solidFill>
+                <a:schemeClr val="tx1">
+                  <a:lumMod val="65000"/>
+                  <a:lumOff val="35000"/>
+                </a:schemeClr>
+              </a:solidFill>
+              <a:latin typeface="+mj-lt"/>
+              <a:ea typeface="Verdana" panose="020B0604030504040204" pitchFamily="34" charset="0"/>
+            </a:endParaRPr>
+          </a:p>
+        </p:txBody>
+      </p:sp>
+    </p:spTree>
+    <p:extLst>
+      <p:ext uri="{BB962C8B-B14F-4D97-AF65-F5344CB8AC3E}">
+        <p14:creationId xmlns:p14="http://schemas.microsoft.com/office/powerpoint/2010/main" val="3192052037"/>
+      </p:ext>
+    </p:extLst>
+  </p:cSld>
+  <p:clrMapOvr>
+    <a:masterClrMapping/>
+  </p:clrMapOvr>
+  <mc:AlternateContent xmlns:mc="http://schemas.openxmlformats.org/markup-compatibility/2006" xmlns:p14="http://schemas.microsoft.com/office/powerpoint/2010/main">
+    <mc:Choice Requires="p14">
+      <p:transition spd="med" p14:dur="700">
+        <p:fade/>
+      </p:transition>
+    </mc:Choice>
+    <mc:Fallback xmlns="">
+      <p:transition spd="med">
+        <p:fade/>
+      </p:transition>
+    </mc:Fallback>
+  </mc:AlternateContent>
+</p:sld>
+</file>
+
+<file path=ppt/slides/slide15.xml><?xml version="1.0" encoding="utf-8"?>
+<p:sld xmlns:a="http://schemas.openxmlformats.org/drawingml/2006/main" xmlns:r="http://schemas.openxmlformats.org/officeDocument/2006/relationships" xmlns:p="http://schemas.openxmlformats.org/presentationml/2006/main">
+  <p:cSld>
+    <p:spTree>
+      <p:nvGrpSpPr>
+        <p:cNvPr id="1" name=""/>
+        <p:cNvGrpSpPr/>
+        <p:nvPr/>
+      </p:nvGrpSpPr>
+      <p:grpSpPr>
+        <a:xfrm>
+          <a:off x="0" y="0"/>
+          <a:ext cx="0" cy="0"/>
+          <a:chOff x="0" y="0"/>
+          <a:chExt cx="0" cy="0"/>
+        </a:xfrm>
+      </p:grpSpPr>
       <p:sp>
         <p:nvSpPr>
           <p:cNvPr id="2" name="Title 1">
@@ -6820,7 +7075,7 @@
 </p:sld>
 </file>
 
-<file path=ppt/slides/slide15.xml><?xml version="1.0" encoding="utf-8"?>
+<file path=ppt/slides/slide16.xml><?xml version="1.0" encoding="utf-8"?>
 <p:sld xmlns:a="http://schemas.openxmlformats.org/drawingml/2006/main" xmlns:r="http://schemas.openxmlformats.org/officeDocument/2006/relationships" xmlns:p="http://schemas.openxmlformats.org/presentationml/2006/main">
   <p:cSld>
     <p:spTree>
@@ -8170,6 +8425,145 @@
       </p:grpSpPr>
       <p:pic>
         <p:nvPicPr>
+          <p:cNvPr id="3" name="Picture 2" descr="A Brief History of Artificial Intelligence: What It Is, Where We Are, and Where We Are Going by [Michael Wooldridge]">
+            <a:extLst>
+              <a:ext uri="{FF2B5EF4-FFF2-40B4-BE49-F238E27FC236}">
+                <a16:creationId xmlns:a16="http://schemas.microsoft.com/office/drawing/2014/main" id="{1BA2E76B-F723-4965-A1A5-68D2C5B684DF}"/>
+              </a:ext>
+            </a:extLst>
+          </p:cNvPr>
+          <p:cNvPicPr>
+            <a:picLocks noChangeAspect="1" noChangeArrowheads="1"/>
+          </p:cNvPicPr>
+          <p:nvPr/>
+        </p:nvPicPr>
+        <p:blipFill>
+          <a:blip r:embed="rId3">
+            <a:extLst>
+              <a:ext uri="{28A0092B-C50C-407E-A947-70E740481C1C}">
+                <a14:useLocalDpi xmlns:a14="http://schemas.microsoft.com/office/drawing/2010/main" val="0"/>
+              </a:ext>
+            </a:extLst>
+          </a:blip>
+          <a:srcRect/>
+          <a:stretch>
+            <a:fillRect/>
+          </a:stretch>
+        </p:blipFill>
+        <p:spPr bwMode="auto">
+          <a:xfrm>
+            <a:off x="1961647" y="1047750"/>
+            <a:ext cx="3086100" cy="4762500"/>
+          </a:xfrm>
+          <a:prstGeom prst="rect">
+            <a:avLst/>
+          </a:prstGeom>
+          <a:noFill/>
+          <a:effectLst>
+            <a:outerShdw blurRad="50800" dist="38100" dir="2700000" algn="tl" rotWithShape="0">
+              <a:prstClr val="black">
+                <a:alpha val="40000"/>
+              </a:prstClr>
+            </a:outerShdw>
+          </a:effectLst>
+          <a:extLst>
+            <a:ext uri="{909E8E84-426E-40DD-AFC4-6F175D3DCCD1}">
+              <a14:hiddenFill xmlns:a14="http://schemas.microsoft.com/office/drawing/2010/main">
+                <a:solidFill>
+                  <a:srgbClr val="FFFFFF"/>
+                </a:solidFill>
+              </a14:hiddenFill>
+            </a:ext>
+          </a:extLst>
+        </p:spPr>
+      </p:pic>
+      <p:pic>
+        <p:nvPicPr>
+          <p:cNvPr id="6" name="Picture 5" descr="Diagram, text&#10;&#10;Description automatically generated">
+            <a:extLst>
+              <a:ext uri="{FF2B5EF4-FFF2-40B4-BE49-F238E27FC236}">
+                <a16:creationId xmlns:a16="http://schemas.microsoft.com/office/drawing/2014/main" id="{6706020F-E618-4544-8D79-F68CC7189235}"/>
+              </a:ext>
+            </a:extLst>
+          </p:cNvPr>
+          <p:cNvPicPr>
+            <a:picLocks noChangeAspect="1"/>
+          </p:cNvPicPr>
+          <p:nvPr/>
+        </p:nvPicPr>
+        <p:blipFill>
+          <a:blip r:embed="rId4">
+            <a:extLst>
+              <a:ext uri="{28A0092B-C50C-407E-A947-70E740481C1C}">
+                <a14:useLocalDpi xmlns:a14="http://schemas.microsoft.com/office/drawing/2010/main" val="0"/>
+              </a:ext>
+            </a:extLst>
+          </a:blip>
+          <a:stretch>
+            <a:fillRect/>
+          </a:stretch>
+        </p:blipFill>
+        <p:spPr>
+          <a:xfrm>
+            <a:off x="7026444" y="1057275"/>
+            <a:ext cx="3171825" cy="4752975"/>
+          </a:xfrm>
+          <a:prstGeom prst="rect">
+            <a:avLst/>
+          </a:prstGeom>
+          <a:effectLst>
+            <a:outerShdw blurRad="50800" dist="38100" dir="2700000" algn="tl" rotWithShape="0">
+              <a:prstClr val="black">
+                <a:alpha val="40000"/>
+              </a:prstClr>
+            </a:outerShdw>
+          </a:effectLst>
+        </p:spPr>
+      </p:pic>
+    </p:spTree>
+    <p:extLst>
+      <p:ext uri="{BB962C8B-B14F-4D97-AF65-F5344CB8AC3E}">
+        <p14:creationId xmlns:p14="http://schemas.microsoft.com/office/powerpoint/2010/main" val="3550115435"/>
+      </p:ext>
+    </p:extLst>
+  </p:cSld>
+  <p:clrMapOvr>
+    <a:masterClrMapping/>
+  </p:clrMapOvr>
+  <mc:AlternateContent xmlns:mc="http://schemas.openxmlformats.org/markup-compatibility/2006" xmlns:p14="http://schemas.microsoft.com/office/powerpoint/2010/main">
+    <mc:Choice Requires="p14">
+      <p:transition spd="med" p14:dur="700">
+        <p:fade/>
+      </p:transition>
+    </mc:Choice>
+    <mc:Fallback xmlns="">
+      <p:transition spd="med">
+        <p:fade/>
+      </p:transition>
+    </mc:Fallback>
+  </mc:AlternateContent>
+</p:sld>
+</file>
+
+<file path=ppt/slides/slide6.xml><?xml version="1.0" encoding="utf-8"?>
+<p:sld xmlns:a="http://schemas.openxmlformats.org/drawingml/2006/main" xmlns:r="http://schemas.openxmlformats.org/officeDocument/2006/relationships" xmlns:p="http://schemas.openxmlformats.org/presentationml/2006/main">
+  <p:cSld>
+    <p:spTree>
+      <p:nvGrpSpPr>
+        <p:cNvPr id="1" name=""/>
+        <p:cNvGrpSpPr/>
+        <p:nvPr/>
+      </p:nvGrpSpPr>
+      <p:grpSpPr>
+        <a:xfrm>
+          <a:off x="0" y="0"/>
+          <a:ext cx="0" cy="0"/>
+          <a:chOff x="0" y="0"/>
+          <a:chExt cx="0" cy="0"/>
+        </a:xfrm>
+      </p:grpSpPr>
+      <p:pic>
+        <p:nvPicPr>
           <p:cNvPr id="1026" name="Picture 2" descr="Project Jupyter - Wikipedia">
             <a:extLst>
               <a:ext uri="{FF2B5EF4-FFF2-40B4-BE49-F238E27FC236}">
@@ -8240,7 +8634,7 @@
 </p:sld>
 </file>
 
-<file path=ppt/slides/slide6.xml><?xml version="1.0" encoding="utf-8"?>
+<file path=ppt/slides/slide7.xml><?xml version="1.0" encoding="utf-8"?>
 <p:sld xmlns:a="http://schemas.openxmlformats.org/drawingml/2006/main" xmlns:r="http://schemas.openxmlformats.org/officeDocument/2006/relationships" xmlns:p="http://schemas.openxmlformats.org/presentationml/2006/main">
   <p:cSld>
     <p:spTree>
@@ -8312,7 +8706,7 @@
 </p:sld>
 </file>
 
-<file path=ppt/slides/slide7.xml><?xml version="1.0" encoding="utf-8"?>
+<file path=ppt/slides/slide8.xml><?xml version="1.0" encoding="utf-8"?>
 <p:sld xmlns:a="http://schemas.openxmlformats.org/drawingml/2006/main" xmlns:r="http://schemas.openxmlformats.org/officeDocument/2006/relationships" xmlns:p="http://schemas.openxmlformats.org/presentationml/2006/main">
   <p:cSld>
     <p:spTree>
@@ -8437,7 +8831,7 @@
 </p:sld>
 </file>
 
-<file path=ppt/slides/slide8.xml><?xml version="1.0" encoding="utf-8"?>
+<file path=ppt/slides/slide9.xml><?xml version="1.0" encoding="utf-8"?>
 <p:sld xmlns:a="http://schemas.openxmlformats.org/drawingml/2006/main" xmlns:r="http://schemas.openxmlformats.org/officeDocument/2006/relationships" xmlns:p="http://schemas.openxmlformats.org/presentationml/2006/main">
   <p:cSld>
     <p:spTree>
@@ -8578,176 +8972,6 @@
     <p:extLst>
       <p:ext uri="{BB962C8B-B14F-4D97-AF65-F5344CB8AC3E}">
         <p14:creationId xmlns:p14="http://schemas.microsoft.com/office/powerpoint/2010/main" val="170311557"/>
-      </p:ext>
-    </p:extLst>
-  </p:cSld>
-  <p:clrMapOvr>
-    <a:masterClrMapping/>
-  </p:clrMapOvr>
-  <mc:AlternateContent xmlns:mc="http://schemas.openxmlformats.org/markup-compatibility/2006" xmlns:p14="http://schemas.microsoft.com/office/powerpoint/2010/main">
-    <mc:Choice Requires="p14">
-      <p:transition spd="med" p14:dur="700">
-        <p:fade/>
-      </p:transition>
-    </mc:Choice>
-    <mc:Fallback xmlns="">
-      <p:transition spd="med">
-        <p:fade/>
-      </p:transition>
-    </mc:Fallback>
-  </mc:AlternateContent>
-</p:sld>
-</file>
-
-<file path=ppt/slides/slide9.xml><?xml version="1.0" encoding="utf-8"?>
-<p:sld xmlns:a="http://schemas.openxmlformats.org/drawingml/2006/main" xmlns:r="http://schemas.openxmlformats.org/officeDocument/2006/relationships" xmlns:p="http://schemas.openxmlformats.org/presentationml/2006/main">
-  <p:cSld>
-    <p:spTree>
-      <p:nvGrpSpPr>
-        <p:cNvPr id="1" name=""/>
-        <p:cNvGrpSpPr/>
-        <p:nvPr/>
-      </p:nvGrpSpPr>
-      <p:grpSpPr>
-        <a:xfrm>
-          <a:off x="0" y="0"/>
-          <a:ext cx="0" cy="0"/>
-          <a:chOff x="0" y="0"/>
-          <a:chExt cx="0" cy="0"/>
-        </a:xfrm>
-      </p:grpSpPr>
-      <p:pic>
-        <p:nvPicPr>
-          <p:cNvPr id="2050" name="Picture 2" descr="Icon of Adam Naming the Animals - 15th c. Meteora - (1AA10) - Uncut  Mountain Supply">
-            <a:extLst>
-              <a:ext uri="{FF2B5EF4-FFF2-40B4-BE49-F238E27FC236}">
-                <a16:creationId xmlns:a16="http://schemas.microsoft.com/office/drawing/2014/main" id="{A8A604AE-38F9-4BA8-858C-E33429DF7680}"/>
-              </a:ext>
-            </a:extLst>
-          </p:cNvPr>
-          <p:cNvPicPr>
-            <a:picLocks noChangeAspect="1" noChangeArrowheads="1"/>
-          </p:cNvPicPr>
-          <p:nvPr/>
-        </p:nvPicPr>
-        <p:blipFill>
-          <a:blip r:embed="rId3">
-            <a:extLst>
-              <a:ext uri="{28A0092B-C50C-407E-A947-70E740481C1C}">
-                <a14:useLocalDpi xmlns:a14="http://schemas.microsoft.com/office/drawing/2010/main" val="0"/>
-              </a:ext>
-            </a:extLst>
-          </a:blip>
-          <a:srcRect/>
-          <a:stretch>
-            <a:fillRect/>
-          </a:stretch>
-        </p:blipFill>
-        <p:spPr bwMode="auto">
-          <a:xfrm>
-            <a:off x="2785598" y="1290062"/>
-            <a:ext cx="6620804" cy="4277875"/>
-          </a:xfrm>
-          <a:prstGeom prst="rect">
-            <a:avLst/>
-          </a:prstGeom>
-          <a:noFill/>
-          <a:ln w="3175">
-            <a:solidFill>
-              <a:schemeClr val="tx1">
-                <a:lumMod val="75000"/>
-                <a:lumOff val="25000"/>
-              </a:schemeClr>
-            </a:solidFill>
-          </a:ln>
-          <a:effectLst>
-            <a:outerShdw blurRad="50800" dist="38100" dir="2700000" algn="tl" rotWithShape="0">
-              <a:prstClr val="black">
-                <a:alpha val="40000"/>
-              </a:prstClr>
-            </a:outerShdw>
-          </a:effectLst>
-          <a:extLst>
-            <a:ext uri="{909E8E84-426E-40DD-AFC4-6F175D3DCCD1}">
-              <a14:hiddenFill xmlns:a14="http://schemas.microsoft.com/office/drawing/2010/main">
-                <a:solidFill>
-                  <a:srgbClr val="FFFFFF"/>
-                </a:solidFill>
-              </a14:hiddenFill>
-            </a:ext>
-          </a:extLst>
-        </p:spPr>
-      </p:pic>
-      <p:sp>
-        <p:nvSpPr>
-          <p:cNvPr id="6" name="TextBox 5">
-            <a:extLst>
-              <a:ext uri="{FF2B5EF4-FFF2-40B4-BE49-F238E27FC236}">
-                <a16:creationId xmlns:a16="http://schemas.microsoft.com/office/drawing/2014/main" id="{29F3E589-6F1A-4BB3-B969-F58FCA3DE9E0}"/>
-              </a:ext>
-            </a:extLst>
-          </p:cNvPr>
-          <p:cNvSpPr txBox="1"/>
-          <p:nvPr/>
-        </p:nvSpPr>
-        <p:spPr>
-          <a:xfrm>
-            <a:off x="0" y="6550223"/>
-            <a:ext cx="12192000" cy="307777"/>
-          </a:xfrm>
-          <a:prstGeom prst="rect">
-            <a:avLst/>
-          </a:prstGeom>
-          <a:noFill/>
-        </p:spPr>
-        <p:txBody>
-          <a:bodyPr wrap="square" rtlCol="0">
-            <a:spAutoFit/>
-          </a:bodyPr>
-          <a:lstStyle/>
-          <a:p>
-            <a:r>
-              <a:rPr lang="en-US" sz="1400" dirty="0">
-                <a:solidFill>
-                  <a:schemeClr val="tx1">
-                    <a:lumMod val="65000"/>
-                    <a:lumOff val="35000"/>
-                  </a:schemeClr>
-                </a:solidFill>
-                <a:latin typeface="+mj-lt"/>
-                <a:ea typeface="Verdana" panose="020B0604030504040204" pitchFamily="34" charset="0"/>
-              </a:rPr>
-              <a:t>Image Credit: </a:t>
-            </a:r>
-            <a:r>
-              <a:rPr lang="en-US" sz="1400" dirty="0">
-                <a:solidFill>
-                  <a:schemeClr val="tx1">
-                    <a:lumMod val="65000"/>
-                    <a:lumOff val="35000"/>
-                  </a:schemeClr>
-                </a:solidFill>
-                <a:latin typeface="+mj-lt"/>
-              </a:rPr>
-              <a:t>https://www.uncutmountainsupply.com/icons/of-saints/by-name/a/icon-of-adam-naming-the-animals-15th-c-meteora-1aa10/</a:t>
-            </a:r>
-            <a:endParaRPr lang="en-US" sz="1400" dirty="0">
-              <a:solidFill>
-                <a:schemeClr val="tx1">
-                  <a:lumMod val="65000"/>
-                  <a:lumOff val="35000"/>
-                </a:schemeClr>
-              </a:solidFill>
-              <a:latin typeface="+mj-lt"/>
-              <a:ea typeface="Verdana" panose="020B0604030504040204" pitchFamily="34" charset="0"/>
-            </a:endParaRPr>
-          </a:p>
-        </p:txBody>
-      </p:sp>
-    </p:spTree>
-    <p:extLst>
-      <p:ext uri="{BB962C8B-B14F-4D97-AF65-F5344CB8AC3E}">
-        <p14:creationId xmlns:p14="http://schemas.microsoft.com/office/powerpoint/2010/main" val="4083169647"/>
       </p:ext>
     </p:extLst>
   </p:cSld>

</xml_diff>